<commit_message>
Fix spacing, missing conjunctive ticks, etc
</commit_message>
<xml_diff>
--- a/tutorial-10-load_balancing.pptx
+++ b/tutorial-10-load_balancing.pptx
@@ -224,7 +224,7 @@
           <a:p>
             <a:fld id="{775CE290-E0F5-444C-B849-A8F17CD4104C}" type="datetimeFigureOut">
               <a:rPr lang="en-US" smtClean="0"/>
-              <a:t>9/8/14</a:t>
+              <a:t>9/9/14</a:t>
             </a:fld>
             <a:endParaRPr lang="en-US"/>
           </a:p>
@@ -390,7 +390,7 @@
           <a:p>
             <a:fld id="{AD53A24C-4135-094C-957B-35852E7EDFA4}" type="datetimeFigureOut">
               <a:rPr lang="en-US" smtClean="0"/>
-              <a:t>9/8/14</a:t>
+              <a:t>9/9/14</a:t>
             </a:fld>
             <a:endParaRPr lang="en-US"/>
           </a:p>
@@ -851,7 +851,7 @@
           <a:p>
             <a:fld id="{B594EA25-E4F4-3746-A0BA-A11E27330E0F}" type="datetime2">
               <a:rPr lang="en-US" smtClean="0"/>
-              <a:t>Monday, September 8, 14</a:t>
+              <a:t>Tuesday, September 9, 14</a:t>
             </a:fld>
             <a:endParaRPr lang="en-US"/>
           </a:p>
@@ -1154,7 +1154,7 @@
                 <a:latin typeface="Times New Roman"/>
                 <a:cs typeface="Times New Roman"/>
               </a:rPr>
-              <a:t>September 8, 2014</a:t>
+              <a:t>September 9, 2014</a:t>
             </a:fld>
             <a:endParaRPr lang="en-US" dirty="0">
               <a:latin typeface="Times New Roman"/>
@@ -1441,7 +1441,7 @@
           <a:p>
             <a:fld id="{EA699BF9-66CB-F244-8E74-7B1BE1C77046}" type="datetime2">
               <a:rPr lang="en-US" smtClean="0"/>
-              <a:t>Monday, September 8, 14</a:t>
+              <a:t>Tuesday, September 9, 14</a:t>
             </a:fld>
             <a:endParaRPr lang="en-US"/>
           </a:p>
@@ -1752,7 +1752,7 @@
           <a:p>
             <a:fld id="{D300BE84-9843-8B4F-B3C8-647B06AC46C9}" type="datetime2">
               <a:rPr lang="en-US" smtClean="0"/>
-              <a:t>Monday, September 8, 14</a:t>
+              <a:t>Tuesday, September 9, 14</a:t>
             </a:fld>
             <a:endParaRPr lang="en-US"/>
           </a:p>
@@ -1923,7 +1923,7 @@
           <a:p>
             <a:fld id="{C460AE39-2092-A945-8296-F25085B9A0F1}" type="datetime2">
               <a:rPr lang="en-US" smtClean="0"/>
-              <a:t>Monday, September 8, 14</a:t>
+              <a:t>Tuesday, September 9, 14</a:t>
             </a:fld>
             <a:endParaRPr lang="en-US"/>
           </a:p>
@@ -2104,7 +2104,7 @@
           <a:p>
             <a:fld id="{63BC7E9D-3218-5E49-A867-E087AB2F4618}" type="datetime2">
               <a:rPr lang="en-US" smtClean="0"/>
-              <a:t>Monday, September 8, 14</a:t>
+              <a:t>Tuesday, September 9, 14</a:t>
             </a:fld>
             <a:endParaRPr lang="en-US"/>
           </a:p>
@@ -2275,7 +2275,7 @@
           <a:p>
             <a:fld id="{34621E95-60A9-FF44-9869-513D9D7A859F}" type="datetime2">
               <a:rPr lang="en-US" smtClean="0"/>
-              <a:t>Monday, September 8, 14</a:t>
+              <a:t>Tuesday, September 9, 14</a:t>
             </a:fld>
             <a:endParaRPr lang="en-US"/>
           </a:p>
@@ -2394,7 +2394,7 @@
           <a:p>
             <a:fld id="{BD5AFB16-13FE-DF4A-8CB7-09756A57B2EA}" type="datetime2">
               <a:rPr lang="en-US" smtClean="0"/>
-              <a:t>Monday, September 8, 14</a:t>
+              <a:t>Tuesday, September 9, 14</a:t>
             </a:fld>
             <a:endParaRPr lang="en-US" dirty="0"/>
           </a:p>
@@ -2881,7 +2881,7 @@
           <a:p>
             <a:fld id="{1BDEC705-8EA9-6C46-8E3B-2CAC7E2C0F7D}" type="datetime2">
               <a:rPr lang="en-US" smtClean="0"/>
-              <a:t>Monday, September 8, 14</a:t>
+              <a:t>Tuesday, September 9, 14</a:t>
             </a:fld>
             <a:endParaRPr lang="en-US"/>
           </a:p>
@@ -3212,7 +3212,7 @@
           <a:p>
             <a:fld id="{BF613BD3-C5FD-9543-B738-679BF38D8C83}" type="datetime2">
               <a:rPr lang="en-US" smtClean="0"/>
-              <a:t>Monday, September 8, 14</a:t>
+              <a:t>Tuesday, September 9, 14</a:t>
             </a:fld>
             <a:endParaRPr lang="en-US" dirty="0"/>
           </a:p>
@@ -3691,7 +3691,7 @@
           <a:p>
             <a:fld id="{4B5E4F0C-9A9C-5448-99FD-D30288B385C9}" type="datetime2">
               <a:rPr lang="en-US" smtClean="0"/>
-              <a:t>Monday, September 8, 14</a:t>
+              <a:t>Tuesday, September 9, 14</a:t>
             </a:fld>
             <a:endParaRPr lang="en-US"/>
           </a:p>
@@ -3987,7 +3987,7 @@
           <a:p>
             <a:fld id="{30545249-FD76-6844-B252-CAB05FC2DAA8}" type="datetime2">
               <a:rPr lang="en-US" smtClean="0"/>
-              <a:t>Monday, September 8, 14</a:t>
+              <a:t>Tuesday, September 9, 14</a:t>
             </a:fld>
             <a:endParaRPr lang="en-US" dirty="0"/>
           </a:p>
@@ -4231,7 +4231,7 @@
           <a:p>
             <a:fld id="{CC859171-EEDD-0B48-A5C0-E7218AE20EA7}" type="datetime2">
               <a:rPr lang="en-US" smtClean="0"/>
-              <a:t>Monday, September 8, 14</a:t>
+              <a:t>Tuesday, September 9, 14</a:t>
             </a:fld>
             <a:endParaRPr lang="en-US"/>
           </a:p>
@@ -4327,7 +4327,7 @@
           <a:p>
             <a:fld id="{C32F9216-0342-7440-9504-BD6C1382BF27}" type="datetime2">
               <a:rPr lang="en-US" smtClean="0"/>
-              <a:t>Monday, September 8, 14</a:t>
+              <a:t>Tuesday, September 9, 14</a:t>
             </a:fld>
             <a:endParaRPr lang="en-US"/>
           </a:p>
@@ -4598,7 +4598,7 @@
           <a:p>
             <a:fld id="{D36DC8F2-AD63-E841-8C23-5DC3A41041BE}" type="datetime2">
               <a:rPr lang="en-US" smtClean="0"/>
-              <a:t>Monday, September 8, 14</a:t>
+              <a:t>Tuesday, September 9, 14</a:t>
             </a:fld>
             <a:endParaRPr lang="en-US" dirty="0"/>
           </a:p>
@@ -5317,7 +5317,7 @@
           <a:p>
             <a:fld id="{7DCE861A-EA6B-EA43-8AA5-DB216DBB40BC}" type="datetime2">
               <a:rPr lang="en-US" smtClean="0"/>
-              <a:t>Monday, September 8, 14</a:t>
+              <a:t>Tuesday, September 9, 14</a:t>
             </a:fld>
             <a:endParaRPr lang="en-US"/>
           </a:p>
@@ -5672,7 +5672,7 @@
           <a:p>
             <a:fld id="{34621E95-60A9-FF44-9869-513D9D7A859F}" type="datetime2">
               <a:rPr lang="en-US" smtClean="0"/>
-              <a:t>Monday, September 8, 14</a:t>
+              <a:t>Tuesday, September 9, 14</a:t>
             </a:fld>
             <a:endParaRPr lang="en-US"/>
           </a:p>
@@ -5820,8 +5820,13 @@
             </a:r>
             <a:r>
               <a:rPr lang="en-US" dirty="0"/>
-              <a:t>: because Particles move.</a:t>
-            </a:r>
+              <a:t>: because Particles </a:t>
+            </a:r>
+            <a:r>
+              <a:rPr lang="en-US" dirty="0" smtClean="0"/>
+              <a:t>move</a:t>
+            </a:r>
+            <a:endParaRPr lang="en-US" dirty="0"/>
           </a:p>
           <a:p>
             <a:pPr lvl="2"/>
@@ -5896,7 +5901,7 @@
           <a:p>
             <a:fld id="{34621E95-60A9-FF44-9869-513D9D7A859F}" type="datetime2">
               <a:rPr lang="en-US" smtClean="0"/>
-              <a:t>Monday, September 8, 14</a:t>
+              <a:t>Tuesday, September 9, 14</a:t>
             </a:fld>
             <a:endParaRPr lang="en-US"/>
           </a:p>
@@ -6168,7 +6173,7 @@
           <a:p>
             <a:fld id="{34621E95-60A9-FF44-9869-513D9D7A859F}" type="datetime2">
               <a:rPr lang="en-US" smtClean="0"/>
-              <a:t>Monday, September 8, 14</a:t>
+              <a:t>Tuesday, September 9, 14</a:t>
             </a:fld>
             <a:endParaRPr lang="en-US"/>
           </a:p>
@@ -6311,15 +6316,11 @@
           <a:p>
             <a:r>
               <a:rPr lang="en-US" dirty="0" smtClean="0"/>
-              <a:t>Processor </a:t>
-            </a:r>
-            <a:r>
-              <a:rPr lang="en-US" dirty="0" err="1"/>
-              <a:t>dont</a:t>
-            </a:r>
-            <a:r>
-              <a:rPr lang="en-US" dirty="0"/>
-              <a:t> need to be a power of 2:</a:t>
+              <a:t>Processors don’t </a:t>
+            </a:r>
+            <a:r>
+              <a:rPr lang="en-US" dirty="0"/>
+              <a:t>need to be a power of 2:</a:t>
             </a:r>
           </a:p>
           <a:p>
@@ -6454,7 +6455,7 @@
           <a:p>
             <a:fld id="{34621E95-60A9-FF44-9869-513D9D7A859F}" type="datetime2">
               <a:rPr lang="en-US" smtClean="0"/>
-              <a:t>Monday, September 8, 14</a:t>
+              <a:t>Tuesday, September 9, 14</a:t>
             </a:fld>
             <a:endParaRPr lang="en-US"/>
           </a:p>
@@ -6697,7 +6698,7 @@
           <a:p>
             <a:fld id="{34621E95-60A9-FF44-9869-513D9D7A859F}" type="datetime2">
               <a:rPr lang="en-US" smtClean="0"/>
-              <a:t>Monday, September 8, 14</a:t>
+              <a:t>Tuesday, September 9, 14</a:t>
             </a:fld>
             <a:endParaRPr lang="en-US"/>
           </a:p>
@@ -6901,74 +6902,71 @@
             </a:r>
             <a:r>
               <a:rPr lang="en-US" dirty="0"/>
-              <a:t>each step:</a:t>
+              <a:t>each </a:t>
+            </a:r>
+            <a:r>
+              <a:rPr lang="en-US" dirty="0" smtClean="0"/>
+              <a:t>step: assign </a:t>
+            </a:r>
+            <a:r>
+              <a:rPr lang="en-US" dirty="0"/>
+              <a:t>the heaviest remaining object to the least loaded processor</a:t>
+            </a:r>
+          </a:p>
+          <a:p>
+            <a:pPr lvl="1"/>
+            <a:r>
+              <a:rPr lang="en-US" dirty="0" smtClean="0"/>
+              <a:t>With </a:t>
+            </a:r>
+            <a:r>
+              <a:rPr lang="en-US" dirty="0"/>
+              <a:t>small-to-moderate communication cost:</a:t>
             </a:r>
           </a:p>
           <a:p>
             <a:pPr lvl="2"/>
             <a:r>
               <a:rPr lang="en-US" dirty="0" smtClean="0"/>
-              <a:t>assign </a:t>
-            </a:r>
-            <a:r>
-              <a:rPr lang="en-US" dirty="0"/>
-              <a:t>the heaviest remaining object to the least loaded processor</a:t>
-            </a:r>
+              <a:t>Same </a:t>
+            </a:r>
+            <a:r>
+              <a:rPr lang="en-US" dirty="0"/>
+              <a:t>strategy, but add communication costs as you add an object to </a:t>
+            </a:r>
+            <a:r>
+              <a:rPr lang="en-US" dirty="0" smtClean="0"/>
+              <a:t>a processor</a:t>
+            </a:r>
+            <a:endParaRPr lang="en-US" dirty="0"/>
           </a:p>
           <a:p>
             <a:pPr lvl="1"/>
             <a:r>
               <a:rPr lang="en-US" dirty="0" smtClean="0"/>
-              <a:t>With </a:t>
-            </a:r>
-            <a:r>
-              <a:rPr lang="en-US" dirty="0"/>
-              <a:t>small-to-moderate communication cost:</a:t>
+              <a:t>Always </a:t>
+            </a:r>
+            <a:r>
+              <a:rPr lang="en-US" dirty="0"/>
+              <a:t>add a refinement step at the end:</a:t>
             </a:r>
           </a:p>
           <a:p>
             <a:pPr lvl="2"/>
             <a:r>
               <a:rPr lang="en-US" dirty="0" smtClean="0"/>
-              <a:t>Same </a:t>
-            </a:r>
-            <a:r>
-              <a:rPr lang="en-US" dirty="0"/>
-              <a:t>strategy, but add communication costs as you add an object to </a:t>
-            </a:r>
-            <a:r>
-              <a:rPr lang="en-US" dirty="0" smtClean="0"/>
-              <a:t>a processor</a:t>
-            </a:r>
-            <a:endParaRPr lang="en-US" dirty="0"/>
-          </a:p>
-          <a:p>
-            <a:pPr lvl="1"/>
-            <a:r>
-              <a:rPr lang="en-US" dirty="0" smtClean="0"/>
-              <a:t>Always </a:t>
-            </a:r>
-            <a:r>
-              <a:rPr lang="en-US" dirty="0"/>
-              <a:t>add a refinement step at the end:</a:t>
-            </a:r>
+              <a:t>Swap </a:t>
+            </a:r>
+            <a:r>
+              <a:rPr lang="en-US" dirty="0"/>
+              <a:t>work from heaviest loaded processor to “some other processor” </a:t>
+            </a:r>
+            <a:endParaRPr lang="en-US" dirty="0" smtClean="0"/>
           </a:p>
           <a:p>
             <a:pPr lvl="2"/>
             <a:r>
               <a:rPr lang="en-US" dirty="0" smtClean="0"/>
-              <a:t>Swap </a:t>
-            </a:r>
-            <a:r>
-              <a:rPr lang="en-US" dirty="0"/>
-              <a:t>work from heaviest loaded processor to “some other processor” </a:t>
-            </a:r>
-            <a:endParaRPr lang="en-US" dirty="0" smtClean="0"/>
-          </a:p>
-          <a:p>
-            <a:pPr lvl="2"/>
-            <a:r>
-              <a:rPr lang="en-US" dirty="0" smtClean="0"/>
               <a:t>Repeat </a:t>
             </a:r>
             <a:r>
@@ -6995,7 +6993,7 @@
           <a:p>
             <a:fld id="{34621E95-60A9-FF44-9869-513D9D7A859F}" type="datetime2">
               <a:rPr lang="en-US" smtClean="0"/>
-              <a:t>Monday, September 8, 14</a:t>
+              <a:t>Tuesday, September 9, 14</a:t>
             </a:fld>
             <a:endParaRPr lang="en-US"/>
           </a:p>
@@ -7234,7 +7232,7 @@
           <a:p>
             <a:fld id="{34621E95-60A9-FF44-9869-513D9D7A859F}" type="datetime2">
               <a:rPr lang="en-US" smtClean="0"/>
-              <a:t>Monday, September 8, 14</a:t>
+              <a:t>Tuesday, September 9, 14</a:t>
             </a:fld>
             <a:endParaRPr lang="en-US"/>
           </a:p>
@@ -7368,12 +7366,16 @@
               <a:t>Decomposition into 16 chunks (left) and 128 chunks, 8 for each PE (right). The middle area contains cohesive elements. Both decompositions obtained using Metis. Pictures: S. </a:t>
             </a:r>
             <a:r>
-              <a:rPr lang="en-US" sz="2000" dirty="0" err="1"/>
+              <a:rPr lang="en-US" sz="2000" dirty="0" err="1" smtClean="0"/>
               <a:t>Breitenfeld</a:t>
             </a:r>
             <a:r>
+              <a:rPr lang="en-US" sz="2000" dirty="0" smtClean="0"/>
+              <a:t> </a:t>
+            </a:r>
+            <a:r>
               <a:rPr lang="en-US" sz="2000" dirty="0"/>
-              <a:t>, and P. </a:t>
+              <a:t>and P. </a:t>
             </a:r>
             <a:r>
               <a:rPr lang="en-US" sz="2000" dirty="0" err="1"/>
@@ -7417,7 +7419,7 @@
           <a:p>
             <a:fld id="{34621E95-60A9-FF44-9869-513D9D7A859F}" type="datetime2">
               <a:rPr lang="en-US" smtClean="0"/>
-              <a:t>Monday, September 8, 14</a:t>
+              <a:t>Tuesday, September 9, 14</a:t>
             </a:fld>
             <a:endParaRPr lang="en-US"/>
           </a:p>
@@ -7523,7 +7525,7 @@
         </p:blipFill>
         <p:spPr>
           <a:xfrm>
-            <a:off x="5437411" y="678664"/>
+            <a:off x="5437411" y="678666"/>
             <a:ext cx="3249389" cy="3888089"/>
           </a:xfrm>
           <a:prstGeom prst="rect">
@@ -7541,6 +7543,13 @@
   <p:clrMapOvr>
     <a:masterClrMapping/>
   </p:clrMapOvr>
+  <p:timing>
+    <p:tnLst>
+      <p:par>
+        <p:cTn xmlns:p14="http://schemas.microsoft.com/office/powerpoint/2010/main" id="1" dur="indefinite" restart="never" nodeType="tmRoot"/>
+      </p:par>
+    </p:tnLst>
+  </p:timing>
 </p:sld>
 </file>
 
@@ -7627,7 +7636,7 @@
           <a:p>
             <a:fld id="{34621E95-60A9-FF44-9869-513D9D7A859F}" type="datetime2">
               <a:rPr lang="en-US" smtClean="0"/>
-              <a:t>Monday, September 8, 14</a:t>
+              <a:t>Tuesday, September 9, 14</a:t>
             </a:fld>
             <a:endParaRPr lang="en-US"/>
           </a:p>
@@ -7691,6 +7700,13 @@
   <p:clrMapOvr>
     <a:masterClrMapping/>
   </p:clrMapOvr>
+  <p:timing>
+    <p:tnLst>
+      <p:par>
+        <p:cTn xmlns:p14="http://schemas.microsoft.com/office/powerpoint/2010/main" id="1" dur="indefinite" restart="never" nodeType="tmRoot"/>
+      </p:par>
+    </p:tnLst>
+  </p:timing>
 </p:sld>
 </file>
 
@@ -7913,7 +7929,7 @@
           <a:p>
             <a:fld id="{34621E95-60A9-FF44-9869-513D9D7A859F}" type="datetime2">
               <a:rPr lang="en-US" smtClean="0"/>
-              <a:t>Monday, September 8, 14</a:t>
+              <a:t>Tuesday, September 9, 14</a:t>
             </a:fld>
             <a:endParaRPr lang="en-US"/>
           </a:p>
@@ -7977,11 +7993,18 @@
   <p:clrMapOvr>
     <a:masterClrMapping/>
   </p:clrMapOvr>
+  <p:timing>
+    <p:tnLst>
+      <p:par>
+        <p:cTn xmlns:p14="http://schemas.microsoft.com/office/powerpoint/2010/main" id="1" dur="indefinite" restart="never" nodeType="tmRoot"/>
+      </p:par>
+    </p:tnLst>
+  </p:timing>
 </p:sld>
 </file>
 
 <file path=ppt/slides/slide2.xml><?xml version="1.0" encoding="utf-8"?>
-<p:sld xmlns:a="http://schemas.openxmlformats.org/drawingml/2006/main" xmlns:r="http://schemas.openxmlformats.org/officeDocument/2006/relationships" xmlns:p="http://schemas.openxmlformats.org/presentationml/2006/main">
+<p:sld xmlns:a="http://schemas.openxmlformats.org/drawingml/2006/main" xmlns:r="http://schemas.openxmlformats.org/officeDocument/2006/relationships" xmlns:p="http://schemas.openxmlformats.org/presentationml/2006/main" show="0">
   <p:cSld>
     <p:spTree>
       <p:nvGrpSpPr>
@@ -8014,7 +8037,7 @@
           <a:p>
             <a:fld id="{C32F9216-0342-7440-9504-BD6C1382BF27}" type="datetime2">
               <a:rPr lang="en-US" smtClean="0"/>
-              <a:t>Monday, September 8, 14</a:t>
+              <a:t>Tuesday, September 9, 14</a:t>
             </a:fld>
             <a:endParaRPr lang="en-US"/>
           </a:p>
@@ -8108,6 +8131,14 @@
   <p:clrMapOvr>
     <a:masterClrMapping/>
   </p:clrMapOvr>
+  <mc:AlternateContent xmlns:mc="http://schemas.openxmlformats.org/markup-compatibility/2006">
+    <mc:Choice xmlns:p14="http://schemas.microsoft.com/office/powerpoint/2010/main" Requires="p14">
+      <p:transition spd="slow" p14:dur="2000"/>
+    </mc:Choice>
+    <mc:Fallback>
+      <p:transition xmlns:p14="http://schemas.microsoft.com/office/powerpoint/2010/main" spd="slow"/>
+    </mc:Fallback>
+  </mc:AlternateContent>
 </p:sld>
 </file>
 
@@ -8172,12 +8203,12 @@
               <a:t>Centralized load balancing strategies </a:t>
             </a:r>
             <a:r>
-              <a:rPr lang="en-US" dirty="0" err="1"/>
-              <a:t>dont</a:t>
-            </a:r>
-            <a:r>
-              <a:rPr lang="en-US" dirty="0"/>
-              <a:t> scale on extremely large machines</a:t>
+              <a:rPr lang="en-US" dirty="0" smtClean="0"/>
+              <a:t>don’t </a:t>
+            </a:r>
+            <a:r>
+              <a:rPr lang="en-US" dirty="0"/>
+              <a:t>scale on extremely large machines</a:t>
             </a:r>
           </a:p>
           <a:p>
@@ -8242,7 +8273,7 @@
           <a:p>
             <a:fld id="{34621E95-60A9-FF44-9869-513D9D7A859F}" type="datetime2">
               <a:rPr lang="en-US" smtClean="0"/>
-              <a:t>Monday, September 8, 14</a:t>
+              <a:t>Tuesday, September 9, 14</a:t>
             </a:fld>
             <a:endParaRPr lang="en-US"/>
           </a:p>
@@ -8406,7 +8437,7 @@
           <a:p>
             <a:fld id="{34621E95-60A9-FF44-9869-513D9D7A859F}" type="datetime2">
               <a:rPr lang="en-US" smtClean="0"/>
-              <a:t>Monday, September 8, 14</a:t>
+              <a:t>Tuesday, September 9, 14</a:t>
             </a:fld>
             <a:endParaRPr lang="en-US"/>
           </a:p>
@@ -8556,7 +8587,7 @@
           <a:p>
             <a:fld id="{34621E95-60A9-FF44-9869-513D9D7A859F}" type="datetime2">
               <a:rPr lang="en-US" smtClean="0"/>
-              <a:t>Monday, September 8, 14</a:t>
+              <a:t>Tuesday, September 9, 14</a:t>
             </a:fld>
             <a:endParaRPr lang="en-US"/>
           </a:p>
@@ -8783,7 +8814,7 @@
           <a:p>
             <a:fld id="{34621E95-60A9-FF44-9869-513D9D7A859F}" type="datetime2">
               <a:rPr lang="en-US" smtClean="0"/>
-              <a:t>Monday, September 8, 14</a:t>
+              <a:t>Tuesday, September 9, 14</a:t>
             </a:fld>
             <a:endParaRPr lang="en-US"/>
           </a:p>
@@ -8947,7 +8978,7 @@
           <a:p>
             <a:fld id="{34621E95-60A9-FF44-9869-513D9D7A859F}" type="datetime2">
               <a:rPr lang="en-US" smtClean="0"/>
-              <a:t>Monday, September 8, 14</a:t>
+              <a:t>Tuesday, September 9, 14</a:t>
             </a:fld>
             <a:endParaRPr lang="en-US"/>
           </a:p>
@@ -9168,7 +9199,7 @@
           <a:p>
             <a:fld id="{34621E95-60A9-FF44-9869-513D9D7A859F}" type="datetime2">
               <a:rPr lang="en-US" smtClean="0"/>
-              <a:t>Monday, September 8, 14</a:t>
+              <a:t>Tuesday, September 9, 14</a:t>
             </a:fld>
             <a:endParaRPr lang="en-US"/>
           </a:p>
@@ -9318,7 +9349,7 @@
           <a:p>
             <a:fld id="{34621E95-60A9-FF44-9869-513D9D7A859F}" type="datetime2">
               <a:rPr lang="en-US" smtClean="0"/>
-              <a:t>Monday, September 8, 14</a:t>
+              <a:t>Tuesday, September 9, 14</a:t>
             </a:fld>
             <a:endParaRPr lang="en-US"/>
           </a:p>
@@ -9461,7 +9492,7 @@
                 <a:latin typeface="Lucida Console"/>
                 <a:cs typeface="Lucida Console"/>
               </a:rPr>
-              <a:t>if (</a:t>
+              <a:t>if(</a:t>
             </a:r>
             <a:r>
               <a:rPr lang="en-US" dirty="0" err="1" smtClean="0">
@@ -9475,7 +9506,14 @@
                 <a:latin typeface="Lucida Console"/>
                 <a:cs typeface="Lucida Console"/>
               </a:rPr>
-              <a:t>) At Sync(); </a:t>
+              <a:t>) At Sync();</a:t>
+            </a:r>
+            <a:r>
+              <a:rPr lang="en-US" dirty="0" smtClean="0">
+                <a:latin typeface="+mn-lt"/>
+                <a:cs typeface="Lucida Console"/>
+              </a:rPr>
+              <a:t> </a:t>
             </a:r>
             <a:r>
               <a:rPr lang="en-US" dirty="0" smtClean="0"/>
@@ -9503,7 +9541,14 @@
                 <a:latin typeface="Lucida Console"/>
                 <a:cs typeface="Lucida Console"/>
               </a:rPr>
-              <a:t>() </a:t>
+              <a:t>()</a:t>
+            </a:r>
+            <a:r>
+              <a:rPr lang="en-US" dirty="0" smtClean="0">
+                <a:latin typeface="+mn-lt"/>
+                <a:cs typeface="Lucida Console"/>
+              </a:rPr>
+              <a:t> </a:t>
             </a:r>
             <a:r>
               <a:rPr lang="en-US" dirty="0" smtClean="0"/>
@@ -9552,7 +9597,7 @@
           <a:p>
             <a:fld id="{34621E95-60A9-FF44-9869-513D9D7A859F}" type="datetime2">
               <a:rPr lang="en-US" smtClean="0"/>
-              <a:t>Monday, September 8, 14</a:t>
+              <a:t>Tuesday, September 9, 14</a:t>
             </a:fld>
             <a:endParaRPr lang="en-US"/>
           </a:p>
@@ -9753,7 +9798,34 @@
                 <a:latin typeface="Lucida Console"/>
                 <a:cs typeface="Lucida Console"/>
               </a:rPr>
-              <a:t>-</a:t>
+              <a:t>-balancer </a:t>
+            </a:r>
+            <a:r>
+              <a:rPr lang="en-US" dirty="0" err="1" smtClean="0">
+                <a:latin typeface="Lucida Console"/>
+                <a:cs typeface="Lucida Console"/>
+              </a:rPr>
+              <a:t>RefineLB</a:t>
+            </a:r>
+            <a:endParaRPr lang="en-US" dirty="0">
+              <a:latin typeface="Lucida Console"/>
+              <a:cs typeface="Lucida Console"/>
+            </a:endParaRPr>
+          </a:p>
+          <a:p>
+            <a:r>
+              <a:rPr lang="en-US" dirty="0"/>
+              <a:t>runtime option</a:t>
+            </a:r>
+          </a:p>
+          <a:p>
+            <a:pPr lvl="1"/>
+            <a:r>
+              <a:rPr lang="en-US" dirty="0" smtClean="0">
+                <a:latin typeface="Lucida Console"/>
+                <a:cs typeface="Lucida Console"/>
+              </a:rPr>
+              <a:t>+</a:t>
             </a:r>
             <a:r>
               <a:rPr lang="en-US" dirty="0">
@@ -9774,34 +9846,6 @@
               <a:cs typeface="Lucida Console"/>
             </a:endParaRPr>
           </a:p>
-          <a:p>
-            <a:pPr lvl="1"/>
-            <a:r>
-              <a:rPr lang="en-US" dirty="0"/>
-              <a:t>runtime option</a:t>
-            </a:r>
-          </a:p>
-          <a:p>
-            <a:pPr lvl="1"/>
-            <a:r>
-              <a:rPr lang="en-US" dirty="0">
-                <a:latin typeface="Lucida Console"/>
-                <a:cs typeface="Lucida Console"/>
-              </a:rPr>
-              <a:t> +balancer </a:t>
-            </a:r>
-            <a:r>
-              <a:rPr lang="en-US" dirty="0" err="1">
-                <a:latin typeface="Lucida Console"/>
-                <a:cs typeface="Lucida Console"/>
-              </a:rPr>
-              <a:t>RefineLB</a:t>
-            </a:r>
-            <a:endParaRPr lang="en-US" dirty="0">
-              <a:latin typeface="Lucida Console"/>
-              <a:cs typeface="Lucida Console"/>
-            </a:endParaRPr>
-          </a:p>
         </p:txBody>
       </p:sp>
       <p:sp>
@@ -9821,7 +9865,7 @@
           <a:p>
             <a:fld id="{34621E95-60A9-FF44-9869-513D9D7A859F}" type="datetime2">
               <a:rPr lang="en-US" smtClean="0"/>
-              <a:t>Monday, September 8, 14</a:t>
+              <a:t>Tuesday, September 9, 14</a:t>
             </a:fld>
             <a:endParaRPr lang="en-US"/>
           </a:p>
@@ -10084,15 +10128,15 @@
             </a:r>
             <a:r>
               <a:rPr lang="en-US" dirty="0"/>
-              <a:t>(x1),</a:t>
-            </a:r>
-            <a:r>
-              <a:rPr lang="en-US" dirty="0" err="1"/>
-              <a:t>y,z</a:t>
-            </a:r>
-            <a:r>
-              <a:rPr lang="en-US" dirty="0"/>
-              <a:t>).</a:t>
+              <a:t>(</a:t>
+            </a:r>
+            <a:r>
+              <a:rPr lang="en-US" dirty="0" smtClean="0"/>
+              <a:t>x - 1), y, z)</a:t>
+            </a:r>
+            <a:r>
+              <a:rPr lang="en-US" dirty="0"/>
+              <a:t>.</a:t>
             </a:r>
             <a:r>
               <a:rPr lang="en-US" dirty="0" err="1"/>
@@ -10168,15 +10212,27 @@
             </a:r>
             <a:r>
               <a:rPr lang="en-US" dirty="0"/>
+              <a:t>(x</a:t>
+            </a:r>
+            <a:r>
+              <a:rPr lang="en-US" dirty="0" smtClean="0"/>
+              <a:t>, y, </a:t>
+            </a:r>
+            <a:r>
+              <a:rPr lang="en-US" dirty="0" err="1" smtClean="0"/>
+              <a:t>wrapZ</a:t>
+            </a:r>
+            <a:r>
+              <a:rPr lang="en-US" dirty="0"/>
               <a:t>(</a:t>
             </a:r>
             <a:r>
-              <a:rPr lang="en-US" dirty="0" err="1"/>
-              <a:t>x,y,wrapZ</a:t>
-            </a:r>
-            <a:r>
-              <a:rPr lang="en-US" dirty="0"/>
-              <a:t>(z+1)).</a:t>
+              <a:rPr lang="en-US" dirty="0" smtClean="0"/>
+              <a:t>z + 1</a:t>
+            </a:r>
+            <a:r>
+              <a:rPr lang="en-US" dirty="0"/>
+              <a:t>)).</a:t>
             </a:r>
             <a:r>
               <a:rPr lang="en-US" dirty="0" err="1"/>
@@ -10505,8 +10561,20 @@
               <a:t>if </a:t>
             </a:r>
             <a:r>
-              <a:rPr lang="en-US" dirty="0"/>
-              <a:t>(i%5 == 1) contribute(</a:t>
+              <a:rPr lang="en-US" dirty="0" smtClean="0"/>
+              <a:t>(</a:t>
+            </a:r>
+            <a:r>
+              <a:rPr lang="en-US" dirty="0" err="1" smtClean="0"/>
+              <a:t>i</a:t>
+            </a:r>
+            <a:r>
+              <a:rPr lang="en-US" dirty="0" smtClean="0"/>
+              <a:t> % 5 </a:t>
+            </a:r>
+            <a:r>
+              <a:rPr lang="en-US" dirty="0"/>
+              <a:t>== 1) contribute(</a:t>
             </a:r>
             <a:r>
               <a:rPr lang="en-US" b="1" dirty="0" err="1"/>
@@ -10522,7 +10590,15 @@
             </a:r>
             <a:r>
               <a:rPr lang="en-US" dirty="0"/>
-              <a:t>), \&amp;c, </a:t>
+              <a:t>), </a:t>
+            </a:r>
+            <a:r>
+              <a:rPr lang="en-US" dirty="0" smtClean="0"/>
+              <a:t>&amp;</a:t>
+            </a:r>
+            <a:r>
+              <a:rPr lang="en-US" dirty="0"/>
+              <a:t>c, </a:t>
             </a:r>
             <a:r>
               <a:rPr lang="en-US" dirty="0" err="1"/>
@@ -10530,7 +10606,15 @@
             </a:r>
             <a:r>
               <a:rPr lang="en-US" dirty="0"/>
-              <a:t>::logical and, </a:t>
+              <a:t>::</a:t>
+            </a:r>
+            <a:r>
+              <a:rPr lang="en-US" dirty="0" err="1" smtClean="0"/>
+              <a:t>logical_and</a:t>
+            </a:r>
+            <a:r>
+              <a:rPr lang="en-US" dirty="0"/>
+              <a:t>, </a:t>
             </a:r>
             <a:r>
               <a:rPr lang="en-US" dirty="0" err="1"/>
@@ -10664,12 +10748,20 @@
               <a:t>(</a:t>
             </a:r>
             <a:r>
-              <a:rPr lang="en-US" dirty="0" err="1"/>
+              <a:rPr lang="en-US" b="1" dirty="0" err="1"/>
               <a:t>bool</a:t>
             </a:r>
             <a:r>
               <a:rPr lang="en-US" dirty="0"/>
-              <a:t> result) serial { </a:t>
+              <a:t> result) </a:t>
+            </a:r>
+            <a:r>
+              <a:rPr lang="en-US" b="1" dirty="0"/>
+              <a:t>serial</a:t>
+            </a:r>
+            <a:r>
+              <a:rPr lang="en-US" dirty="0"/>
+              <a:t> { </a:t>
             </a:r>
           </a:p>
           <a:p>
@@ -10763,7 +10855,7 @@
           <a:p>
             <a:fld id="{34621E95-60A9-FF44-9869-513D9D7A859F}" type="datetime2">
               <a:rPr lang="en-US" smtClean="0"/>
-              <a:t>Monday, September 8, 14</a:t>
+              <a:t>Tuesday, September 9, 14</a:t>
             </a:fld>
             <a:endParaRPr lang="en-US"/>
           </a:p>
@@ -10827,6 +10919,13 @@
   <p:clrMapOvr>
     <a:masterClrMapping/>
   </p:clrMapOvr>
+  <p:timing>
+    <p:tnLst>
+      <p:par>
+        <p:cTn xmlns:p14="http://schemas.microsoft.com/office/powerpoint/2010/main" id="1" dur="indefinite" restart="never" nodeType="tmRoot"/>
+      </p:par>
+    </p:tnLst>
+  </p:timing>
 </p:sld>
 </file>
 
@@ -10984,7 +11083,7 @@
           <a:p>
             <a:fld id="{34621E95-60A9-FF44-9869-513D9D7A859F}" type="datetime2">
               <a:rPr lang="en-US" smtClean="0"/>
-              <a:t>Monday, September 8, 14</a:t>
+              <a:t>Tuesday, September 9, 14</a:t>
             </a:fld>
             <a:endParaRPr lang="en-US"/>
           </a:p>
@@ -11048,6 +11147,13 @@
   <p:clrMapOvr>
     <a:masterClrMapping/>
   </p:clrMapOvr>
+  <p:timing>
+    <p:tnLst>
+      <p:par>
+        <p:cTn xmlns:p14="http://schemas.microsoft.com/office/powerpoint/2010/main" id="1" dur="indefinite" restart="never" nodeType="tmRoot"/>
+      </p:par>
+    </p:tnLst>
+  </p:timing>
 </p:sld>
 </file>
 
@@ -11181,7 +11287,7 @@
           <a:p>
             <a:fld id="{34621E95-60A9-FF44-9869-513D9D7A859F}" type="datetime2">
               <a:rPr lang="en-US" smtClean="0"/>
-              <a:t>Monday, September 8, 14</a:t>
+              <a:t>Tuesday, September 9, 14</a:t>
             </a:fld>
             <a:endParaRPr lang="en-US"/>
           </a:p>
@@ -11245,6 +11351,13 @@
   <p:clrMapOvr>
     <a:masterClrMapping/>
   </p:clrMapOvr>
+  <p:timing>
+    <p:tnLst>
+      <p:par>
+        <p:cTn xmlns:p14="http://schemas.microsoft.com/office/powerpoint/2010/main" id="1" dur="indefinite" restart="never" nodeType="tmRoot"/>
+      </p:par>
+    </p:tnLst>
+  </p:timing>
 </p:sld>
 </file>
 

</xml_diff>

<commit_message>
tut 10: remove unnecessary slides
</commit_message>
<xml_diff>
--- a/tutorial-10-load_balancing.pptx
+++ b/tutorial-10-load_balancing.pptx
@@ -5,10 +5,10 @@
     <p:sldMasterId id="2147483974" r:id="rId1"/>
   </p:sldMasterIdLst>
   <p:notesMasterIdLst>
-    <p:notesMasterId r:id="rId25"/>
+    <p:notesMasterId r:id="rId22"/>
   </p:notesMasterIdLst>
   <p:handoutMasterIdLst>
-    <p:handoutMasterId r:id="rId26"/>
+    <p:handoutMasterId r:id="rId23"/>
   </p:handoutMasterIdLst>
   <p:sldIdLst>
     <p:sldId id="431" r:id="rId2"/>
@@ -18,22 +18,19 @@
     <p:sldId id="436" r:id="rId6"/>
     <p:sldId id="437" r:id="rId7"/>
     <p:sldId id="438" r:id="rId8"/>
-    <p:sldId id="439" r:id="rId9"/>
-    <p:sldId id="440" r:id="rId10"/>
-    <p:sldId id="441" r:id="rId11"/>
-    <p:sldId id="442" r:id="rId12"/>
-    <p:sldId id="443" r:id="rId13"/>
-    <p:sldId id="444" r:id="rId14"/>
-    <p:sldId id="445" r:id="rId15"/>
-    <p:sldId id="447" r:id="rId16"/>
-    <p:sldId id="448" r:id="rId17"/>
-    <p:sldId id="449" r:id="rId18"/>
-    <p:sldId id="450" r:id="rId19"/>
-    <p:sldId id="451" r:id="rId20"/>
-    <p:sldId id="452" r:id="rId21"/>
-    <p:sldId id="453" r:id="rId22"/>
-    <p:sldId id="454" r:id="rId23"/>
-    <p:sldId id="455" r:id="rId24"/>
+    <p:sldId id="440" r:id="rId9"/>
+    <p:sldId id="442" r:id="rId10"/>
+    <p:sldId id="444" r:id="rId11"/>
+    <p:sldId id="445" r:id="rId12"/>
+    <p:sldId id="447" r:id="rId13"/>
+    <p:sldId id="448" r:id="rId14"/>
+    <p:sldId id="449" r:id="rId15"/>
+    <p:sldId id="450" r:id="rId16"/>
+    <p:sldId id="451" r:id="rId17"/>
+    <p:sldId id="452" r:id="rId18"/>
+    <p:sldId id="453" r:id="rId19"/>
+    <p:sldId id="454" r:id="rId20"/>
+    <p:sldId id="455" r:id="rId21"/>
   </p:sldIdLst>
   <p:sldSz cx="9144000" cy="6858000" type="screen4x3"/>
   <p:notesSz cx="6858000" cy="9144000"/>
@@ -7045,7 +7042,7 @@
           <a:p>
             <a:r>
               <a:rPr lang="en-US" dirty="0"/>
-              <a:t>Dynamic Load Balancing Scenarios</a:t>
+              <a:t>Periodic Load Balancing</a:t>
             </a:r>
           </a:p>
         </p:txBody>
@@ -7062,888 +7059,7 @@
         </p:nvSpPr>
         <p:spPr/>
         <p:txBody>
-          <a:bodyPr>
-            <a:normAutofit/>
-          </a:bodyPr>
-          <a:lstStyle/>
-          <a:p>
-            <a:r>
-              <a:rPr lang="en-US" sz="2800" dirty="0"/>
-              <a:t>Examples representing typical classes of situations</a:t>
-            </a:r>
-          </a:p>
-          <a:p>
-            <a:pPr lvl="1"/>
-            <a:r>
-              <a:rPr lang="en-US" sz="2400" dirty="0" smtClean="0"/>
-              <a:t>Particles </a:t>
-            </a:r>
-            <a:r>
-              <a:rPr lang="en-US" sz="2400" dirty="0"/>
-              <a:t>distributed over simulation space </a:t>
-            </a:r>
-            <a:endParaRPr lang="en-US" sz="2400" dirty="0" smtClean="0"/>
-          </a:p>
-          <a:p>
-            <a:pPr lvl="2"/>
-            <a:r>
-              <a:rPr lang="en-US" sz="2000" dirty="0" smtClean="0"/>
-              <a:t>Dynamic</a:t>
-            </a:r>
-            <a:r>
-              <a:rPr lang="en-US" sz="2000" dirty="0"/>
-              <a:t>: because Particles </a:t>
-            </a:r>
-            <a:r>
-              <a:rPr lang="en-US" sz="2000" dirty="0" smtClean="0"/>
-              <a:t>move</a:t>
-            </a:r>
-            <a:endParaRPr lang="en-US" sz="2000" dirty="0"/>
-          </a:p>
-          <a:p>
-            <a:pPr lvl="2"/>
-            <a:r>
-              <a:rPr lang="en-US" sz="2000" dirty="0" smtClean="0"/>
-              <a:t>Cases:</a:t>
-            </a:r>
-          </a:p>
-          <a:p>
-            <a:pPr lvl="3"/>
-            <a:r>
-              <a:rPr lang="en-US" sz="1800" dirty="0" smtClean="0"/>
-              <a:t>Highly </a:t>
-            </a:r>
-            <a:r>
-              <a:rPr lang="en-US" sz="1800" dirty="0"/>
-              <a:t>non-uniform distribution (cosmology) </a:t>
-            </a:r>
-            <a:endParaRPr lang="en-US" sz="1800" dirty="0"/>
-          </a:p>
-          <a:p>
-            <a:pPr lvl="3"/>
-            <a:r>
-              <a:rPr lang="en-US" sz="1800" dirty="0" smtClean="0"/>
-              <a:t>Relatively </a:t>
-            </a:r>
-            <a:r>
-              <a:rPr lang="en-US" sz="1800" dirty="0"/>
-              <a:t>Uniform distribution</a:t>
-            </a:r>
-          </a:p>
-          <a:p>
-            <a:pPr lvl="1"/>
-            <a:r>
-              <a:rPr lang="en-US" sz="2400" dirty="0"/>
-              <a:t>Structured grids, with dynamic refinements/</a:t>
-            </a:r>
-            <a:r>
-              <a:rPr lang="en-US" sz="2400" dirty="0" smtClean="0"/>
-              <a:t>coarsening</a:t>
-            </a:r>
-          </a:p>
-          <a:p>
-            <a:pPr lvl="1"/>
-            <a:r>
-              <a:rPr lang="en-US" sz="2400" dirty="0" smtClean="0"/>
-              <a:t>Unstructured </a:t>
-            </a:r>
-            <a:r>
-              <a:rPr lang="en-US" sz="2400" dirty="0"/>
-              <a:t>grids with dynamic refinements/coarsening</a:t>
-            </a:r>
-          </a:p>
-        </p:txBody>
-      </p:sp>
-      <p:sp>
-        <p:nvSpPr>
-          <p:cNvPr id="5" name="Footer Placeholder 4"/>
-          <p:cNvSpPr>
-            <a:spLocks noGrp="1"/>
-          </p:cNvSpPr>
-          <p:nvPr>
-            <p:ph type="ftr" sz="quarter" idx="11"/>
-          </p:nvPr>
-        </p:nvSpPr>
-        <p:spPr/>
-        <p:txBody>
           <a:bodyPr/>
-          <a:lstStyle/>
-          <a:p>
-            <a:pPr algn="r"/>
-            <a:r>
-              <a:rPr lang="en-US" smtClean="0"/>
-              <a:t>Laxmikant Kalé and PPL (UIUC) – Parallel Migratable Objects </a:t>
-            </a:r>
-            <a:endParaRPr lang="en-US" dirty="0"/>
-          </a:p>
-        </p:txBody>
-      </p:sp>
-      <p:sp>
-        <p:nvSpPr>
-          <p:cNvPr id="6" name="Slide Number Placeholder 5"/>
-          <p:cNvSpPr>
-            <a:spLocks noGrp="1"/>
-          </p:cNvSpPr>
-          <p:nvPr>
-            <p:ph type="sldNum" sz="quarter" idx="12"/>
-          </p:nvPr>
-        </p:nvSpPr>
-        <p:spPr/>
-        <p:txBody>
-          <a:bodyPr/>
-          <a:lstStyle/>
-          <a:p>
-            <a:fld id="{0CFEC368-1D7A-4F81-ABF6-AE0E36BAF64C}" type="slidenum">
-              <a:rPr lang="en-US" smtClean="0"/>
-              <a:pPr/>
-              <a:t>10</a:t>
-            </a:fld>
-            <a:endParaRPr lang="en-US"/>
-          </a:p>
-        </p:txBody>
-      </p:sp>
-    </p:spTree>
-    <p:extLst>
-      <p:ext uri="{BB962C8B-B14F-4D97-AF65-F5344CB8AC3E}">
-        <p14:creationId xmlns:p14="http://schemas.microsoft.com/office/powerpoint/2010/main" val="1156008709"/>
-      </p:ext>
-    </p:extLst>
-  </p:cSld>
-  <p:clrMapOvr>
-    <a:masterClrMapping/>
-  </p:clrMapOvr>
-  <p:timing>
-    <p:tnLst>
-      <p:par>
-        <p:cTn xmlns:p14="http://schemas.microsoft.com/office/powerpoint/2010/main" id="1" dur="indefinite" restart="never" nodeType="tmRoot"/>
-      </p:par>
-    </p:tnLst>
-  </p:timing>
-</p:sld>
-</file>
-
-<file path=ppt/slides/slide11.xml><?xml version="1.0" encoding="utf-8"?>
-<p:sld xmlns:a="http://schemas.openxmlformats.org/drawingml/2006/main" xmlns:r="http://schemas.openxmlformats.org/officeDocument/2006/relationships" xmlns:p="http://schemas.openxmlformats.org/presentationml/2006/main">
-  <p:cSld>
-    <p:spTree>
-      <p:nvGrpSpPr>
-        <p:cNvPr id="1" name=""/>
-        <p:cNvGrpSpPr/>
-        <p:nvPr/>
-      </p:nvGrpSpPr>
-      <p:grpSpPr>
-        <a:xfrm>
-          <a:off x="0" y="0"/>
-          <a:ext cx="0" cy="0"/>
-          <a:chOff x="0" y="0"/>
-          <a:chExt cx="0" cy="0"/>
-        </a:xfrm>
-      </p:grpSpPr>
-      <p:sp>
-        <p:nvSpPr>
-          <p:cNvPr id="2" name="Title 1"/>
-          <p:cNvSpPr>
-            <a:spLocks noGrp="1"/>
-          </p:cNvSpPr>
-          <p:nvPr>
-            <p:ph type="title"/>
-          </p:nvPr>
-        </p:nvSpPr>
-        <p:spPr/>
-        <p:txBody>
-          <a:bodyPr>
-            <a:normAutofit/>
-          </a:bodyPr>
-          <a:lstStyle/>
-          <a:p>
-            <a:r>
-              <a:rPr lang="en-US" dirty="0"/>
-              <a:t>Load Balancing Strategies</a:t>
-            </a:r>
-          </a:p>
-        </p:txBody>
-      </p:sp>
-      <p:sp>
-        <p:nvSpPr>
-          <p:cNvPr id="3" name="Content Placeholder 2"/>
-          <p:cNvSpPr>
-            <a:spLocks noGrp="1"/>
-          </p:cNvSpPr>
-          <p:nvPr>
-            <p:ph idx="1"/>
-          </p:nvPr>
-        </p:nvSpPr>
-        <p:spPr/>
-        <p:txBody>
-          <a:bodyPr>
-            <a:normAutofit/>
-          </a:bodyPr>
-          <a:lstStyle/>
-          <a:p>
-            <a:r>
-              <a:rPr lang="en-US" dirty="0"/>
-              <a:t>Classified by when it is done:</a:t>
-            </a:r>
-          </a:p>
-          <a:p>
-            <a:pPr lvl="1"/>
-            <a:r>
-              <a:rPr lang="en-US" dirty="0" smtClean="0"/>
-              <a:t>Initially</a:t>
-            </a:r>
-            <a:endParaRPr lang="en-US" dirty="0"/>
-          </a:p>
-          <a:p>
-            <a:pPr lvl="1"/>
-            <a:r>
-              <a:rPr lang="en-US" dirty="0" smtClean="0"/>
-              <a:t>Dynamic</a:t>
-            </a:r>
-            <a:r>
-              <a:rPr lang="en-US" dirty="0"/>
-              <a:t>: Periodically </a:t>
-            </a:r>
-            <a:endParaRPr lang="en-US" dirty="0" smtClean="0"/>
-          </a:p>
-          <a:p>
-            <a:pPr lvl="1"/>
-            <a:r>
-              <a:rPr lang="en-US" dirty="0" smtClean="0"/>
-              <a:t>Dynamic</a:t>
-            </a:r>
-            <a:r>
-              <a:rPr lang="en-US" dirty="0"/>
-              <a:t>: Continuously</a:t>
-            </a:r>
-          </a:p>
-          <a:p>
-            <a:r>
-              <a:rPr lang="en-US" dirty="0"/>
-              <a:t>Classified by whether decisions are taken with global information</a:t>
-            </a:r>
-          </a:p>
-          <a:p>
-            <a:pPr lvl="1"/>
-            <a:r>
-              <a:rPr lang="en-US" dirty="0" smtClean="0"/>
-              <a:t>Fully </a:t>
-            </a:r>
-            <a:r>
-              <a:rPr lang="en-US" dirty="0"/>
-              <a:t>centralized</a:t>
-            </a:r>
-          </a:p>
-          <a:p>
-            <a:pPr lvl="2"/>
-            <a:r>
-              <a:rPr lang="en-US" dirty="0" smtClean="0"/>
-              <a:t>Quite </a:t>
-            </a:r>
-            <a:r>
-              <a:rPr lang="en-US" dirty="0" smtClean="0"/>
-              <a:t>a good </a:t>
-            </a:r>
-            <a:r>
-              <a:rPr lang="en-US" dirty="0"/>
-              <a:t>choice when load balancing period is high</a:t>
-            </a:r>
-          </a:p>
-          <a:p>
-            <a:pPr lvl="1"/>
-            <a:r>
-              <a:rPr lang="en-US" dirty="0" smtClean="0"/>
-              <a:t>Fully </a:t>
-            </a:r>
-            <a:r>
-              <a:rPr lang="en-US" dirty="0"/>
-              <a:t>distributed</a:t>
-            </a:r>
-          </a:p>
-          <a:p>
-            <a:pPr lvl="2"/>
-            <a:r>
-              <a:rPr lang="en-US" dirty="0" smtClean="0"/>
-              <a:t>Each </a:t>
-            </a:r>
-            <a:r>
-              <a:rPr lang="en-US" dirty="0"/>
-              <a:t>processor knows only about a constant number of neighbors</a:t>
-            </a:r>
-          </a:p>
-          <a:p>
-            <a:pPr lvl="2"/>
-            <a:r>
-              <a:rPr lang="en-US" dirty="0" smtClean="0"/>
-              <a:t>Extreme </a:t>
-            </a:r>
-            <a:r>
-              <a:rPr lang="en-US" dirty="0"/>
-              <a:t>case: totally local decision (send work to a random </a:t>
-            </a:r>
-            <a:r>
-              <a:rPr lang="en-US" dirty="0" smtClean="0"/>
-              <a:t>destination processor</a:t>
-            </a:r>
-            <a:r>
-              <a:rPr lang="en-US" dirty="0"/>
-              <a:t>, with some probability).</a:t>
-            </a:r>
-          </a:p>
-          <a:p>
-            <a:pPr lvl="1"/>
-            <a:r>
-              <a:rPr lang="en-US" dirty="0" smtClean="0"/>
-              <a:t>Use </a:t>
-            </a:r>
-            <a:r>
-              <a:rPr lang="en-US" i="1" dirty="0"/>
-              <a:t>aggregated</a:t>
-            </a:r>
-            <a:r>
-              <a:rPr lang="en-US" dirty="0"/>
-              <a:t> global information, and </a:t>
-            </a:r>
-            <a:r>
-              <a:rPr lang="en-US" i="1" dirty="0"/>
-              <a:t>detailed </a:t>
-            </a:r>
-            <a:r>
-              <a:rPr lang="en-US" dirty="0"/>
-              <a:t>neighborhood info.</a:t>
-            </a:r>
-          </a:p>
-        </p:txBody>
-      </p:sp>
-      <p:sp>
-        <p:nvSpPr>
-          <p:cNvPr id="5" name="Footer Placeholder 4"/>
-          <p:cNvSpPr>
-            <a:spLocks noGrp="1"/>
-          </p:cNvSpPr>
-          <p:nvPr>
-            <p:ph type="ftr" sz="quarter" idx="11"/>
-          </p:nvPr>
-        </p:nvSpPr>
-        <p:spPr/>
-        <p:txBody>
-          <a:bodyPr/>
-          <a:lstStyle/>
-          <a:p>
-            <a:pPr algn="r"/>
-            <a:r>
-              <a:rPr lang="en-US" smtClean="0"/>
-              <a:t>Laxmikant Kalé and PPL (UIUC) – Parallel Migratable Objects </a:t>
-            </a:r>
-            <a:endParaRPr lang="en-US" dirty="0"/>
-          </a:p>
-        </p:txBody>
-      </p:sp>
-      <p:sp>
-        <p:nvSpPr>
-          <p:cNvPr id="6" name="Slide Number Placeholder 5"/>
-          <p:cNvSpPr>
-            <a:spLocks noGrp="1"/>
-          </p:cNvSpPr>
-          <p:nvPr>
-            <p:ph type="sldNum" sz="quarter" idx="12"/>
-          </p:nvPr>
-        </p:nvSpPr>
-        <p:spPr/>
-        <p:txBody>
-          <a:bodyPr/>
-          <a:lstStyle/>
-          <a:p>
-            <a:fld id="{0CFEC368-1D7A-4F81-ABF6-AE0E36BAF64C}" type="slidenum">
-              <a:rPr lang="en-US" smtClean="0"/>
-              <a:pPr/>
-              <a:t>11</a:t>
-            </a:fld>
-            <a:endParaRPr lang="en-US"/>
-          </a:p>
-        </p:txBody>
-      </p:sp>
-    </p:spTree>
-    <p:extLst>
-      <p:ext uri="{BB962C8B-B14F-4D97-AF65-F5344CB8AC3E}">
-        <p14:creationId xmlns:p14="http://schemas.microsoft.com/office/powerpoint/2010/main" val="582181170"/>
-      </p:ext>
-    </p:extLst>
-  </p:cSld>
-  <p:clrMapOvr>
-    <a:masterClrMapping/>
-  </p:clrMapOvr>
-  <p:timing>
-    <p:tnLst>
-      <p:par>
-        <p:cTn xmlns:p14="http://schemas.microsoft.com/office/powerpoint/2010/main" id="1" dur="indefinite" restart="never" nodeType="tmRoot">
-          <p:childTnLst>
-            <p:seq concurrent="1" nextAc="seek">
-              <p:cTn id="2" dur="indefinite" nodeType="mainSeq">
-                <p:childTnLst>
-                  <p:par>
-                    <p:cTn id="3" fill="hold">
-                      <p:stCondLst>
-                        <p:cond delay="indefinite"/>
-                        <p:cond evt="onBegin" delay="0">
-                          <p:tn val="2"/>
-                        </p:cond>
-                      </p:stCondLst>
-                      <p:childTnLst>
-                        <p:par>
-                          <p:cTn id="4" fill="hold">
-                            <p:stCondLst>
-                              <p:cond delay="0"/>
-                            </p:stCondLst>
-                            <p:childTnLst>
-                              <p:par>
-                                <p:cTn id="5" presetID="1" presetClass="entr" presetSubtype="0" fill="hold" grpId="0" nodeType="withEffect">
-                                  <p:stCondLst>
-                                    <p:cond delay="0"/>
-                                  </p:stCondLst>
-                                  <p:childTnLst>
-                                    <p:set>
-                                      <p:cBhvr>
-                                        <p:cTn id="6" dur="1" fill="hold">
-                                          <p:stCondLst>
-                                            <p:cond delay="0"/>
-                                          </p:stCondLst>
-                                        </p:cTn>
-                                        <p:tgtEl>
-                                          <p:spTgt spid="3">
-                                            <p:txEl>
-                                              <p:pRg st="0" end="0"/>
-                                            </p:txEl>
-                                          </p:spTgt>
-                                        </p:tgtEl>
-                                        <p:attrNameLst>
-                                          <p:attrName>style.visibility</p:attrName>
-                                        </p:attrNameLst>
-                                      </p:cBhvr>
-                                      <p:to>
-                                        <p:strVal val="visible"/>
-                                      </p:to>
-                                    </p:set>
-                                  </p:childTnLst>
-                                </p:cTn>
-                              </p:par>
-                              <p:par>
-                                <p:cTn id="7" presetID="1" presetClass="entr" presetSubtype="0" fill="hold" grpId="0" nodeType="withEffect">
-                                  <p:stCondLst>
-                                    <p:cond delay="0"/>
-                                  </p:stCondLst>
-                                  <p:childTnLst>
-                                    <p:set>
-                                      <p:cBhvr>
-                                        <p:cTn id="8" dur="1" fill="hold">
-                                          <p:stCondLst>
-                                            <p:cond delay="0"/>
-                                          </p:stCondLst>
-                                        </p:cTn>
-                                        <p:tgtEl>
-                                          <p:spTgt spid="3">
-                                            <p:txEl>
-                                              <p:pRg st="1" end="1"/>
-                                            </p:txEl>
-                                          </p:spTgt>
-                                        </p:tgtEl>
-                                        <p:attrNameLst>
-                                          <p:attrName>style.visibility</p:attrName>
-                                        </p:attrNameLst>
-                                      </p:cBhvr>
-                                      <p:to>
-                                        <p:strVal val="visible"/>
-                                      </p:to>
-                                    </p:set>
-                                  </p:childTnLst>
-                                </p:cTn>
-                              </p:par>
-                              <p:par>
-                                <p:cTn id="9" presetID="1" presetClass="entr" presetSubtype="0" fill="hold" grpId="0" nodeType="withEffect">
-                                  <p:stCondLst>
-                                    <p:cond delay="0"/>
-                                  </p:stCondLst>
-                                  <p:childTnLst>
-                                    <p:set>
-                                      <p:cBhvr>
-                                        <p:cTn id="10" dur="1" fill="hold">
-                                          <p:stCondLst>
-                                            <p:cond delay="0"/>
-                                          </p:stCondLst>
-                                        </p:cTn>
-                                        <p:tgtEl>
-                                          <p:spTgt spid="3">
-                                            <p:txEl>
-                                              <p:pRg st="2" end="2"/>
-                                            </p:txEl>
-                                          </p:spTgt>
-                                        </p:tgtEl>
-                                        <p:attrNameLst>
-                                          <p:attrName>style.visibility</p:attrName>
-                                        </p:attrNameLst>
-                                      </p:cBhvr>
-                                      <p:to>
-                                        <p:strVal val="visible"/>
-                                      </p:to>
-                                    </p:set>
-                                  </p:childTnLst>
-                                </p:cTn>
-                              </p:par>
-                              <p:par>
-                                <p:cTn id="11" presetID="1" presetClass="entr" presetSubtype="0" fill="hold" grpId="0" nodeType="withEffect">
-                                  <p:stCondLst>
-                                    <p:cond delay="0"/>
-                                  </p:stCondLst>
-                                  <p:childTnLst>
-                                    <p:set>
-                                      <p:cBhvr>
-                                        <p:cTn id="12" dur="1" fill="hold">
-                                          <p:stCondLst>
-                                            <p:cond delay="0"/>
-                                          </p:stCondLst>
-                                        </p:cTn>
-                                        <p:tgtEl>
-                                          <p:spTgt spid="3">
-                                            <p:txEl>
-                                              <p:pRg st="3" end="3"/>
-                                            </p:txEl>
-                                          </p:spTgt>
-                                        </p:tgtEl>
-                                        <p:attrNameLst>
-                                          <p:attrName>style.visibility</p:attrName>
-                                        </p:attrNameLst>
-                                      </p:cBhvr>
-                                      <p:to>
-                                        <p:strVal val="visible"/>
-                                      </p:to>
-                                    </p:set>
-                                  </p:childTnLst>
-                                </p:cTn>
-                              </p:par>
-                            </p:childTnLst>
-                          </p:cTn>
-                        </p:par>
-                      </p:childTnLst>
-                    </p:cTn>
-                  </p:par>
-                  <p:par>
-                    <p:cTn id="13" fill="hold">
-                      <p:stCondLst>
-                        <p:cond delay="indefinite"/>
-                      </p:stCondLst>
-                      <p:childTnLst>
-                        <p:par>
-                          <p:cTn id="14" fill="hold">
-                            <p:stCondLst>
-                              <p:cond delay="0"/>
-                            </p:stCondLst>
-                            <p:childTnLst>
-                              <p:par>
-                                <p:cTn id="15" presetID="1" presetClass="entr" presetSubtype="0" fill="hold" grpId="0" nodeType="clickEffect">
-                                  <p:stCondLst>
-                                    <p:cond delay="0"/>
-                                  </p:stCondLst>
-                                  <p:childTnLst>
-                                    <p:set>
-                                      <p:cBhvr>
-                                        <p:cTn id="16" dur="1" fill="hold">
-                                          <p:stCondLst>
-                                            <p:cond delay="0"/>
-                                          </p:stCondLst>
-                                        </p:cTn>
-                                        <p:tgtEl>
-                                          <p:spTgt spid="3">
-                                            <p:txEl>
-                                              <p:pRg st="4" end="4"/>
-                                            </p:txEl>
-                                          </p:spTgt>
-                                        </p:tgtEl>
-                                        <p:attrNameLst>
-                                          <p:attrName>style.visibility</p:attrName>
-                                        </p:attrNameLst>
-                                      </p:cBhvr>
-                                      <p:to>
-                                        <p:strVal val="visible"/>
-                                      </p:to>
-                                    </p:set>
-                                  </p:childTnLst>
-                                </p:cTn>
-                              </p:par>
-                              <p:par>
-                                <p:cTn id="17" presetID="1" presetClass="entr" presetSubtype="0" fill="hold" grpId="0" nodeType="withEffect">
-                                  <p:stCondLst>
-                                    <p:cond delay="0"/>
-                                  </p:stCondLst>
-                                  <p:childTnLst>
-                                    <p:set>
-                                      <p:cBhvr>
-                                        <p:cTn id="18" dur="1" fill="hold">
-                                          <p:stCondLst>
-                                            <p:cond delay="0"/>
-                                          </p:stCondLst>
-                                        </p:cTn>
-                                        <p:tgtEl>
-                                          <p:spTgt spid="3">
-                                            <p:txEl>
-                                              <p:pRg st="5" end="5"/>
-                                            </p:txEl>
-                                          </p:spTgt>
-                                        </p:tgtEl>
-                                        <p:attrNameLst>
-                                          <p:attrName>style.visibility</p:attrName>
-                                        </p:attrNameLst>
-                                      </p:cBhvr>
-                                      <p:to>
-                                        <p:strVal val="visible"/>
-                                      </p:to>
-                                    </p:set>
-                                  </p:childTnLst>
-                                </p:cTn>
-                              </p:par>
-                              <p:par>
-                                <p:cTn id="19" presetID="1" presetClass="entr" presetSubtype="0" fill="hold" grpId="0" nodeType="withEffect">
-                                  <p:stCondLst>
-                                    <p:cond delay="0"/>
-                                  </p:stCondLst>
-                                  <p:childTnLst>
-                                    <p:set>
-                                      <p:cBhvr>
-                                        <p:cTn id="20" dur="1" fill="hold">
-                                          <p:stCondLst>
-                                            <p:cond delay="0"/>
-                                          </p:stCondLst>
-                                        </p:cTn>
-                                        <p:tgtEl>
-                                          <p:spTgt spid="3">
-                                            <p:txEl>
-                                              <p:pRg st="6" end="6"/>
-                                            </p:txEl>
-                                          </p:spTgt>
-                                        </p:tgtEl>
-                                        <p:attrNameLst>
-                                          <p:attrName>style.visibility</p:attrName>
-                                        </p:attrNameLst>
-                                      </p:cBhvr>
-                                      <p:to>
-                                        <p:strVal val="visible"/>
-                                      </p:to>
-                                    </p:set>
-                                  </p:childTnLst>
-                                </p:cTn>
-                              </p:par>
-                              <p:par>
-                                <p:cTn id="21" presetID="1" presetClass="entr" presetSubtype="0" fill="hold" grpId="0" nodeType="withEffect">
-                                  <p:stCondLst>
-                                    <p:cond delay="0"/>
-                                  </p:stCondLst>
-                                  <p:childTnLst>
-                                    <p:set>
-                                      <p:cBhvr>
-                                        <p:cTn id="22" dur="1" fill="hold">
-                                          <p:stCondLst>
-                                            <p:cond delay="0"/>
-                                          </p:stCondLst>
-                                        </p:cTn>
-                                        <p:tgtEl>
-                                          <p:spTgt spid="3">
-                                            <p:txEl>
-                                              <p:pRg st="7" end="7"/>
-                                            </p:txEl>
-                                          </p:spTgt>
-                                        </p:tgtEl>
-                                        <p:attrNameLst>
-                                          <p:attrName>style.visibility</p:attrName>
-                                        </p:attrNameLst>
-                                      </p:cBhvr>
-                                      <p:to>
-                                        <p:strVal val="visible"/>
-                                      </p:to>
-                                    </p:set>
-                                  </p:childTnLst>
-                                </p:cTn>
-                              </p:par>
-                              <p:par>
-                                <p:cTn id="23" presetID="1" presetClass="entr" presetSubtype="0" fill="hold" grpId="0" nodeType="withEffect">
-                                  <p:stCondLst>
-                                    <p:cond delay="0"/>
-                                  </p:stCondLst>
-                                  <p:childTnLst>
-                                    <p:set>
-                                      <p:cBhvr>
-                                        <p:cTn id="24" dur="1" fill="hold">
-                                          <p:stCondLst>
-                                            <p:cond delay="0"/>
-                                          </p:stCondLst>
-                                        </p:cTn>
-                                        <p:tgtEl>
-                                          <p:spTgt spid="3">
-                                            <p:txEl>
-                                              <p:pRg st="8" end="8"/>
-                                            </p:txEl>
-                                          </p:spTgt>
-                                        </p:tgtEl>
-                                        <p:attrNameLst>
-                                          <p:attrName>style.visibility</p:attrName>
-                                        </p:attrNameLst>
-                                      </p:cBhvr>
-                                      <p:to>
-                                        <p:strVal val="visible"/>
-                                      </p:to>
-                                    </p:set>
-                                  </p:childTnLst>
-                                </p:cTn>
-                              </p:par>
-                              <p:par>
-                                <p:cTn id="25" presetID="1" presetClass="entr" presetSubtype="0" fill="hold" grpId="0" nodeType="withEffect">
-                                  <p:stCondLst>
-                                    <p:cond delay="0"/>
-                                  </p:stCondLst>
-                                  <p:childTnLst>
-                                    <p:set>
-                                      <p:cBhvr>
-                                        <p:cTn id="26" dur="1" fill="hold">
-                                          <p:stCondLst>
-                                            <p:cond delay="0"/>
-                                          </p:stCondLst>
-                                        </p:cTn>
-                                        <p:tgtEl>
-                                          <p:spTgt spid="3">
-                                            <p:txEl>
-                                              <p:pRg st="9" end="9"/>
-                                            </p:txEl>
-                                          </p:spTgt>
-                                        </p:tgtEl>
-                                        <p:attrNameLst>
-                                          <p:attrName>style.visibility</p:attrName>
-                                        </p:attrNameLst>
-                                      </p:cBhvr>
-                                      <p:to>
-                                        <p:strVal val="visible"/>
-                                      </p:to>
-                                    </p:set>
-                                  </p:childTnLst>
-                                </p:cTn>
-                              </p:par>
-                              <p:par>
-                                <p:cTn id="27" presetID="1" presetClass="entr" presetSubtype="0" fill="hold" grpId="0" nodeType="withEffect">
-                                  <p:stCondLst>
-                                    <p:cond delay="0"/>
-                                  </p:stCondLst>
-                                  <p:childTnLst>
-                                    <p:set>
-                                      <p:cBhvr>
-                                        <p:cTn id="28" dur="1" fill="hold">
-                                          <p:stCondLst>
-                                            <p:cond delay="0"/>
-                                          </p:stCondLst>
-                                        </p:cTn>
-                                        <p:tgtEl>
-                                          <p:spTgt spid="3">
-                                            <p:txEl>
-                                              <p:pRg st="10" end="10"/>
-                                            </p:txEl>
-                                          </p:spTgt>
-                                        </p:tgtEl>
-                                        <p:attrNameLst>
-                                          <p:attrName>style.visibility</p:attrName>
-                                        </p:attrNameLst>
-                                      </p:cBhvr>
-                                      <p:to>
-                                        <p:strVal val="visible"/>
-                                      </p:to>
-                                    </p:set>
-                                  </p:childTnLst>
-                                </p:cTn>
-                              </p:par>
-                            </p:childTnLst>
-                          </p:cTn>
-                        </p:par>
-                      </p:childTnLst>
-                    </p:cTn>
-                  </p:par>
-                </p:childTnLst>
-              </p:cTn>
-              <p:prevCondLst>
-                <p:cond evt="onPrev" delay="0">
-                  <p:tgtEl>
-                    <p:sldTgt/>
-                  </p:tgtEl>
-                </p:cond>
-              </p:prevCondLst>
-              <p:nextCondLst>
-                <p:cond evt="onNext" delay="0">
-                  <p:tgtEl>
-                    <p:sldTgt/>
-                  </p:tgtEl>
-                </p:cond>
-              </p:nextCondLst>
-            </p:seq>
-          </p:childTnLst>
-        </p:cTn>
-      </p:par>
-    </p:tnLst>
-    <p:bldLst>
-      <p:bldP spid="3" grpId="0" build="p"/>
-    </p:bldLst>
-  </p:timing>
-</p:sld>
-</file>
-
-<file path=ppt/slides/slide12.xml><?xml version="1.0" encoding="utf-8"?>
-<p:sld xmlns:a="http://schemas.openxmlformats.org/drawingml/2006/main" xmlns:r="http://schemas.openxmlformats.org/officeDocument/2006/relationships" xmlns:p="http://schemas.openxmlformats.org/presentationml/2006/main">
-  <p:cSld>
-    <p:spTree>
-      <p:nvGrpSpPr>
-        <p:cNvPr id="1" name=""/>
-        <p:cNvGrpSpPr/>
-        <p:nvPr/>
-      </p:nvGrpSpPr>
-      <p:grpSpPr>
-        <a:xfrm>
-          <a:off x="0" y="0"/>
-          <a:ext cx="0" cy="0"/>
-          <a:chOff x="0" y="0"/>
-          <a:chExt cx="0" cy="0"/>
-        </a:xfrm>
-      </p:grpSpPr>
-      <p:sp>
-        <p:nvSpPr>
-          <p:cNvPr id="2" name="Title 1"/>
-          <p:cNvSpPr>
-            <a:spLocks noGrp="1"/>
-          </p:cNvSpPr>
-          <p:nvPr>
-            <p:ph type="title"/>
-          </p:nvPr>
-        </p:nvSpPr>
-        <p:spPr/>
-        <p:txBody>
-          <a:bodyPr>
-            <a:normAutofit/>
-          </a:bodyPr>
-          <a:lstStyle/>
-          <a:p>
-            <a:r>
-              <a:rPr lang="en-US" dirty="0"/>
-              <a:t>Example Case: Particles</a:t>
-            </a:r>
-          </a:p>
-        </p:txBody>
-      </p:sp>
-      <p:sp>
-        <p:nvSpPr>
-          <p:cNvPr id="3" name="Content Placeholder 2"/>
-          <p:cNvSpPr>
-            <a:spLocks noGrp="1"/>
-          </p:cNvSpPr>
-          <p:nvPr>
-            <p:ph idx="1"/>
-          </p:nvPr>
-        </p:nvSpPr>
-        <p:spPr/>
-        <p:txBody>
-          <a:bodyPr>
-            <a:normAutofit lnSpcReduction="10000"/>
-          </a:bodyPr>
           <a:lstStyle/>
           <a:p>
             <a:pPr marL="0" indent="0">
@@ -7951,137 +7067,100 @@
             </a:pPr>
             <a:r>
               <a:rPr lang="en-US" sz="2800" dirty="0"/>
-              <a:t>Orthogonal Recursive Bisection (ORB)</a:t>
+              <a:t>Centralized strategies:</a:t>
             </a:r>
           </a:p>
           <a:p>
             <a:r>
               <a:rPr lang="en-US" dirty="0"/>
-              <a:t>At each stage: divide Particles equally </a:t>
+              <a:t>Charm RTS collects data (on one processor) about:</a:t>
+            </a:r>
+          </a:p>
+          <a:p>
+            <a:pPr lvl="1"/>
+            <a:r>
+              <a:rPr lang="en-US" dirty="0" smtClean="0"/>
+              <a:t>Computational </a:t>
+            </a:r>
+            <a:r>
+              <a:rPr lang="en-US" dirty="0"/>
+              <a:t>Load and Communication for each pair </a:t>
             </a:r>
             <a:endParaRPr lang="en-US" dirty="0" smtClean="0"/>
           </a:p>
           <a:p>
             <a:r>
               <a:rPr lang="en-US" dirty="0" smtClean="0"/>
-              <a:t>Processors don’t </a:t>
+              <a:t>Partition </a:t>
             </a:r>
             <a:r>
               <a:rPr lang="en-US" dirty="0"/>
-              <a:t>need to be a power of 2:</a:t>
+              <a:t>the graph of objects across processors</a:t>
             </a:r>
           </a:p>
           <a:p>
             <a:pPr lvl="1"/>
             <a:r>
               <a:rPr lang="en-US" dirty="0" smtClean="0"/>
-              <a:t>Divide </a:t>
+              <a:t>Take </a:t>
             </a:r>
             <a:r>
               <a:rPr lang="en-US" dirty="0"/>
-              <a:t>in proportion</a:t>
+              <a:t>communication into account</a:t>
             </a:r>
           </a:p>
           <a:p>
             <a:pPr lvl="2"/>
             <a:r>
+              <a:rPr lang="en-US" dirty="0" err="1" smtClean="0"/>
+              <a:t>Pt</a:t>
+            </a:r>
+            <a:r>
+              <a:rPr lang="en-US" dirty="0"/>
+              <a:t>-to-</a:t>
+            </a:r>
+            <a:r>
+              <a:rPr lang="en-US" dirty="0" err="1"/>
+              <a:t>pt</a:t>
+            </a:r>
+            <a:r>
+              <a:rPr lang="en-US" dirty="0"/>
+              <a:t>, as well as multicast over a subset</a:t>
+            </a:r>
+          </a:p>
+          <a:p>
+            <a:pPr lvl="2"/>
+            <a:r>
               <a:rPr lang="en-US" dirty="0" smtClean="0"/>
-              <a:t>2</a:t>
+              <a:t>As </a:t>
             </a:r>
             <a:r>
               <a:rPr lang="en-US" dirty="0"/>
-              <a:t>:3 with 5 processors</a:t>
-            </a:r>
-          </a:p>
-          <a:p>
+              <a:t>you map an object, add to the load on both sending and </a:t>
+            </a:r>
+            <a:r>
+              <a:rPr lang="en-US" dirty="0" smtClean="0"/>
+              <a:t>receiving processor</a:t>
+            </a:r>
+            <a:endParaRPr lang="en-US" dirty="0"/>
+          </a:p>
+          <a:p>
+            <a:pPr lvl="1"/>
+            <a:r>
+              <a:rPr lang="en-US" dirty="0" smtClean="0"/>
+              <a:t>Multicasts </a:t>
+            </a:r>
             <a:r>
               <a:rPr lang="en-US" dirty="0"/>
-              <a:t>How to choose the dimension along which to cut?</a:t>
-            </a:r>
-          </a:p>
-          <a:p>
-            <a:pPr lvl="1"/>
+              <a:t>to multiple co-located objects are </a:t>
+            </a:r>
             <a:r>
               <a:rPr lang="en-US" dirty="0" smtClean="0"/>
-              <a:t>Choose </a:t>
+              <a:t>effectively </a:t>
             </a:r>
             <a:r>
               <a:rPr lang="en-US" dirty="0"/>
-              <a:t>the longest one </a:t>
-            </a:r>
-            <a:endParaRPr lang="en-US" dirty="0" smtClean="0"/>
-          </a:p>
-          <a:p>
-            <a:r>
-              <a:rPr lang="en-US" dirty="0" smtClean="0"/>
-              <a:t>How </a:t>
-            </a:r>
-            <a:r>
-              <a:rPr lang="en-US" dirty="0"/>
-              <a:t>to draw the line?</a:t>
-            </a:r>
-          </a:p>
-          <a:p>
-            <a:pPr lvl="1"/>
-            <a:r>
-              <a:rPr lang="en-US" dirty="0" smtClean="0"/>
-              <a:t>All </a:t>
-            </a:r>
-            <a:r>
-              <a:rPr lang="en-US" dirty="0"/>
-              <a:t>data on one processor? Sort along each dimension</a:t>
-            </a:r>
-          </a:p>
-          <a:p>
-            <a:pPr lvl="1"/>
-            <a:r>
-              <a:rPr lang="en-US" dirty="0" smtClean="0"/>
-              <a:t>Otherwise</a:t>
-            </a:r>
-            <a:r>
-              <a:rPr lang="en-US" dirty="0"/>
-              <a:t>: run a distributed </a:t>
-            </a:r>
-            <a:r>
-              <a:rPr lang="en-US" dirty="0" err="1"/>
-              <a:t>histogramming</a:t>
-            </a:r>
-            <a:r>
-              <a:rPr lang="en-US" dirty="0"/>
-              <a:t> algorithm to find the line</a:t>
-            </a:r>
-            <a:r>
-              <a:rPr lang="en-US" dirty="0" smtClean="0"/>
-              <a:t>, recursively</a:t>
-            </a:r>
-            <a:endParaRPr lang="en-US" dirty="0"/>
-          </a:p>
-          <a:p>
-            <a:r>
-              <a:rPr lang="en-US" dirty="0"/>
-              <a:t>Find the entire tree, and then do all data movement at once</a:t>
-            </a:r>
-          </a:p>
-          <a:p>
-            <a:pPr lvl="1"/>
-            <a:r>
-              <a:rPr lang="en-US" dirty="0" smtClean="0"/>
-              <a:t>Or </a:t>
-            </a:r>
-            <a:r>
-              <a:rPr lang="en-US" dirty="0"/>
-              <a:t>do it in two-three steps.</a:t>
-            </a:r>
-          </a:p>
-          <a:p>
-            <a:pPr lvl="1"/>
-            <a:r>
-              <a:rPr lang="en-US" dirty="0" smtClean="0"/>
-              <a:t>But </a:t>
-            </a:r>
-            <a:r>
-              <a:rPr lang="en-US" dirty="0"/>
-              <a:t>no reason to redistribute particles after drawing each line.</a:t>
+              <a:t>the cost of a single send</a:t>
             </a:r>
           </a:p>
         </p:txBody>
@@ -8128,738 +7207,7 @@
             <a:fld id="{0CFEC368-1D7A-4F81-ABF6-AE0E36BAF64C}" type="slidenum">
               <a:rPr lang="en-US" smtClean="0"/>
               <a:pPr/>
-              <a:t>12</a:t>
-            </a:fld>
-            <a:endParaRPr lang="en-US"/>
-          </a:p>
-        </p:txBody>
-      </p:sp>
-    </p:spTree>
-    <p:extLst>
-      <p:ext uri="{BB962C8B-B14F-4D97-AF65-F5344CB8AC3E}">
-        <p14:creationId xmlns:p14="http://schemas.microsoft.com/office/powerpoint/2010/main" val="4013626292"/>
-      </p:ext>
-    </p:extLst>
-  </p:cSld>
-  <p:clrMapOvr>
-    <a:masterClrMapping/>
-  </p:clrMapOvr>
-  <p:timing>
-    <p:tnLst>
-      <p:par>
-        <p:cTn xmlns:p14="http://schemas.microsoft.com/office/powerpoint/2010/main" id="1" dur="indefinite" restart="never" nodeType="tmRoot">
-          <p:childTnLst>
-            <p:seq concurrent="1" nextAc="seek">
-              <p:cTn id="2" dur="indefinite" nodeType="mainSeq">
-                <p:childTnLst>
-                  <p:par>
-                    <p:cTn id="3" fill="hold">
-                      <p:stCondLst>
-                        <p:cond delay="indefinite"/>
-                        <p:cond evt="onBegin" delay="0">
-                          <p:tn val="2"/>
-                        </p:cond>
-                      </p:stCondLst>
-                      <p:childTnLst>
-                        <p:par>
-                          <p:cTn id="4" fill="hold">
-                            <p:stCondLst>
-                              <p:cond delay="0"/>
-                            </p:stCondLst>
-                            <p:childTnLst>
-                              <p:par>
-                                <p:cTn id="5" presetID="1" presetClass="entr" presetSubtype="0" fill="hold" grpId="0" nodeType="withEffect">
-                                  <p:stCondLst>
-                                    <p:cond delay="0"/>
-                                  </p:stCondLst>
-                                  <p:childTnLst>
-                                    <p:set>
-                                      <p:cBhvr>
-                                        <p:cTn id="6" dur="1" fill="hold">
-                                          <p:stCondLst>
-                                            <p:cond delay="0"/>
-                                          </p:stCondLst>
-                                        </p:cTn>
-                                        <p:tgtEl>
-                                          <p:spTgt spid="3">
-                                            <p:txEl>
-                                              <p:pRg st="0" end="0"/>
-                                            </p:txEl>
-                                          </p:spTgt>
-                                        </p:tgtEl>
-                                        <p:attrNameLst>
-                                          <p:attrName>style.visibility</p:attrName>
-                                        </p:attrNameLst>
-                                      </p:cBhvr>
-                                      <p:to>
-                                        <p:strVal val="visible"/>
-                                      </p:to>
-                                    </p:set>
-                                  </p:childTnLst>
-                                </p:cTn>
-                              </p:par>
-                              <p:par>
-                                <p:cTn id="7" presetID="1" presetClass="entr" presetSubtype="0" fill="hold" grpId="0" nodeType="withEffect">
-                                  <p:stCondLst>
-                                    <p:cond delay="0"/>
-                                  </p:stCondLst>
-                                  <p:childTnLst>
-                                    <p:set>
-                                      <p:cBhvr>
-                                        <p:cTn id="8" dur="1" fill="hold">
-                                          <p:stCondLst>
-                                            <p:cond delay="0"/>
-                                          </p:stCondLst>
-                                        </p:cTn>
-                                        <p:tgtEl>
-                                          <p:spTgt spid="3">
-                                            <p:txEl>
-                                              <p:pRg st="1" end="1"/>
-                                            </p:txEl>
-                                          </p:spTgt>
-                                        </p:tgtEl>
-                                        <p:attrNameLst>
-                                          <p:attrName>style.visibility</p:attrName>
-                                        </p:attrNameLst>
-                                      </p:cBhvr>
-                                      <p:to>
-                                        <p:strVal val="visible"/>
-                                      </p:to>
-                                    </p:set>
-                                  </p:childTnLst>
-                                </p:cTn>
-                              </p:par>
-                              <p:par>
-                                <p:cTn id="9" presetID="1" presetClass="entr" presetSubtype="0" fill="hold" grpId="0" nodeType="withEffect">
-                                  <p:stCondLst>
-                                    <p:cond delay="0"/>
-                                  </p:stCondLst>
-                                  <p:childTnLst>
-                                    <p:set>
-                                      <p:cBhvr>
-                                        <p:cTn id="10" dur="1" fill="hold">
-                                          <p:stCondLst>
-                                            <p:cond delay="0"/>
-                                          </p:stCondLst>
-                                        </p:cTn>
-                                        <p:tgtEl>
-                                          <p:spTgt spid="3">
-                                            <p:txEl>
-                                              <p:pRg st="2" end="2"/>
-                                            </p:txEl>
-                                          </p:spTgt>
-                                        </p:tgtEl>
-                                        <p:attrNameLst>
-                                          <p:attrName>style.visibility</p:attrName>
-                                        </p:attrNameLst>
-                                      </p:cBhvr>
-                                      <p:to>
-                                        <p:strVal val="visible"/>
-                                      </p:to>
-                                    </p:set>
-                                  </p:childTnLst>
-                                </p:cTn>
-                              </p:par>
-                              <p:par>
-                                <p:cTn id="11" presetID="1" presetClass="entr" presetSubtype="0" fill="hold" grpId="0" nodeType="withEffect">
-                                  <p:stCondLst>
-                                    <p:cond delay="0"/>
-                                  </p:stCondLst>
-                                  <p:childTnLst>
-                                    <p:set>
-                                      <p:cBhvr>
-                                        <p:cTn id="12" dur="1" fill="hold">
-                                          <p:stCondLst>
-                                            <p:cond delay="0"/>
-                                          </p:stCondLst>
-                                        </p:cTn>
-                                        <p:tgtEl>
-                                          <p:spTgt spid="3">
-                                            <p:txEl>
-                                              <p:pRg st="3" end="3"/>
-                                            </p:txEl>
-                                          </p:spTgt>
-                                        </p:tgtEl>
-                                        <p:attrNameLst>
-                                          <p:attrName>style.visibility</p:attrName>
-                                        </p:attrNameLst>
-                                      </p:cBhvr>
-                                      <p:to>
-                                        <p:strVal val="visible"/>
-                                      </p:to>
-                                    </p:set>
-                                  </p:childTnLst>
-                                </p:cTn>
-                              </p:par>
-                              <p:par>
-                                <p:cTn id="13" presetID="1" presetClass="entr" presetSubtype="0" fill="hold" grpId="0" nodeType="withEffect">
-                                  <p:stCondLst>
-                                    <p:cond delay="0"/>
-                                  </p:stCondLst>
-                                  <p:childTnLst>
-                                    <p:set>
-                                      <p:cBhvr>
-                                        <p:cTn id="14" dur="1" fill="hold">
-                                          <p:stCondLst>
-                                            <p:cond delay="0"/>
-                                          </p:stCondLst>
-                                        </p:cTn>
-                                        <p:tgtEl>
-                                          <p:spTgt spid="3">
-                                            <p:txEl>
-                                              <p:pRg st="4" end="4"/>
-                                            </p:txEl>
-                                          </p:spTgt>
-                                        </p:tgtEl>
-                                        <p:attrNameLst>
-                                          <p:attrName>style.visibility</p:attrName>
-                                        </p:attrNameLst>
-                                      </p:cBhvr>
-                                      <p:to>
-                                        <p:strVal val="visible"/>
-                                      </p:to>
-                                    </p:set>
-                                  </p:childTnLst>
-                                </p:cTn>
-                              </p:par>
-                            </p:childTnLst>
-                          </p:cTn>
-                        </p:par>
-                      </p:childTnLst>
-                    </p:cTn>
-                  </p:par>
-                  <p:par>
-                    <p:cTn id="15" fill="hold">
-                      <p:stCondLst>
-                        <p:cond delay="indefinite"/>
-                      </p:stCondLst>
-                      <p:childTnLst>
-                        <p:par>
-                          <p:cTn id="16" fill="hold">
-                            <p:stCondLst>
-                              <p:cond delay="0"/>
-                            </p:stCondLst>
-                            <p:childTnLst>
-                              <p:par>
-                                <p:cTn id="17" presetID="1" presetClass="entr" presetSubtype="0" fill="hold" grpId="0" nodeType="clickEffect">
-                                  <p:stCondLst>
-                                    <p:cond delay="0"/>
-                                  </p:stCondLst>
-                                  <p:childTnLst>
-                                    <p:set>
-                                      <p:cBhvr>
-                                        <p:cTn id="18" dur="1" fill="hold">
-                                          <p:stCondLst>
-                                            <p:cond delay="0"/>
-                                          </p:stCondLst>
-                                        </p:cTn>
-                                        <p:tgtEl>
-                                          <p:spTgt spid="3">
-                                            <p:txEl>
-                                              <p:pRg st="5" end="5"/>
-                                            </p:txEl>
-                                          </p:spTgt>
-                                        </p:tgtEl>
-                                        <p:attrNameLst>
-                                          <p:attrName>style.visibility</p:attrName>
-                                        </p:attrNameLst>
-                                      </p:cBhvr>
-                                      <p:to>
-                                        <p:strVal val="visible"/>
-                                      </p:to>
-                                    </p:set>
-                                  </p:childTnLst>
-                                </p:cTn>
-                              </p:par>
-                              <p:par>
-                                <p:cTn id="19" presetID="1" presetClass="entr" presetSubtype="0" fill="hold" grpId="0" nodeType="withEffect">
-                                  <p:stCondLst>
-                                    <p:cond delay="0"/>
-                                  </p:stCondLst>
-                                  <p:childTnLst>
-                                    <p:set>
-                                      <p:cBhvr>
-                                        <p:cTn id="20" dur="1" fill="hold">
-                                          <p:stCondLst>
-                                            <p:cond delay="0"/>
-                                          </p:stCondLst>
-                                        </p:cTn>
-                                        <p:tgtEl>
-                                          <p:spTgt spid="3">
-                                            <p:txEl>
-                                              <p:pRg st="6" end="6"/>
-                                            </p:txEl>
-                                          </p:spTgt>
-                                        </p:tgtEl>
-                                        <p:attrNameLst>
-                                          <p:attrName>style.visibility</p:attrName>
-                                        </p:attrNameLst>
-                                      </p:cBhvr>
-                                      <p:to>
-                                        <p:strVal val="visible"/>
-                                      </p:to>
-                                    </p:set>
-                                  </p:childTnLst>
-                                </p:cTn>
-                              </p:par>
-                            </p:childTnLst>
-                          </p:cTn>
-                        </p:par>
-                      </p:childTnLst>
-                    </p:cTn>
-                  </p:par>
-                  <p:par>
-                    <p:cTn id="21" fill="hold">
-                      <p:stCondLst>
-                        <p:cond delay="indefinite"/>
-                      </p:stCondLst>
-                      <p:childTnLst>
-                        <p:par>
-                          <p:cTn id="22" fill="hold">
-                            <p:stCondLst>
-                              <p:cond delay="0"/>
-                            </p:stCondLst>
-                            <p:childTnLst>
-                              <p:par>
-                                <p:cTn id="23" presetID="1" presetClass="entr" presetSubtype="0" fill="hold" grpId="0" nodeType="clickEffect">
-                                  <p:stCondLst>
-                                    <p:cond delay="0"/>
-                                  </p:stCondLst>
-                                  <p:childTnLst>
-                                    <p:set>
-                                      <p:cBhvr>
-                                        <p:cTn id="24" dur="1" fill="hold">
-                                          <p:stCondLst>
-                                            <p:cond delay="0"/>
-                                          </p:stCondLst>
-                                        </p:cTn>
-                                        <p:tgtEl>
-                                          <p:spTgt spid="3">
-                                            <p:txEl>
-                                              <p:pRg st="7" end="7"/>
-                                            </p:txEl>
-                                          </p:spTgt>
-                                        </p:tgtEl>
-                                        <p:attrNameLst>
-                                          <p:attrName>style.visibility</p:attrName>
-                                        </p:attrNameLst>
-                                      </p:cBhvr>
-                                      <p:to>
-                                        <p:strVal val="visible"/>
-                                      </p:to>
-                                    </p:set>
-                                  </p:childTnLst>
-                                </p:cTn>
-                              </p:par>
-                              <p:par>
-                                <p:cTn id="25" presetID="1" presetClass="entr" presetSubtype="0" fill="hold" grpId="0" nodeType="withEffect">
-                                  <p:stCondLst>
-                                    <p:cond delay="0"/>
-                                  </p:stCondLst>
-                                  <p:childTnLst>
-                                    <p:set>
-                                      <p:cBhvr>
-                                        <p:cTn id="26" dur="1" fill="hold">
-                                          <p:stCondLst>
-                                            <p:cond delay="0"/>
-                                          </p:stCondLst>
-                                        </p:cTn>
-                                        <p:tgtEl>
-                                          <p:spTgt spid="3">
-                                            <p:txEl>
-                                              <p:pRg st="8" end="8"/>
-                                            </p:txEl>
-                                          </p:spTgt>
-                                        </p:tgtEl>
-                                        <p:attrNameLst>
-                                          <p:attrName>style.visibility</p:attrName>
-                                        </p:attrNameLst>
-                                      </p:cBhvr>
-                                      <p:to>
-                                        <p:strVal val="visible"/>
-                                      </p:to>
-                                    </p:set>
-                                  </p:childTnLst>
-                                </p:cTn>
-                              </p:par>
-                              <p:par>
-                                <p:cTn id="27" presetID="1" presetClass="entr" presetSubtype="0" fill="hold" grpId="0" nodeType="withEffect">
-                                  <p:stCondLst>
-                                    <p:cond delay="0"/>
-                                  </p:stCondLst>
-                                  <p:childTnLst>
-                                    <p:set>
-                                      <p:cBhvr>
-                                        <p:cTn id="28" dur="1" fill="hold">
-                                          <p:stCondLst>
-                                            <p:cond delay="0"/>
-                                          </p:stCondLst>
-                                        </p:cTn>
-                                        <p:tgtEl>
-                                          <p:spTgt spid="3">
-                                            <p:txEl>
-                                              <p:pRg st="9" end="9"/>
-                                            </p:txEl>
-                                          </p:spTgt>
-                                        </p:tgtEl>
-                                        <p:attrNameLst>
-                                          <p:attrName>style.visibility</p:attrName>
-                                        </p:attrNameLst>
-                                      </p:cBhvr>
-                                      <p:to>
-                                        <p:strVal val="visible"/>
-                                      </p:to>
-                                    </p:set>
-                                  </p:childTnLst>
-                                </p:cTn>
-                              </p:par>
-                            </p:childTnLst>
-                          </p:cTn>
-                        </p:par>
-                      </p:childTnLst>
-                    </p:cTn>
-                  </p:par>
-                  <p:par>
-                    <p:cTn id="29" fill="hold">
-                      <p:stCondLst>
-                        <p:cond delay="indefinite"/>
-                      </p:stCondLst>
-                      <p:childTnLst>
-                        <p:par>
-                          <p:cTn id="30" fill="hold">
-                            <p:stCondLst>
-                              <p:cond delay="0"/>
-                            </p:stCondLst>
-                            <p:childTnLst>
-                              <p:par>
-                                <p:cTn id="31" presetID="1" presetClass="entr" presetSubtype="0" fill="hold" grpId="0" nodeType="clickEffect">
-                                  <p:stCondLst>
-                                    <p:cond delay="0"/>
-                                  </p:stCondLst>
-                                  <p:childTnLst>
-                                    <p:set>
-                                      <p:cBhvr>
-                                        <p:cTn id="32" dur="1" fill="hold">
-                                          <p:stCondLst>
-                                            <p:cond delay="0"/>
-                                          </p:stCondLst>
-                                        </p:cTn>
-                                        <p:tgtEl>
-                                          <p:spTgt spid="3">
-                                            <p:txEl>
-                                              <p:pRg st="10" end="10"/>
-                                            </p:txEl>
-                                          </p:spTgt>
-                                        </p:tgtEl>
-                                        <p:attrNameLst>
-                                          <p:attrName>style.visibility</p:attrName>
-                                        </p:attrNameLst>
-                                      </p:cBhvr>
-                                      <p:to>
-                                        <p:strVal val="visible"/>
-                                      </p:to>
-                                    </p:set>
-                                  </p:childTnLst>
-                                </p:cTn>
-                              </p:par>
-                              <p:par>
-                                <p:cTn id="33" presetID="1" presetClass="entr" presetSubtype="0" fill="hold" grpId="0" nodeType="withEffect">
-                                  <p:stCondLst>
-                                    <p:cond delay="0"/>
-                                  </p:stCondLst>
-                                  <p:childTnLst>
-                                    <p:set>
-                                      <p:cBhvr>
-                                        <p:cTn id="34" dur="1" fill="hold">
-                                          <p:stCondLst>
-                                            <p:cond delay="0"/>
-                                          </p:stCondLst>
-                                        </p:cTn>
-                                        <p:tgtEl>
-                                          <p:spTgt spid="3">
-                                            <p:txEl>
-                                              <p:pRg st="11" end="11"/>
-                                            </p:txEl>
-                                          </p:spTgt>
-                                        </p:tgtEl>
-                                        <p:attrNameLst>
-                                          <p:attrName>style.visibility</p:attrName>
-                                        </p:attrNameLst>
-                                      </p:cBhvr>
-                                      <p:to>
-                                        <p:strVal val="visible"/>
-                                      </p:to>
-                                    </p:set>
-                                  </p:childTnLst>
-                                </p:cTn>
-                              </p:par>
-                              <p:par>
-                                <p:cTn id="35" presetID="1" presetClass="entr" presetSubtype="0" fill="hold" grpId="0" nodeType="withEffect">
-                                  <p:stCondLst>
-                                    <p:cond delay="0"/>
-                                  </p:stCondLst>
-                                  <p:childTnLst>
-                                    <p:set>
-                                      <p:cBhvr>
-                                        <p:cTn id="36" dur="1" fill="hold">
-                                          <p:stCondLst>
-                                            <p:cond delay="0"/>
-                                          </p:stCondLst>
-                                        </p:cTn>
-                                        <p:tgtEl>
-                                          <p:spTgt spid="3">
-                                            <p:txEl>
-                                              <p:pRg st="12" end="12"/>
-                                            </p:txEl>
-                                          </p:spTgt>
-                                        </p:tgtEl>
-                                        <p:attrNameLst>
-                                          <p:attrName>style.visibility</p:attrName>
-                                        </p:attrNameLst>
-                                      </p:cBhvr>
-                                      <p:to>
-                                        <p:strVal val="visible"/>
-                                      </p:to>
-                                    </p:set>
-                                  </p:childTnLst>
-                                </p:cTn>
-                              </p:par>
-                            </p:childTnLst>
-                          </p:cTn>
-                        </p:par>
-                      </p:childTnLst>
-                    </p:cTn>
-                  </p:par>
-                </p:childTnLst>
-              </p:cTn>
-              <p:prevCondLst>
-                <p:cond evt="onPrev" delay="0">
-                  <p:tgtEl>
-                    <p:sldTgt/>
-                  </p:tgtEl>
-                </p:cond>
-              </p:prevCondLst>
-              <p:nextCondLst>
-                <p:cond evt="onNext" delay="0">
-                  <p:tgtEl>
-                    <p:sldTgt/>
-                  </p:tgtEl>
-                </p:cond>
-              </p:nextCondLst>
-            </p:seq>
-          </p:childTnLst>
-        </p:cTn>
-      </p:par>
-    </p:tnLst>
-    <p:bldLst>
-      <p:bldP spid="3" grpId="0" build="p"/>
-    </p:bldLst>
-  </p:timing>
-</p:sld>
-</file>
-
-<file path=ppt/slides/slide13.xml><?xml version="1.0" encoding="utf-8"?>
-<p:sld xmlns:a="http://schemas.openxmlformats.org/drawingml/2006/main" xmlns:r="http://schemas.openxmlformats.org/officeDocument/2006/relationships" xmlns:p="http://schemas.openxmlformats.org/presentationml/2006/main">
-  <p:cSld>
-    <p:spTree>
-      <p:nvGrpSpPr>
-        <p:cNvPr id="1" name=""/>
-        <p:cNvGrpSpPr/>
-        <p:nvPr/>
-      </p:nvGrpSpPr>
-      <p:grpSpPr>
-        <a:xfrm>
-          <a:off x="0" y="0"/>
-          <a:ext cx="0" cy="0"/>
-          <a:chOff x="0" y="0"/>
-          <a:chExt cx="0" cy="0"/>
-        </a:xfrm>
-      </p:grpSpPr>
-      <p:sp>
-        <p:nvSpPr>
-          <p:cNvPr id="2" name="Title 1"/>
-          <p:cNvSpPr>
-            <a:spLocks noGrp="1"/>
-          </p:cNvSpPr>
-          <p:nvPr>
-            <p:ph type="title"/>
-          </p:nvPr>
-        </p:nvSpPr>
-        <p:spPr/>
-        <p:txBody>
-          <a:bodyPr>
-            <a:normAutofit/>
-          </a:bodyPr>
-          <a:lstStyle/>
-          <a:p>
-            <a:r>
-              <a:rPr lang="en-US" dirty="0"/>
-              <a:t>Periodic Load Balancing</a:t>
-            </a:r>
-          </a:p>
-        </p:txBody>
-      </p:sp>
-      <p:sp>
-        <p:nvSpPr>
-          <p:cNvPr id="3" name="Content Placeholder 2"/>
-          <p:cNvSpPr>
-            <a:spLocks noGrp="1"/>
-          </p:cNvSpPr>
-          <p:nvPr>
-            <p:ph idx="1"/>
-          </p:nvPr>
-        </p:nvSpPr>
-        <p:spPr/>
-        <p:txBody>
-          <a:bodyPr/>
-          <a:lstStyle/>
-          <a:p>
-            <a:pPr marL="0" indent="0">
-              <a:buNone/>
-            </a:pPr>
-            <a:r>
-              <a:rPr lang="en-US" sz="2800" dirty="0"/>
-              <a:t>Centralized strategies:</a:t>
-            </a:r>
-          </a:p>
-          <a:p>
-            <a:r>
-              <a:rPr lang="en-US" dirty="0"/>
-              <a:t>Charm RTS collects data (on one processor) about:</a:t>
-            </a:r>
-          </a:p>
-          <a:p>
-            <a:pPr lvl="1"/>
-            <a:r>
-              <a:rPr lang="en-US" dirty="0" smtClean="0"/>
-              <a:t>Computational </a:t>
-            </a:r>
-            <a:r>
-              <a:rPr lang="en-US" dirty="0"/>
-              <a:t>Load and Communication for each pair </a:t>
-            </a:r>
-            <a:endParaRPr lang="en-US" dirty="0" smtClean="0"/>
-          </a:p>
-          <a:p>
-            <a:r>
-              <a:rPr lang="en-US" dirty="0" smtClean="0"/>
-              <a:t>Partition </a:t>
-            </a:r>
-            <a:r>
-              <a:rPr lang="en-US" dirty="0"/>
-              <a:t>the graph of objects across processors</a:t>
-            </a:r>
-          </a:p>
-          <a:p>
-            <a:pPr lvl="1"/>
-            <a:r>
-              <a:rPr lang="en-US" dirty="0" smtClean="0"/>
-              <a:t>Take </a:t>
-            </a:r>
-            <a:r>
-              <a:rPr lang="en-US" dirty="0"/>
-              <a:t>communication into account</a:t>
-            </a:r>
-          </a:p>
-          <a:p>
-            <a:pPr lvl="2"/>
-            <a:r>
-              <a:rPr lang="en-US" dirty="0" err="1" smtClean="0"/>
-              <a:t>Pt</a:t>
-            </a:r>
-            <a:r>
-              <a:rPr lang="en-US" dirty="0"/>
-              <a:t>-to-</a:t>
-            </a:r>
-            <a:r>
-              <a:rPr lang="en-US" dirty="0" err="1"/>
-              <a:t>pt</a:t>
-            </a:r>
-            <a:r>
-              <a:rPr lang="en-US" dirty="0"/>
-              <a:t>, as well as multicast over a subset</a:t>
-            </a:r>
-          </a:p>
-          <a:p>
-            <a:pPr lvl="2"/>
-            <a:r>
-              <a:rPr lang="en-US" dirty="0" smtClean="0"/>
-              <a:t>As </a:t>
-            </a:r>
-            <a:r>
-              <a:rPr lang="en-US" dirty="0"/>
-              <a:t>you map an object, add to the load on both sending and </a:t>
-            </a:r>
-            <a:r>
-              <a:rPr lang="en-US" dirty="0" smtClean="0"/>
-              <a:t>receiving processor</a:t>
-            </a:r>
-            <a:endParaRPr lang="en-US" dirty="0"/>
-          </a:p>
-          <a:p>
-            <a:pPr lvl="1"/>
-            <a:r>
-              <a:rPr lang="en-US" dirty="0" smtClean="0"/>
-              <a:t>Multicasts </a:t>
-            </a:r>
-            <a:r>
-              <a:rPr lang="en-US" dirty="0"/>
-              <a:t>to multiple co-located objects are </a:t>
-            </a:r>
-            <a:r>
-              <a:rPr lang="en-US" dirty="0" smtClean="0"/>
-              <a:t>effectively </a:t>
-            </a:r>
-            <a:r>
-              <a:rPr lang="en-US" dirty="0"/>
-              <a:t>the cost of a single send</a:t>
-            </a:r>
-          </a:p>
-        </p:txBody>
-      </p:sp>
-      <p:sp>
-        <p:nvSpPr>
-          <p:cNvPr id="5" name="Footer Placeholder 4"/>
-          <p:cNvSpPr>
-            <a:spLocks noGrp="1"/>
-          </p:cNvSpPr>
-          <p:nvPr>
-            <p:ph type="ftr" sz="quarter" idx="11"/>
-          </p:nvPr>
-        </p:nvSpPr>
-        <p:spPr/>
-        <p:txBody>
-          <a:bodyPr/>
-          <a:lstStyle/>
-          <a:p>
-            <a:pPr algn="r"/>
-            <a:r>
-              <a:rPr lang="en-US" smtClean="0"/>
-              <a:t>Laxmikant Kalé and PPL (UIUC) – Parallel Migratable Objects </a:t>
-            </a:r>
-            <a:endParaRPr lang="en-US" dirty="0"/>
-          </a:p>
-        </p:txBody>
-      </p:sp>
-      <p:sp>
-        <p:nvSpPr>
-          <p:cNvPr id="6" name="Slide Number Placeholder 5"/>
-          <p:cNvSpPr>
-            <a:spLocks noGrp="1"/>
-          </p:cNvSpPr>
-          <p:nvPr>
-            <p:ph type="sldNum" sz="quarter" idx="12"/>
-          </p:nvPr>
-        </p:nvSpPr>
-        <p:spPr/>
-        <p:txBody>
-          <a:bodyPr/>
-          <a:lstStyle/>
-          <a:p>
-            <a:fld id="{0CFEC368-1D7A-4F81-ABF6-AE0E36BAF64C}" type="slidenum">
-              <a:rPr lang="en-US" smtClean="0"/>
-              <a:pPr/>
-              <a:t>13</a:t>
+              <a:t>10</a:t>
             </a:fld>
             <a:endParaRPr lang="en-US"/>
           </a:p>
@@ -9198,7 +7546,7 @@
 </p:sld>
 </file>
 
-<file path=ppt/slides/slide14.xml><?xml version="1.0" encoding="utf-8"?>
+<file path=ppt/slides/slide11.xml><?xml version="1.0" encoding="utf-8"?>
 <p:sld xmlns:a="http://schemas.openxmlformats.org/drawingml/2006/main" xmlns:r="http://schemas.openxmlformats.org/officeDocument/2006/relationships" xmlns:p="http://schemas.openxmlformats.org/presentationml/2006/main">
   <p:cSld>
     <p:spTree>
@@ -9451,7 +7799,7 @@
             <a:fld id="{0CFEC368-1D7A-4F81-ABF6-AE0E36BAF64C}" type="slidenum">
               <a:rPr lang="en-US" smtClean="0"/>
               <a:pPr/>
-              <a:t>14</a:t>
+              <a:t>11</a:t>
             </a:fld>
             <a:endParaRPr lang="en-US"/>
           </a:p>
@@ -9477,7 +7825,7 @@
 </p:sld>
 </file>
 
-<file path=ppt/slides/slide15.xml><?xml version="1.0" encoding="utf-8"?>
+<file path=ppt/slides/slide12.xml><?xml version="1.0" encoding="utf-8"?>
 <p:sld xmlns:a="http://schemas.openxmlformats.org/drawingml/2006/main" xmlns:r="http://schemas.openxmlformats.org/officeDocument/2006/relationships" xmlns:p="http://schemas.openxmlformats.org/presentationml/2006/main">
   <p:cSld>
     <p:spTree>
@@ -9586,16 +7934,22 @@
             </a:r>
             <a:r>
               <a:rPr lang="en-US" dirty="0"/>
-              <a:t>-stage assignments:</a:t>
-            </a:r>
-          </a:p>
-          <a:p>
-            <a:pPr marL="860425" lvl="2" indent="0">
-              <a:buNone/>
-            </a:pPr>
+              <a:t>-stage </a:t>
+            </a:r>
+            <a:r>
+              <a:rPr lang="en-US" dirty="0" smtClean="0"/>
+              <a:t>assignments:</a:t>
+            </a:r>
+          </a:p>
+          <a:p>
+            <a:pPr lvl="3"/>
+            <a:r>
+              <a:rPr lang="en-US" dirty="0" smtClean="0"/>
+              <a:t>In </a:t>
+            </a:r>
             <a:r>
               <a:rPr lang="en-US" dirty="0"/>
-              <a:t>In early stages, consider communication costs as long as the processors are in the same (broad) load class</a:t>
+              <a:t>early stages, consider communication costs as long as the processors are in the same (broad) load class</a:t>
             </a:r>
             <a:r>
               <a:rPr lang="en-US" dirty="0" smtClean="0"/>
@@ -9603,9 +7957,7 @@
             </a:r>
           </a:p>
           <a:p>
-            <a:pPr marL="860425" lvl="2" indent="0">
-              <a:buNone/>
-            </a:pPr>
+            <a:pPr lvl="3"/>
             <a:r>
               <a:rPr lang="en-US" dirty="0" smtClean="0"/>
               <a:t>In </a:t>
@@ -9674,7 +8026,7 @@
             <a:fld id="{0CFEC368-1D7A-4F81-ABF6-AE0E36BAF64C}" type="slidenum">
               <a:rPr lang="en-US" smtClean="0"/>
               <a:pPr/>
-              <a:t>15</a:t>
+              <a:t>12</a:t>
             </a:fld>
             <a:endParaRPr lang="en-US"/>
           </a:p>
@@ -9700,7 +8052,7 @@
 </p:sld>
 </file>
 
-<file path=ppt/slides/slide16.xml><?xml version="1.0" encoding="utf-8"?>
+<file path=ppt/slides/slide13.xml><?xml version="1.0" encoding="utf-8"?>
 <p:sld xmlns:a="http://schemas.openxmlformats.org/drawingml/2006/main" xmlns:r="http://schemas.openxmlformats.org/officeDocument/2006/relationships" xmlns:p="http://schemas.openxmlformats.org/presentationml/2006/main">
   <p:cSld>
     <p:spTree>
@@ -9845,7 +8197,7 @@
             <a:fld id="{0CFEC368-1D7A-4F81-ABF6-AE0E36BAF64C}" type="slidenum">
               <a:rPr lang="en-US" smtClean="0"/>
               <a:pPr/>
-              <a:t>16</a:t>
+              <a:t>13</a:t>
             </a:fld>
             <a:endParaRPr lang="en-US"/>
           </a:p>
@@ -9931,7 +8283,7 @@
 </p:sld>
 </file>
 
-<file path=ppt/slides/slide17.xml><?xml version="1.0" encoding="utf-8"?>
+<file path=ppt/slides/slide14.xml><?xml version="1.0" encoding="utf-8"?>
 <p:sld xmlns:a="http://schemas.openxmlformats.org/drawingml/2006/main" xmlns:r="http://schemas.openxmlformats.org/officeDocument/2006/relationships" xmlns:p="http://schemas.openxmlformats.org/presentationml/2006/main">
   <p:cSld>
     <p:spTree>
@@ -10039,7 +8391,7 @@
             <a:fld id="{0CFEC368-1D7A-4F81-ABF6-AE0E36BAF64C}" type="slidenum">
               <a:rPr lang="en-US" smtClean="0"/>
               <a:pPr/>
-              <a:t>17</a:t>
+              <a:t>14</a:t>
             </a:fld>
             <a:endParaRPr lang="en-US"/>
           </a:p>
@@ -10065,7 +8417,7 @@
 </p:sld>
 </file>
 
-<file path=ppt/slides/slide18.xml><?xml version="1.0" encoding="utf-8"?>
+<file path=ppt/slides/slide15.xml><?xml version="1.0" encoding="utf-8"?>
 <p:sld xmlns:a="http://schemas.openxmlformats.org/drawingml/2006/main" xmlns:r="http://schemas.openxmlformats.org/officeDocument/2006/relationships" xmlns:p="http://schemas.openxmlformats.org/presentationml/2006/main">
   <p:cSld>
     <p:spTree>
@@ -10169,7 +8521,7 @@
               <a:t>L</a:t>
             </a:r>
             <a:r>
-              <a:rPr lang="en-US" smtClean="0"/>
+              <a:rPr lang="en-US" dirty="0" smtClean="0"/>
               <a:t>oad </a:t>
             </a:r>
             <a:r>
@@ -10313,7 +8665,7 @@
             <a:fld id="{0CFEC368-1D7A-4F81-ABF6-AE0E36BAF64C}" type="slidenum">
               <a:rPr lang="en-US" smtClean="0"/>
               <a:pPr/>
-              <a:t>18</a:t>
+              <a:t>15</a:t>
             </a:fld>
             <a:endParaRPr lang="en-US"/>
           </a:p>
@@ -10825,6 +9177,470 @@
 </p:sld>
 </file>
 
+<file path=ppt/slides/slide16.xml><?xml version="1.0" encoding="utf-8"?>
+<p:sld xmlns:a="http://schemas.openxmlformats.org/drawingml/2006/main" xmlns:r="http://schemas.openxmlformats.org/officeDocument/2006/relationships" xmlns:p="http://schemas.openxmlformats.org/presentationml/2006/main">
+  <p:cSld>
+    <p:spTree>
+      <p:nvGrpSpPr>
+        <p:cNvPr id="1" name=""/>
+        <p:cNvGrpSpPr/>
+        <p:nvPr/>
+      </p:nvGrpSpPr>
+      <p:grpSpPr>
+        <a:xfrm>
+          <a:off x="0" y="0"/>
+          <a:ext cx="0" cy="0"/>
+          <a:chOff x="0" y="0"/>
+          <a:chExt cx="0" cy="0"/>
+        </a:xfrm>
+      </p:grpSpPr>
+      <p:sp>
+        <p:nvSpPr>
+          <p:cNvPr id="2" name="Title 1"/>
+          <p:cNvSpPr>
+            <a:spLocks noGrp="1"/>
+          </p:cNvSpPr>
+          <p:nvPr>
+            <p:ph type="title"/>
+          </p:nvPr>
+        </p:nvSpPr>
+        <p:spPr/>
+        <p:txBody>
+          <a:bodyPr>
+            <a:normAutofit/>
+          </a:bodyPr>
+          <a:lstStyle/>
+          <a:p>
+            <a:r>
+              <a:rPr lang="en-US" dirty="0"/>
+              <a:t>Load Balancing on Large Machines</a:t>
+            </a:r>
+          </a:p>
+        </p:txBody>
+      </p:sp>
+      <p:sp>
+        <p:nvSpPr>
+          <p:cNvPr id="3" name="Content Placeholder 2"/>
+          <p:cNvSpPr>
+            <a:spLocks noGrp="1"/>
+          </p:cNvSpPr>
+          <p:nvPr>
+            <p:ph idx="1"/>
+          </p:nvPr>
+        </p:nvSpPr>
+        <p:spPr/>
+        <p:txBody>
+          <a:bodyPr/>
+          <a:lstStyle/>
+          <a:p>
+            <a:r>
+              <a:rPr lang="en-US" dirty="0"/>
+              <a:t>Centralized load balancing strategies </a:t>
+            </a:r>
+            <a:r>
+              <a:rPr lang="en-US" dirty="0" smtClean="0"/>
+              <a:t>don’t </a:t>
+            </a:r>
+            <a:r>
+              <a:rPr lang="en-US" dirty="0"/>
+              <a:t>scale on extremely large machines</a:t>
+            </a:r>
+          </a:p>
+          <a:p>
+            <a:r>
+              <a:rPr lang="en-US" dirty="0"/>
+              <a:t>Limitations of centralized strategies:</a:t>
+            </a:r>
+          </a:p>
+          <a:p>
+            <a:pPr lvl="1"/>
+            <a:r>
+              <a:rPr lang="en-US" dirty="0" smtClean="0"/>
+              <a:t>Central </a:t>
+            </a:r>
+            <a:r>
+              <a:rPr lang="en-US" dirty="0"/>
+              <a:t>node: memory/communication bottleneck </a:t>
+            </a:r>
+            <a:endParaRPr lang="en-US" dirty="0" smtClean="0"/>
+          </a:p>
+          <a:p>
+            <a:pPr lvl="1"/>
+            <a:r>
+              <a:rPr lang="en-US" dirty="0" smtClean="0"/>
+              <a:t>Decision</a:t>
+            </a:r>
+            <a:r>
+              <a:rPr lang="en-US" dirty="0"/>
+              <a:t>-making algorithms tend to be very slow</a:t>
+            </a:r>
+          </a:p>
+          <a:p>
+            <a:r>
+              <a:rPr lang="en-US" dirty="0"/>
+              <a:t>Limitations of distributed strategies:</a:t>
+            </a:r>
+          </a:p>
+          <a:p>
+            <a:pPr lvl="1"/>
+            <a:r>
+              <a:rPr lang="en-US" dirty="0" smtClean="0"/>
+              <a:t>Difficult to achieve well-informed load balancing decisions</a:t>
+            </a:r>
+            <a:endParaRPr lang="en-US" dirty="0"/>
+          </a:p>
+        </p:txBody>
+      </p:sp>
+      <p:sp>
+        <p:nvSpPr>
+          <p:cNvPr id="5" name="Footer Placeholder 4"/>
+          <p:cNvSpPr>
+            <a:spLocks noGrp="1"/>
+          </p:cNvSpPr>
+          <p:nvPr>
+            <p:ph type="ftr" sz="quarter" idx="11"/>
+          </p:nvPr>
+        </p:nvSpPr>
+        <p:spPr/>
+        <p:txBody>
+          <a:bodyPr/>
+          <a:lstStyle/>
+          <a:p>
+            <a:pPr algn="r"/>
+            <a:r>
+              <a:rPr lang="en-US" smtClean="0"/>
+              <a:t>Laxmikant Kalé and PPL (UIUC) – Parallel Migratable Objects </a:t>
+            </a:r>
+            <a:endParaRPr lang="en-US" dirty="0"/>
+          </a:p>
+        </p:txBody>
+      </p:sp>
+      <p:sp>
+        <p:nvSpPr>
+          <p:cNvPr id="6" name="Slide Number Placeholder 5"/>
+          <p:cNvSpPr>
+            <a:spLocks noGrp="1"/>
+          </p:cNvSpPr>
+          <p:nvPr>
+            <p:ph type="sldNum" sz="quarter" idx="12"/>
+          </p:nvPr>
+        </p:nvSpPr>
+        <p:spPr/>
+        <p:txBody>
+          <a:bodyPr/>
+          <a:lstStyle/>
+          <a:p>
+            <a:fld id="{0CFEC368-1D7A-4F81-ABF6-AE0E36BAF64C}" type="slidenum">
+              <a:rPr lang="en-US" smtClean="0"/>
+              <a:pPr/>
+              <a:t>16</a:t>
+            </a:fld>
+            <a:endParaRPr lang="en-US"/>
+          </a:p>
+        </p:txBody>
+      </p:sp>
+    </p:spTree>
+    <p:extLst>
+      <p:ext uri="{BB962C8B-B14F-4D97-AF65-F5344CB8AC3E}">
+        <p14:creationId xmlns:p14="http://schemas.microsoft.com/office/powerpoint/2010/main" val="2075500013"/>
+      </p:ext>
+    </p:extLst>
+  </p:cSld>
+  <p:clrMapOvr>
+    <a:masterClrMapping/>
+  </p:clrMapOvr>
+  <p:timing>
+    <p:tnLst>
+      <p:par>
+        <p:cTn xmlns:p14="http://schemas.microsoft.com/office/powerpoint/2010/main" id="1" dur="indefinite" restart="never" nodeType="tmRoot"/>
+      </p:par>
+    </p:tnLst>
+  </p:timing>
+</p:sld>
+</file>
+
+<file path=ppt/slides/slide17.xml><?xml version="1.0" encoding="utf-8"?>
+<p:sld xmlns:a="http://schemas.openxmlformats.org/drawingml/2006/main" xmlns:r="http://schemas.openxmlformats.org/officeDocument/2006/relationships" xmlns:p="http://schemas.openxmlformats.org/presentationml/2006/main">
+  <p:cSld>
+    <p:spTree>
+      <p:nvGrpSpPr>
+        <p:cNvPr id="1" name=""/>
+        <p:cNvGrpSpPr/>
+        <p:nvPr/>
+      </p:nvGrpSpPr>
+      <p:grpSpPr>
+        <a:xfrm>
+          <a:off x="0" y="0"/>
+          <a:ext cx="0" cy="0"/>
+          <a:chOff x="0" y="0"/>
+          <a:chExt cx="0" cy="0"/>
+        </a:xfrm>
+      </p:grpSpPr>
+      <p:sp>
+        <p:nvSpPr>
+          <p:cNvPr id="2" name="Title 1"/>
+          <p:cNvSpPr>
+            <a:spLocks noGrp="1"/>
+          </p:cNvSpPr>
+          <p:nvPr>
+            <p:ph type="title"/>
+          </p:nvPr>
+        </p:nvSpPr>
+        <p:spPr/>
+        <p:txBody>
+          <a:bodyPr>
+            <a:normAutofit/>
+          </a:bodyPr>
+          <a:lstStyle/>
+          <a:p>
+            <a:r>
+              <a:rPr lang="en-US" dirty="0"/>
+              <a:t>Hierarchical Load Balancers</a:t>
+            </a:r>
+          </a:p>
+        </p:txBody>
+      </p:sp>
+      <p:sp>
+        <p:nvSpPr>
+          <p:cNvPr id="3" name="Content Placeholder 2"/>
+          <p:cNvSpPr>
+            <a:spLocks noGrp="1"/>
+          </p:cNvSpPr>
+          <p:nvPr>
+            <p:ph idx="1"/>
+          </p:nvPr>
+        </p:nvSpPr>
+        <p:spPr/>
+        <p:txBody>
+          <a:bodyPr anchor="ctr"/>
+          <a:lstStyle/>
+          <a:p>
+            <a:r>
+              <a:rPr lang="en-US" dirty="0"/>
+              <a:t>Partition processor allocation into processor groups </a:t>
+            </a:r>
+            <a:endParaRPr lang="en-US" dirty="0" smtClean="0"/>
+          </a:p>
+          <a:p>
+            <a:r>
+              <a:rPr lang="en-US" dirty="0" smtClean="0"/>
+              <a:t>Apply different </a:t>
+            </a:r>
+            <a:r>
+              <a:rPr lang="en-US" dirty="0"/>
+              <a:t>strategies at each level</a:t>
+            </a:r>
+          </a:p>
+          <a:p>
+            <a:r>
+              <a:rPr lang="en-US" dirty="0"/>
+              <a:t>Scalable to a large number of processors</a:t>
+            </a:r>
+          </a:p>
+        </p:txBody>
+      </p:sp>
+      <p:sp>
+        <p:nvSpPr>
+          <p:cNvPr id="5" name="Footer Placeholder 4"/>
+          <p:cNvSpPr>
+            <a:spLocks noGrp="1"/>
+          </p:cNvSpPr>
+          <p:nvPr>
+            <p:ph type="ftr" sz="quarter" idx="11"/>
+          </p:nvPr>
+        </p:nvSpPr>
+        <p:spPr/>
+        <p:txBody>
+          <a:bodyPr/>
+          <a:lstStyle/>
+          <a:p>
+            <a:pPr algn="r"/>
+            <a:r>
+              <a:rPr lang="en-US" smtClean="0"/>
+              <a:t>Laxmikant Kalé and PPL (UIUC) – Parallel Migratable Objects </a:t>
+            </a:r>
+            <a:endParaRPr lang="en-US" dirty="0"/>
+          </a:p>
+        </p:txBody>
+      </p:sp>
+      <p:sp>
+        <p:nvSpPr>
+          <p:cNvPr id="6" name="Slide Number Placeholder 5"/>
+          <p:cNvSpPr>
+            <a:spLocks noGrp="1"/>
+          </p:cNvSpPr>
+          <p:nvPr>
+            <p:ph type="sldNum" sz="quarter" idx="12"/>
+          </p:nvPr>
+        </p:nvSpPr>
+        <p:spPr/>
+        <p:txBody>
+          <a:bodyPr/>
+          <a:lstStyle/>
+          <a:p>
+            <a:fld id="{0CFEC368-1D7A-4F81-ABF6-AE0E36BAF64C}" type="slidenum">
+              <a:rPr lang="en-US" smtClean="0"/>
+              <a:pPr/>
+              <a:t>17</a:t>
+            </a:fld>
+            <a:endParaRPr lang="en-US"/>
+          </a:p>
+        </p:txBody>
+      </p:sp>
+    </p:spTree>
+    <p:extLst>
+      <p:ext uri="{BB962C8B-B14F-4D97-AF65-F5344CB8AC3E}">
+        <p14:creationId xmlns:p14="http://schemas.microsoft.com/office/powerpoint/2010/main" val="3120527482"/>
+      </p:ext>
+    </p:extLst>
+  </p:cSld>
+  <p:clrMapOvr>
+    <a:masterClrMapping/>
+  </p:clrMapOvr>
+  <p:timing>
+    <p:tnLst>
+      <p:par>
+        <p:cTn xmlns:p14="http://schemas.microsoft.com/office/powerpoint/2010/main" id="1" dur="indefinite" restart="never" nodeType="tmRoot"/>
+      </p:par>
+    </p:tnLst>
+  </p:timing>
+</p:sld>
+</file>
+
+<file path=ppt/slides/slide18.xml><?xml version="1.0" encoding="utf-8"?>
+<p:sld xmlns:a="http://schemas.openxmlformats.org/drawingml/2006/main" xmlns:r="http://schemas.openxmlformats.org/officeDocument/2006/relationships" xmlns:p="http://schemas.openxmlformats.org/presentationml/2006/main">
+  <p:cSld>
+    <p:spTree>
+      <p:nvGrpSpPr>
+        <p:cNvPr id="1" name=""/>
+        <p:cNvGrpSpPr/>
+        <p:nvPr/>
+      </p:nvGrpSpPr>
+      <p:grpSpPr>
+        <a:xfrm>
+          <a:off x="0" y="0"/>
+          <a:ext cx="0" cy="0"/>
+          <a:chOff x="0" y="0"/>
+          <a:chExt cx="0" cy="0"/>
+        </a:xfrm>
+      </p:grpSpPr>
+      <p:sp>
+        <p:nvSpPr>
+          <p:cNvPr id="2" name="Title 1"/>
+          <p:cNvSpPr>
+            <a:spLocks noGrp="1"/>
+          </p:cNvSpPr>
+          <p:nvPr>
+            <p:ph type="title"/>
+          </p:nvPr>
+        </p:nvSpPr>
+        <p:spPr/>
+        <p:txBody>
+          <a:bodyPr>
+            <a:normAutofit/>
+          </a:bodyPr>
+          <a:lstStyle/>
+          <a:p>
+            <a:r>
+              <a:rPr lang="en-US" dirty="0"/>
+              <a:t>Our Hybrid Scheme</a:t>
+            </a:r>
+          </a:p>
+        </p:txBody>
+      </p:sp>
+      <p:pic>
+        <p:nvPicPr>
+          <p:cNvPr id="7" name="Content Placeholder 6" descr="hybridLBScheme.png"/>
+          <p:cNvPicPr>
+            <a:picLocks noGrp="1" noChangeAspect="1"/>
+          </p:cNvPicPr>
+          <p:nvPr>
+            <p:ph idx="1"/>
+          </p:nvPr>
+        </p:nvPicPr>
+        <p:blipFill>
+          <a:blip r:embed="rId2">
+            <a:extLst>
+              <a:ext uri="{28A0092B-C50C-407E-A947-70E740481C1C}">
+                <a14:useLocalDpi xmlns:a14="http://schemas.microsoft.com/office/drawing/2010/main" val="0"/>
+              </a:ext>
+            </a:extLst>
+          </a:blip>
+          <a:srcRect t="-8503" b="-8503"/>
+          <a:stretch>
+            <a:fillRect/>
+          </a:stretch>
+        </p:blipFill>
+        <p:spPr/>
+      </p:pic>
+      <p:sp>
+        <p:nvSpPr>
+          <p:cNvPr id="5" name="Footer Placeholder 4"/>
+          <p:cNvSpPr>
+            <a:spLocks noGrp="1"/>
+          </p:cNvSpPr>
+          <p:nvPr>
+            <p:ph type="ftr" sz="quarter" idx="11"/>
+          </p:nvPr>
+        </p:nvSpPr>
+        <p:spPr/>
+        <p:txBody>
+          <a:bodyPr/>
+          <a:lstStyle/>
+          <a:p>
+            <a:pPr algn="r"/>
+            <a:r>
+              <a:rPr lang="en-US" smtClean="0"/>
+              <a:t>Laxmikant Kalé and PPL (UIUC) – Parallel Migratable Objects </a:t>
+            </a:r>
+            <a:endParaRPr lang="en-US" dirty="0"/>
+          </a:p>
+        </p:txBody>
+      </p:sp>
+      <p:sp>
+        <p:nvSpPr>
+          <p:cNvPr id="6" name="Slide Number Placeholder 5"/>
+          <p:cNvSpPr>
+            <a:spLocks noGrp="1"/>
+          </p:cNvSpPr>
+          <p:nvPr>
+            <p:ph type="sldNum" sz="quarter" idx="12"/>
+          </p:nvPr>
+        </p:nvSpPr>
+        <p:spPr/>
+        <p:txBody>
+          <a:bodyPr/>
+          <a:lstStyle/>
+          <a:p>
+            <a:fld id="{0CFEC368-1D7A-4F81-ABF6-AE0E36BAF64C}" type="slidenum">
+              <a:rPr lang="en-US" smtClean="0"/>
+              <a:pPr/>
+              <a:t>18</a:t>
+            </a:fld>
+            <a:endParaRPr lang="en-US"/>
+          </a:p>
+        </p:txBody>
+      </p:sp>
+    </p:spTree>
+    <p:extLst>
+      <p:ext uri="{BB962C8B-B14F-4D97-AF65-F5344CB8AC3E}">
+        <p14:creationId xmlns:p14="http://schemas.microsoft.com/office/powerpoint/2010/main" val="1948754625"/>
+      </p:ext>
+    </p:extLst>
+  </p:cSld>
+  <p:clrMapOvr>
+    <a:masterClrMapping/>
+  </p:clrMapOvr>
+  <p:timing>
+    <p:tnLst>
+      <p:par>
+        <p:cTn xmlns:p14="http://schemas.microsoft.com/office/powerpoint/2010/main" id="1" dur="indefinite" restart="never" nodeType="tmRoot"/>
+      </p:par>
+    </p:tnLst>
+  </p:timing>
+</p:sld>
+</file>
+
 <file path=ppt/slides/slide19.xml><?xml version="1.0" encoding="utf-8"?>
 <p:sld xmlns:a="http://schemas.openxmlformats.org/drawingml/2006/main" xmlns:r="http://schemas.openxmlformats.org/officeDocument/2006/relationships" xmlns:p="http://schemas.openxmlformats.org/presentationml/2006/main">
   <p:cSld>
@@ -10855,13 +9671,17 @@
         <p:spPr/>
         <p:txBody>
           <a:bodyPr>
-            <a:normAutofit/>
+            <a:normAutofit fontScale="90000"/>
           </a:bodyPr>
           <a:lstStyle/>
           <a:p>
             <a:r>
+              <a:rPr lang="en-US" dirty="0" err="1"/>
+              <a:t>MetaBalancer</a:t>
+            </a:r>
+            <a:r>
               <a:rPr lang="en-US" dirty="0"/>
-              <a:t>Load Balancing on Large Machines</a:t>
+              <a:t> - When and how to load balance?</a:t>
             </a:r>
           </a:p>
         </p:txBody>
@@ -10882,60 +9702,85 @@
           <a:lstStyle/>
           <a:p>
             <a:r>
+              <a:rPr lang="en-US" dirty="0" smtClean="0"/>
+              <a:t>Difficult </a:t>
+            </a:r>
+            <a:r>
               <a:rPr lang="en-US" dirty="0"/>
-              <a:t>Centralized load balancing strategies </a:t>
-            </a:r>
+              <a:t>to find the optimum load balancing period </a:t>
+            </a:r>
+          </a:p>
+          <a:p>
+            <a:pPr lvl="1"/>
             <a:r>
               <a:rPr lang="en-US" dirty="0" smtClean="0"/>
-              <a:t>don’t </a:t>
+              <a:t>Depends </a:t>
             </a:r>
             <a:r>
               <a:rPr lang="en-US" dirty="0"/>
-              <a:t>scale on extremely large machines</a:t>
-            </a:r>
-          </a:p>
-          <a:p>
+              <a:t>on the application </a:t>
+            </a:r>
+            <a:r>
+              <a:rPr lang="en-US" dirty="0" smtClean="0"/>
+              <a:t>characteristics</a:t>
+            </a:r>
+            <a:endParaRPr lang="en-US" dirty="0"/>
+          </a:p>
+          <a:p>
+            <a:pPr lvl="1"/>
+            <a:r>
+              <a:rPr lang="en-US" dirty="0" smtClean="0"/>
+              <a:t>Depends </a:t>
+            </a:r>
             <a:r>
               <a:rPr lang="en-US" dirty="0"/>
-              <a:t>Limitations of centralized strategies:</a:t>
-            </a:r>
-          </a:p>
-          <a:p>
-            <a:pPr lvl="1"/>
+              <a:t>on the machine the application is run on </a:t>
+            </a:r>
+          </a:p>
+          <a:p>
+            <a:r>
+              <a:rPr lang="en-US" dirty="0"/>
+              <a:t>Monitors the application continuously and predicts </a:t>
+            </a:r>
             <a:r>
               <a:rPr lang="en-US" dirty="0" smtClean="0"/>
-              <a:t>Central </a:t>
+              <a:t>behavior.</a:t>
+            </a:r>
+          </a:p>
+          <a:p>
+            <a:r>
+              <a:rPr lang="en-US" dirty="0" smtClean="0"/>
+              <a:t>Decides </a:t>
             </a:r>
             <a:r>
               <a:rPr lang="en-US" dirty="0"/>
-              <a:t>node: memory/communication bottleneck </a:t>
-            </a:r>
-            <a:endParaRPr lang="en-US" dirty="0" smtClean="0"/>
-          </a:p>
-          <a:p>
-            <a:pPr lvl="1"/>
+              <a:t>when to invoke which load </a:t>
+            </a:r>
             <a:r>
               <a:rPr lang="en-US" dirty="0" smtClean="0"/>
-              <a:t>Decision</a:t>
+              <a:t>balancer.</a:t>
+            </a:r>
+          </a:p>
+          <a:p>
+            <a:r>
+              <a:rPr lang="en-US" dirty="0" smtClean="0"/>
+              <a:t>Command </a:t>
             </a:r>
             <a:r>
               <a:rPr lang="en-US" dirty="0"/>
-              <a:t>-making algorithms tend to be very slow</a:t>
-            </a:r>
-          </a:p>
-          <a:p>
+              <a:t>line argument - +</a:t>
+            </a:r>
+            <a:r>
+              <a:rPr lang="en-US" dirty="0" err="1"/>
+              <a:t>MetaLB</a:t>
+            </a:r>
             <a:r>
               <a:rPr lang="en-US" dirty="0"/>
-              <a:t>Limitations of distributed strategies:</a:t>
-            </a:r>
-          </a:p>
-          <a:p>
-            <a:pPr lvl="1"/>
-            <a:r>
-              <a:rPr lang="en-US" dirty="0" smtClean="0"/>
-              <a:t>Difficult to achieve well-informed load balancing decisions</a:t>
-            </a:r>
-            <a:endParaRPr lang="en-US" dirty="0"/>
+              <a:t> </a:t>
+            </a:r>
+            <a:endParaRPr lang="en-US" dirty="0">
+              <a:effectLst/>
+            </a:endParaRPr>
           </a:p>
         </p:txBody>
       </p:sp>
@@ -10990,7 +9835,7 @@
     </p:spTree>
     <p:extLst>
       <p:ext uri="{BB962C8B-B14F-4D97-AF65-F5344CB8AC3E}">
-        <p14:creationId xmlns:p14="http://schemas.microsoft.com/office/powerpoint/2010/main" val="2075500013"/>
+        <p14:creationId xmlns:p14="http://schemas.microsoft.com/office/powerpoint/2010/main" val="3819061467"/>
       </p:ext>
     </p:extLst>
   </p:cSld>
@@ -11555,499 +10400,6 @@
         <p:spPr/>
         <p:txBody>
           <a:bodyPr>
-            <a:normAutofit/>
-          </a:bodyPr>
-          <a:lstStyle/>
-          <a:p>
-            <a:r>
-              <a:rPr lang="en-US" dirty="0"/>
-              <a:t>Hierarchical Load Balancers</a:t>
-            </a:r>
-          </a:p>
-        </p:txBody>
-      </p:sp>
-      <p:sp>
-        <p:nvSpPr>
-          <p:cNvPr id="3" name="Content Placeholder 2"/>
-          <p:cNvSpPr>
-            <a:spLocks noGrp="1"/>
-          </p:cNvSpPr>
-          <p:nvPr>
-            <p:ph idx="1"/>
-          </p:nvPr>
-        </p:nvSpPr>
-        <p:spPr/>
-        <p:txBody>
-          <a:bodyPr anchor="ctr"/>
-          <a:lstStyle/>
-          <a:p>
-            <a:r>
-              <a:rPr lang="en-US" dirty="0"/>
-              <a:t>Partition processor allocation into processor groups </a:t>
-            </a:r>
-            <a:endParaRPr lang="en-US" dirty="0" smtClean="0"/>
-          </a:p>
-          <a:p>
-            <a:r>
-              <a:rPr lang="en-US" dirty="0" smtClean="0"/>
-              <a:t>Apply different </a:t>
-            </a:r>
-            <a:r>
-              <a:rPr lang="en-US" dirty="0"/>
-              <a:t>strategies at each level</a:t>
-            </a:r>
-          </a:p>
-          <a:p>
-            <a:r>
-              <a:rPr lang="en-US" dirty="0"/>
-              <a:t>Scalable to a large number of processors</a:t>
-            </a:r>
-          </a:p>
-        </p:txBody>
-      </p:sp>
-      <p:sp>
-        <p:nvSpPr>
-          <p:cNvPr id="5" name="Footer Placeholder 4"/>
-          <p:cNvSpPr>
-            <a:spLocks noGrp="1"/>
-          </p:cNvSpPr>
-          <p:nvPr>
-            <p:ph type="ftr" sz="quarter" idx="11"/>
-          </p:nvPr>
-        </p:nvSpPr>
-        <p:spPr/>
-        <p:txBody>
-          <a:bodyPr/>
-          <a:lstStyle/>
-          <a:p>
-            <a:pPr algn="r"/>
-            <a:r>
-              <a:rPr lang="en-US" smtClean="0"/>
-              <a:t>Laxmikant Kalé and PPL (UIUC) – Parallel Migratable Objects </a:t>
-            </a:r>
-            <a:endParaRPr lang="en-US" dirty="0"/>
-          </a:p>
-        </p:txBody>
-      </p:sp>
-      <p:sp>
-        <p:nvSpPr>
-          <p:cNvPr id="6" name="Slide Number Placeholder 5"/>
-          <p:cNvSpPr>
-            <a:spLocks noGrp="1"/>
-          </p:cNvSpPr>
-          <p:nvPr>
-            <p:ph type="sldNum" sz="quarter" idx="12"/>
-          </p:nvPr>
-        </p:nvSpPr>
-        <p:spPr/>
-        <p:txBody>
-          <a:bodyPr/>
-          <a:lstStyle/>
-          <a:p>
-            <a:fld id="{0CFEC368-1D7A-4F81-ABF6-AE0E36BAF64C}" type="slidenum">
-              <a:rPr lang="en-US" smtClean="0"/>
-              <a:pPr/>
-              <a:t>20</a:t>
-            </a:fld>
-            <a:endParaRPr lang="en-US"/>
-          </a:p>
-        </p:txBody>
-      </p:sp>
-    </p:spTree>
-    <p:extLst>
-      <p:ext uri="{BB962C8B-B14F-4D97-AF65-F5344CB8AC3E}">
-        <p14:creationId xmlns:p14="http://schemas.microsoft.com/office/powerpoint/2010/main" val="3120527482"/>
-      </p:ext>
-    </p:extLst>
-  </p:cSld>
-  <p:clrMapOvr>
-    <a:masterClrMapping/>
-  </p:clrMapOvr>
-  <p:timing>
-    <p:tnLst>
-      <p:par>
-        <p:cTn xmlns:p14="http://schemas.microsoft.com/office/powerpoint/2010/main" id="1" dur="indefinite" restart="never" nodeType="tmRoot"/>
-      </p:par>
-    </p:tnLst>
-  </p:timing>
-</p:sld>
-</file>
-
-<file path=ppt/slides/slide21.xml><?xml version="1.0" encoding="utf-8"?>
-<p:sld xmlns:a="http://schemas.openxmlformats.org/drawingml/2006/main" xmlns:r="http://schemas.openxmlformats.org/officeDocument/2006/relationships" xmlns:p="http://schemas.openxmlformats.org/presentationml/2006/main">
-  <p:cSld>
-    <p:spTree>
-      <p:nvGrpSpPr>
-        <p:cNvPr id="1" name=""/>
-        <p:cNvGrpSpPr/>
-        <p:nvPr/>
-      </p:nvGrpSpPr>
-      <p:grpSpPr>
-        <a:xfrm>
-          <a:off x="0" y="0"/>
-          <a:ext cx="0" cy="0"/>
-          <a:chOff x="0" y="0"/>
-          <a:chExt cx="0" cy="0"/>
-        </a:xfrm>
-      </p:grpSpPr>
-      <p:sp>
-        <p:nvSpPr>
-          <p:cNvPr id="2" name="Title 1"/>
-          <p:cNvSpPr>
-            <a:spLocks noGrp="1"/>
-          </p:cNvSpPr>
-          <p:nvPr>
-            <p:ph type="title"/>
-          </p:nvPr>
-        </p:nvSpPr>
-        <p:spPr/>
-        <p:txBody>
-          <a:bodyPr>
-            <a:normAutofit/>
-          </a:bodyPr>
-          <a:lstStyle/>
-          <a:p>
-            <a:r>
-              <a:rPr lang="en-US" dirty="0"/>
-              <a:t>Our Hybrid Scheme</a:t>
-            </a:r>
-          </a:p>
-        </p:txBody>
-      </p:sp>
-      <p:pic>
-        <p:nvPicPr>
-          <p:cNvPr id="7" name="Content Placeholder 6" descr="hybridLBScheme.png"/>
-          <p:cNvPicPr>
-            <a:picLocks noGrp="1" noChangeAspect="1"/>
-          </p:cNvPicPr>
-          <p:nvPr>
-            <p:ph idx="1"/>
-          </p:nvPr>
-        </p:nvPicPr>
-        <p:blipFill>
-          <a:blip r:embed="rId2">
-            <a:extLst>
-              <a:ext uri="{28A0092B-C50C-407E-A947-70E740481C1C}">
-                <a14:useLocalDpi xmlns:a14="http://schemas.microsoft.com/office/drawing/2010/main" val="0"/>
-              </a:ext>
-            </a:extLst>
-          </a:blip>
-          <a:srcRect t="-8503" b="-8503"/>
-          <a:stretch>
-            <a:fillRect/>
-          </a:stretch>
-        </p:blipFill>
-        <p:spPr/>
-      </p:pic>
-      <p:sp>
-        <p:nvSpPr>
-          <p:cNvPr id="5" name="Footer Placeholder 4"/>
-          <p:cNvSpPr>
-            <a:spLocks noGrp="1"/>
-          </p:cNvSpPr>
-          <p:nvPr>
-            <p:ph type="ftr" sz="quarter" idx="11"/>
-          </p:nvPr>
-        </p:nvSpPr>
-        <p:spPr/>
-        <p:txBody>
-          <a:bodyPr/>
-          <a:lstStyle/>
-          <a:p>
-            <a:pPr algn="r"/>
-            <a:r>
-              <a:rPr lang="en-US" smtClean="0"/>
-              <a:t>Laxmikant Kalé and PPL (UIUC) – Parallel Migratable Objects </a:t>
-            </a:r>
-            <a:endParaRPr lang="en-US" dirty="0"/>
-          </a:p>
-        </p:txBody>
-      </p:sp>
-      <p:sp>
-        <p:nvSpPr>
-          <p:cNvPr id="6" name="Slide Number Placeholder 5"/>
-          <p:cNvSpPr>
-            <a:spLocks noGrp="1"/>
-          </p:cNvSpPr>
-          <p:nvPr>
-            <p:ph type="sldNum" sz="quarter" idx="12"/>
-          </p:nvPr>
-        </p:nvSpPr>
-        <p:spPr/>
-        <p:txBody>
-          <a:bodyPr/>
-          <a:lstStyle/>
-          <a:p>
-            <a:fld id="{0CFEC368-1D7A-4F81-ABF6-AE0E36BAF64C}" type="slidenum">
-              <a:rPr lang="en-US" smtClean="0"/>
-              <a:pPr/>
-              <a:t>21</a:t>
-            </a:fld>
-            <a:endParaRPr lang="en-US"/>
-          </a:p>
-        </p:txBody>
-      </p:sp>
-    </p:spTree>
-    <p:extLst>
-      <p:ext uri="{BB962C8B-B14F-4D97-AF65-F5344CB8AC3E}">
-        <p14:creationId xmlns:p14="http://schemas.microsoft.com/office/powerpoint/2010/main" val="1948754625"/>
-      </p:ext>
-    </p:extLst>
-  </p:cSld>
-  <p:clrMapOvr>
-    <a:masterClrMapping/>
-  </p:clrMapOvr>
-  <p:timing>
-    <p:tnLst>
-      <p:par>
-        <p:cTn xmlns:p14="http://schemas.microsoft.com/office/powerpoint/2010/main" id="1" dur="indefinite" restart="never" nodeType="tmRoot"/>
-      </p:par>
-    </p:tnLst>
-  </p:timing>
-</p:sld>
-</file>
-
-<file path=ppt/slides/slide22.xml><?xml version="1.0" encoding="utf-8"?>
-<p:sld xmlns:a="http://schemas.openxmlformats.org/drawingml/2006/main" xmlns:r="http://schemas.openxmlformats.org/officeDocument/2006/relationships" xmlns:p="http://schemas.openxmlformats.org/presentationml/2006/main">
-  <p:cSld>
-    <p:spTree>
-      <p:nvGrpSpPr>
-        <p:cNvPr id="1" name=""/>
-        <p:cNvGrpSpPr/>
-        <p:nvPr/>
-      </p:nvGrpSpPr>
-      <p:grpSpPr>
-        <a:xfrm>
-          <a:off x="0" y="0"/>
-          <a:ext cx="0" cy="0"/>
-          <a:chOff x="0" y="0"/>
-          <a:chExt cx="0" cy="0"/>
-        </a:xfrm>
-      </p:grpSpPr>
-      <p:sp>
-        <p:nvSpPr>
-          <p:cNvPr id="2" name="Title 1"/>
-          <p:cNvSpPr>
-            <a:spLocks noGrp="1"/>
-          </p:cNvSpPr>
-          <p:nvPr>
-            <p:ph type="title"/>
-          </p:nvPr>
-        </p:nvSpPr>
-        <p:spPr/>
-        <p:txBody>
-          <a:bodyPr>
-            <a:normAutofit fontScale="90000"/>
-          </a:bodyPr>
-          <a:lstStyle/>
-          <a:p>
-            <a:r>
-              <a:rPr lang="en-US" dirty="0" err="1"/>
-              <a:t>MetaBalancer</a:t>
-            </a:r>
-            <a:r>
-              <a:rPr lang="en-US" dirty="0"/>
-              <a:t> - When and how to load balance?</a:t>
-            </a:r>
-          </a:p>
-        </p:txBody>
-      </p:sp>
-      <p:sp>
-        <p:nvSpPr>
-          <p:cNvPr id="3" name="Content Placeholder 2"/>
-          <p:cNvSpPr>
-            <a:spLocks noGrp="1"/>
-          </p:cNvSpPr>
-          <p:nvPr>
-            <p:ph idx="1"/>
-          </p:nvPr>
-        </p:nvSpPr>
-        <p:spPr/>
-        <p:txBody>
-          <a:bodyPr/>
-          <a:lstStyle/>
-          <a:p>
-            <a:r>
-              <a:rPr lang="en-US" dirty="0" smtClean="0"/>
-              <a:t>Difficult </a:t>
-            </a:r>
-            <a:r>
-              <a:rPr lang="en-US" dirty="0"/>
-              <a:t>to find the optimum load balancing period </a:t>
-            </a:r>
-          </a:p>
-          <a:p>
-            <a:pPr lvl="1"/>
-            <a:r>
-              <a:rPr lang="en-US" dirty="0" smtClean="0"/>
-              <a:t>Depends </a:t>
-            </a:r>
-            <a:r>
-              <a:rPr lang="en-US" dirty="0"/>
-              <a:t>on the application </a:t>
-            </a:r>
-            <a:r>
-              <a:rPr lang="en-US" dirty="0" smtClean="0"/>
-              <a:t>characteristics</a:t>
-            </a:r>
-            <a:endParaRPr lang="en-US" dirty="0"/>
-          </a:p>
-          <a:p>
-            <a:pPr lvl="1"/>
-            <a:r>
-              <a:rPr lang="en-US" dirty="0" smtClean="0"/>
-              <a:t>Depends </a:t>
-            </a:r>
-            <a:r>
-              <a:rPr lang="en-US" dirty="0"/>
-              <a:t>on the machine the application is run on </a:t>
-            </a:r>
-          </a:p>
-          <a:p>
-            <a:r>
-              <a:rPr lang="en-US" dirty="0"/>
-              <a:t>Monitors the application continuously and predicts </a:t>
-            </a:r>
-            <a:r>
-              <a:rPr lang="en-US" dirty="0" smtClean="0"/>
-              <a:t>behavior.</a:t>
-            </a:r>
-          </a:p>
-          <a:p>
-            <a:r>
-              <a:rPr lang="en-US" dirty="0" smtClean="0"/>
-              <a:t>Decides </a:t>
-            </a:r>
-            <a:r>
-              <a:rPr lang="en-US" dirty="0"/>
-              <a:t>when to invoke which load </a:t>
-            </a:r>
-            <a:r>
-              <a:rPr lang="en-US" dirty="0" smtClean="0"/>
-              <a:t>balancer.</a:t>
-            </a:r>
-          </a:p>
-          <a:p>
-            <a:r>
-              <a:rPr lang="en-US" dirty="0" smtClean="0"/>
-              <a:t>Command </a:t>
-            </a:r>
-            <a:r>
-              <a:rPr lang="en-US" dirty="0"/>
-              <a:t>line argument - +</a:t>
-            </a:r>
-            <a:r>
-              <a:rPr lang="en-US" dirty="0" err="1"/>
-              <a:t>MetaLB</a:t>
-            </a:r>
-            <a:r>
-              <a:rPr lang="en-US" dirty="0"/>
-              <a:t> </a:t>
-            </a:r>
-            <a:endParaRPr lang="en-US" dirty="0">
-              <a:effectLst/>
-            </a:endParaRPr>
-          </a:p>
-        </p:txBody>
-      </p:sp>
-      <p:sp>
-        <p:nvSpPr>
-          <p:cNvPr id="5" name="Footer Placeholder 4"/>
-          <p:cNvSpPr>
-            <a:spLocks noGrp="1"/>
-          </p:cNvSpPr>
-          <p:nvPr>
-            <p:ph type="ftr" sz="quarter" idx="11"/>
-          </p:nvPr>
-        </p:nvSpPr>
-        <p:spPr/>
-        <p:txBody>
-          <a:bodyPr/>
-          <a:lstStyle/>
-          <a:p>
-            <a:pPr algn="r"/>
-            <a:r>
-              <a:rPr lang="en-US" smtClean="0"/>
-              <a:t>Laxmikant Kalé and PPL (UIUC) – Parallel Migratable Objects </a:t>
-            </a:r>
-            <a:endParaRPr lang="en-US" dirty="0"/>
-          </a:p>
-        </p:txBody>
-      </p:sp>
-      <p:sp>
-        <p:nvSpPr>
-          <p:cNvPr id="6" name="Slide Number Placeholder 5"/>
-          <p:cNvSpPr>
-            <a:spLocks noGrp="1"/>
-          </p:cNvSpPr>
-          <p:nvPr>
-            <p:ph type="sldNum" sz="quarter" idx="12"/>
-          </p:nvPr>
-        </p:nvSpPr>
-        <p:spPr/>
-        <p:txBody>
-          <a:bodyPr/>
-          <a:lstStyle/>
-          <a:p>
-            <a:fld id="{0CFEC368-1D7A-4F81-ABF6-AE0E36BAF64C}" type="slidenum">
-              <a:rPr lang="en-US" smtClean="0"/>
-              <a:pPr/>
-              <a:t>22</a:t>
-            </a:fld>
-            <a:endParaRPr lang="en-US"/>
-          </a:p>
-        </p:txBody>
-      </p:sp>
-    </p:spTree>
-    <p:extLst>
-      <p:ext uri="{BB962C8B-B14F-4D97-AF65-F5344CB8AC3E}">
-        <p14:creationId xmlns:p14="http://schemas.microsoft.com/office/powerpoint/2010/main" val="3819061467"/>
-      </p:ext>
-    </p:extLst>
-  </p:cSld>
-  <p:clrMapOvr>
-    <a:masterClrMapping/>
-  </p:clrMapOvr>
-  <p:timing>
-    <p:tnLst>
-      <p:par>
-        <p:cTn xmlns:p14="http://schemas.microsoft.com/office/powerpoint/2010/main" id="1" dur="indefinite" restart="never" nodeType="tmRoot"/>
-      </p:par>
-    </p:tnLst>
-  </p:timing>
-</p:sld>
-</file>
-
-<file path=ppt/slides/slide23.xml><?xml version="1.0" encoding="utf-8"?>
-<p:sld xmlns:a="http://schemas.openxmlformats.org/drawingml/2006/main" xmlns:r="http://schemas.openxmlformats.org/officeDocument/2006/relationships" xmlns:p="http://schemas.openxmlformats.org/presentationml/2006/main">
-  <p:cSld>
-    <p:spTree>
-      <p:nvGrpSpPr>
-        <p:cNvPr id="1" name=""/>
-        <p:cNvGrpSpPr/>
-        <p:nvPr/>
-      </p:nvGrpSpPr>
-      <p:grpSpPr>
-        <a:xfrm>
-          <a:off x="0" y="0"/>
-          <a:ext cx="0" cy="0"/>
-          <a:chOff x="0" y="0"/>
-          <a:chExt cx="0" cy="0"/>
-        </a:xfrm>
-      </p:grpSpPr>
-      <p:sp>
-        <p:nvSpPr>
-          <p:cNvPr id="2" name="Title 1"/>
-          <p:cNvSpPr>
-            <a:spLocks noGrp="1"/>
-          </p:cNvSpPr>
-          <p:nvPr>
-            <p:ph type="title"/>
-          </p:nvPr>
-        </p:nvSpPr>
-        <p:spPr/>
-        <p:txBody>
-          <a:bodyPr>
             <a:normAutofit fontScale="90000"/>
           </a:bodyPr>
           <a:lstStyle/>
@@ -12140,7 +10492,7 @@
             <a:fld id="{0CFEC368-1D7A-4F81-ABF6-AE0E36BAF64C}" type="slidenum">
               <a:rPr lang="en-US" smtClean="0"/>
               <a:pPr/>
-              <a:t>23</a:t>
+              <a:t>20</a:t>
             </a:fld>
             <a:endParaRPr lang="en-US"/>
           </a:p>
@@ -14919,7 +13271,7 @@
           <a:p>
             <a:r>
               <a:rPr lang="en-US" dirty="0"/>
-              <a:t>How to Diagnose Load Imbalance</a:t>
+              <a:t>Golden Rule of Load Balancing</a:t>
             </a:r>
           </a:p>
         </p:txBody>
@@ -14932,163 +13284,6 @@
           </p:cNvSpPr>
           <p:nvPr>
             <p:ph idx="1"/>
-          </p:nvPr>
-        </p:nvSpPr>
-        <p:spPr/>
-        <p:txBody>
-          <a:bodyPr anchor="ctr"/>
-          <a:lstStyle/>
-          <a:p>
-            <a:r>
-              <a:rPr lang="en-US" dirty="0"/>
-              <a:t>Often hidden in statements such as:</a:t>
-            </a:r>
-          </a:p>
-          <a:p>
-            <a:pPr lvl="1"/>
-            <a:r>
-              <a:rPr lang="en-US" dirty="0" smtClean="0"/>
-              <a:t>Very </a:t>
-            </a:r>
-            <a:r>
-              <a:rPr lang="en-US" dirty="0"/>
-              <a:t>high synchronization overhead</a:t>
-            </a:r>
-          </a:p>
-          <a:p>
-            <a:pPr lvl="2"/>
-            <a:r>
-              <a:rPr lang="en-US" dirty="0" smtClean="0"/>
-              <a:t>Most </a:t>
-            </a:r>
-            <a:r>
-              <a:rPr lang="en-US" dirty="0"/>
-              <a:t>processors are waiting at a reduction</a:t>
-            </a:r>
-          </a:p>
-          <a:p>
-            <a:r>
-              <a:rPr lang="en-US" dirty="0"/>
-              <a:t>Count total amount of computation (ops/flops) per processor</a:t>
-            </a:r>
-          </a:p>
-          <a:p>
-            <a:pPr lvl="1"/>
-            <a:r>
-              <a:rPr lang="en-US" dirty="0" smtClean="0"/>
-              <a:t>In </a:t>
-            </a:r>
-            <a:r>
-              <a:rPr lang="en-US" dirty="0"/>
-              <a:t>each phase!</a:t>
-            </a:r>
-          </a:p>
-          <a:p>
-            <a:pPr lvl="1"/>
-            <a:r>
-              <a:rPr lang="en-US" dirty="0" smtClean="0"/>
-              <a:t>Because </a:t>
-            </a:r>
-            <a:r>
-              <a:rPr lang="en-US" dirty="0"/>
-              <a:t>the balance may change from phase to phase</a:t>
-            </a:r>
-          </a:p>
-        </p:txBody>
-      </p:sp>
-      <p:sp>
-        <p:nvSpPr>
-          <p:cNvPr id="5" name="Footer Placeholder 4"/>
-          <p:cNvSpPr>
-            <a:spLocks noGrp="1"/>
-          </p:cNvSpPr>
-          <p:nvPr>
-            <p:ph type="ftr" sz="quarter" idx="11"/>
-          </p:nvPr>
-        </p:nvSpPr>
-        <p:spPr/>
-        <p:txBody>
-          <a:bodyPr/>
-          <a:lstStyle/>
-          <a:p>
-            <a:pPr algn="r"/>
-            <a:r>
-              <a:rPr lang="en-US" smtClean="0"/>
-              <a:t>Laxmikant Kalé and PPL (UIUC) – Parallel Migratable Objects </a:t>
-            </a:r>
-            <a:endParaRPr lang="en-US" dirty="0"/>
-          </a:p>
-        </p:txBody>
-      </p:sp>
-      <p:sp>
-        <p:nvSpPr>
-          <p:cNvPr id="6" name="Slide Number Placeholder 5"/>
-          <p:cNvSpPr>
-            <a:spLocks noGrp="1"/>
-          </p:cNvSpPr>
-          <p:nvPr>
-            <p:ph type="sldNum" sz="quarter" idx="12"/>
-          </p:nvPr>
-        </p:nvSpPr>
-        <p:spPr/>
-        <p:txBody>
-          <a:bodyPr/>
-          <a:lstStyle/>
-          <a:p>
-            <a:fld id="{0CFEC368-1D7A-4F81-ABF6-AE0E36BAF64C}" type="slidenum">
-              <a:rPr lang="en-US" smtClean="0"/>
-              <a:pPr/>
-              <a:t>8</a:t>
-            </a:fld>
-            <a:endParaRPr lang="en-US"/>
-          </a:p>
-        </p:txBody>
-      </p:sp>
-    </p:spTree>
-    <p:extLst>
-      <p:ext uri="{BB962C8B-B14F-4D97-AF65-F5344CB8AC3E}">
-        <p14:creationId xmlns:p14="http://schemas.microsoft.com/office/powerpoint/2010/main" val="1708635662"/>
-      </p:ext>
-    </p:extLst>
-  </p:cSld>
-  <p:clrMapOvr>
-    <a:masterClrMapping/>
-  </p:clrMapOvr>
-  <p:timing>
-    <p:tnLst>
-      <p:par>
-        <p:cTn xmlns:p14="http://schemas.microsoft.com/office/powerpoint/2010/main" id="1" dur="indefinite" restart="never" nodeType="tmRoot"/>
-      </p:par>
-    </p:tnLst>
-  </p:timing>
-</p:sld>
-</file>
-
-<file path=ppt/slides/slide9.xml><?xml version="1.0" encoding="utf-8"?>
-<p:sld xmlns:a="http://schemas.openxmlformats.org/drawingml/2006/main" xmlns:r="http://schemas.openxmlformats.org/officeDocument/2006/relationships" xmlns:p="http://schemas.openxmlformats.org/presentationml/2006/main">
-  <p:cSld>
-    <p:spTree>
-      <p:nvGrpSpPr>
-        <p:cNvPr id="1" name=""/>
-        <p:cNvGrpSpPr/>
-        <p:nvPr/>
-      </p:nvGrpSpPr>
-      <p:grpSpPr>
-        <a:xfrm>
-          <a:off x="0" y="0"/>
-          <a:ext cx="0" cy="0"/>
-          <a:chOff x="0" y="0"/>
-          <a:chExt cx="0" cy="0"/>
-        </a:xfrm>
-      </p:grpSpPr>
-      <p:sp>
-        <p:nvSpPr>
-          <p:cNvPr id="2" name="Title 1"/>
-          <p:cNvSpPr>
-            <a:spLocks noGrp="1"/>
-          </p:cNvSpPr>
-          <p:nvPr>
-            <p:ph type="title"/>
           </p:nvPr>
         </p:nvSpPr>
         <p:spPr/>
@@ -15098,30 +13293,6 @@
           </a:bodyPr>
           <a:lstStyle/>
           <a:p>
-            <a:r>
-              <a:rPr lang="en-US" dirty="0"/>
-              <a:t>Golden Rule of Load Balancing</a:t>
-            </a:r>
-          </a:p>
-        </p:txBody>
-      </p:sp>
-      <p:sp>
-        <p:nvSpPr>
-          <p:cNvPr id="3" name="Content Placeholder 2"/>
-          <p:cNvSpPr>
-            <a:spLocks noGrp="1"/>
-          </p:cNvSpPr>
-          <p:nvPr>
-            <p:ph idx="1"/>
-          </p:nvPr>
-        </p:nvSpPr>
-        <p:spPr/>
-        <p:txBody>
-          <a:bodyPr>
-            <a:normAutofit/>
-          </a:bodyPr>
-          <a:lstStyle/>
-          <a:p>
             <a:pPr marL="0" indent="0">
               <a:buNone/>
             </a:pPr>
@@ -15295,7 +13466,7 @@
             <a:fld id="{0CFEC368-1D7A-4F81-ABF6-AE0E36BAF64C}" type="slidenum">
               <a:rPr lang="en-US" smtClean="0"/>
               <a:pPr/>
-              <a:t>9</a:t>
+              <a:t>8</a:t>
             </a:fld>
             <a:endParaRPr lang="en-US"/>
           </a:p>
@@ -15689,6 +13860,672 @@
         </p:cTn>
       </p:par>
     </p:tnLst>
+  </p:timing>
+</p:sld>
+</file>
+
+<file path=ppt/slides/slide9.xml><?xml version="1.0" encoding="utf-8"?>
+<p:sld xmlns:a="http://schemas.openxmlformats.org/drawingml/2006/main" xmlns:r="http://schemas.openxmlformats.org/officeDocument/2006/relationships" xmlns:p="http://schemas.openxmlformats.org/presentationml/2006/main">
+  <p:cSld>
+    <p:spTree>
+      <p:nvGrpSpPr>
+        <p:cNvPr id="1" name=""/>
+        <p:cNvGrpSpPr/>
+        <p:nvPr/>
+      </p:nvGrpSpPr>
+      <p:grpSpPr>
+        <a:xfrm>
+          <a:off x="0" y="0"/>
+          <a:ext cx="0" cy="0"/>
+          <a:chOff x="0" y="0"/>
+          <a:chExt cx="0" cy="0"/>
+        </a:xfrm>
+      </p:grpSpPr>
+      <p:sp>
+        <p:nvSpPr>
+          <p:cNvPr id="2" name="Title 1"/>
+          <p:cNvSpPr>
+            <a:spLocks noGrp="1"/>
+          </p:cNvSpPr>
+          <p:nvPr>
+            <p:ph type="title"/>
+          </p:nvPr>
+        </p:nvSpPr>
+        <p:spPr/>
+        <p:txBody>
+          <a:bodyPr>
+            <a:normAutofit/>
+          </a:bodyPr>
+          <a:lstStyle/>
+          <a:p>
+            <a:r>
+              <a:rPr lang="en-US" dirty="0"/>
+              <a:t>Load Balancing Strategies</a:t>
+            </a:r>
+          </a:p>
+        </p:txBody>
+      </p:sp>
+      <p:sp>
+        <p:nvSpPr>
+          <p:cNvPr id="3" name="Content Placeholder 2"/>
+          <p:cNvSpPr>
+            <a:spLocks noGrp="1"/>
+          </p:cNvSpPr>
+          <p:nvPr>
+            <p:ph idx="1"/>
+          </p:nvPr>
+        </p:nvSpPr>
+        <p:spPr/>
+        <p:txBody>
+          <a:bodyPr>
+            <a:normAutofit/>
+          </a:bodyPr>
+          <a:lstStyle/>
+          <a:p>
+            <a:r>
+              <a:rPr lang="en-US" dirty="0"/>
+              <a:t>Classified by when it is done:</a:t>
+            </a:r>
+          </a:p>
+          <a:p>
+            <a:pPr lvl="1"/>
+            <a:r>
+              <a:rPr lang="en-US" dirty="0" smtClean="0"/>
+              <a:t>Initially</a:t>
+            </a:r>
+            <a:endParaRPr lang="en-US" dirty="0"/>
+          </a:p>
+          <a:p>
+            <a:pPr lvl="1"/>
+            <a:r>
+              <a:rPr lang="en-US" dirty="0" smtClean="0"/>
+              <a:t>Dynamic</a:t>
+            </a:r>
+            <a:r>
+              <a:rPr lang="en-US" dirty="0"/>
+              <a:t>: Periodically </a:t>
+            </a:r>
+            <a:endParaRPr lang="en-US" dirty="0" smtClean="0"/>
+          </a:p>
+          <a:p>
+            <a:pPr lvl="1"/>
+            <a:r>
+              <a:rPr lang="en-US" dirty="0" smtClean="0"/>
+              <a:t>Dynamic</a:t>
+            </a:r>
+            <a:r>
+              <a:rPr lang="en-US" dirty="0"/>
+              <a:t>: Continuously</a:t>
+            </a:r>
+          </a:p>
+          <a:p>
+            <a:r>
+              <a:rPr lang="en-US" dirty="0"/>
+              <a:t>Classified by whether decisions are taken with global information</a:t>
+            </a:r>
+          </a:p>
+          <a:p>
+            <a:pPr lvl="1"/>
+            <a:r>
+              <a:rPr lang="en-US" dirty="0" smtClean="0"/>
+              <a:t>Fully </a:t>
+            </a:r>
+            <a:r>
+              <a:rPr lang="en-US" dirty="0"/>
+              <a:t>centralized</a:t>
+            </a:r>
+          </a:p>
+          <a:p>
+            <a:pPr lvl="2"/>
+            <a:r>
+              <a:rPr lang="en-US" dirty="0" smtClean="0"/>
+              <a:t>Quite </a:t>
+            </a:r>
+            <a:r>
+              <a:rPr lang="en-US" dirty="0" smtClean="0"/>
+              <a:t>a good </a:t>
+            </a:r>
+            <a:r>
+              <a:rPr lang="en-US" dirty="0"/>
+              <a:t>choice when load balancing period is high</a:t>
+            </a:r>
+          </a:p>
+          <a:p>
+            <a:pPr lvl="1"/>
+            <a:r>
+              <a:rPr lang="en-US" dirty="0" smtClean="0"/>
+              <a:t>Fully </a:t>
+            </a:r>
+            <a:r>
+              <a:rPr lang="en-US" dirty="0"/>
+              <a:t>distributed</a:t>
+            </a:r>
+          </a:p>
+          <a:p>
+            <a:pPr lvl="2"/>
+            <a:r>
+              <a:rPr lang="en-US" dirty="0" smtClean="0"/>
+              <a:t>Each </a:t>
+            </a:r>
+            <a:r>
+              <a:rPr lang="en-US" dirty="0"/>
+              <a:t>processor knows only about a constant number of neighbors</a:t>
+            </a:r>
+          </a:p>
+          <a:p>
+            <a:pPr lvl="2"/>
+            <a:r>
+              <a:rPr lang="en-US" dirty="0" smtClean="0"/>
+              <a:t>Extreme </a:t>
+            </a:r>
+            <a:r>
+              <a:rPr lang="en-US" dirty="0"/>
+              <a:t>case: totally local decision (send work to a random </a:t>
+            </a:r>
+            <a:r>
+              <a:rPr lang="en-US" dirty="0" smtClean="0"/>
+              <a:t>destination processor</a:t>
+            </a:r>
+            <a:r>
+              <a:rPr lang="en-US" dirty="0"/>
+              <a:t>, with some probability).</a:t>
+            </a:r>
+          </a:p>
+          <a:p>
+            <a:pPr lvl="1"/>
+            <a:r>
+              <a:rPr lang="en-US" dirty="0" smtClean="0"/>
+              <a:t>Use </a:t>
+            </a:r>
+            <a:r>
+              <a:rPr lang="en-US" i="1" dirty="0"/>
+              <a:t>aggregated</a:t>
+            </a:r>
+            <a:r>
+              <a:rPr lang="en-US" dirty="0"/>
+              <a:t> global information, and </a:t>
+            </a:r>
+            <a:r>
+              <a:rPr lang="en-US" i="1" dirty="0"/>
+              <a:t>detailed </a:t>
+            </a:r>
+            <a:r>
+              <a:rPr lang="en-US" dirty="0"/>
+              <a:t>neighborhood info.</a:t>
+            </a:r>
+          </a:p>
+        </p:txBody>
+      </p:sp>
+      <p:sp>
+        <p:nvSpPr>
+          <p:cNvPr id="5" name="Footer Placeholder 4"/>
+          <p:cNvSpPr>
+            <a:spLocks noGrp="1"/>
+          </p:cNvSpPr>
+          <p:nvPr>
+            <p:ph type="ftr" sz="quarter" idx="11"/>
+          </p:nvPr>
+        </p:nvSpPr>
+        <p:spPr/>
+        <p:txBody>
+          <a:bodyPr/>
+          <a:lstStyle/>
+          <a:p>
+            <a:pPr algn="r"/>
+            <a:r>
+              <a:rPr lang="en-US" smtClean="0"/>
+              <a:t>Laxmikant Kalé and PPL (UIUC) – Parallel Migratable Objects </a:t>
+            </a:r>
+            <a:endParaRPr lang="en-US" dirty="0"/>
+          </a:p>
+        </p:txBody>
+      </p:sp>
+      <p:sp>
+        <p:nvSpPr>
+          <p:cNvPr id="6" name="Slide Number Placeholder 5"/>
+          <p:cNvSpPr>
+            <a:spLocks noGrp="1"/>
+          </p:cNvSpPr>
+          <p:nvPr>
+            <p:ph type="sldNum" sz="quarter" idx="12"/>
+          </p:nvPr>
+        </p:nvSpPr>
+        <p:spPr/>
+        <p:txBody>
+          <a:bodyPr/>
+          <a:lstStyle/>
+          <a:p>
+            <a:fld id="{0CFEC368-1D7A-4F81-ABF6-AE0E36BAF64C}" type="slidenum">
+              <a:rPr lang="en-US" smtClean="0"/>
+              <a:pPr/>
+              <a:t>9</a:t>
+            </a:fld>
+            <a:endParaRPr lang="en-US"/>
+          </a:p>
+        </p:txBody>
+      </p:sp>
+    </p:spTree>
+    <p:extLst>
+      <p:ext uri="{BB962C8B-B14F-4D97-AF65-F5344CB8AC3E}">
+        <p14:creationId xmlns:p14="http://schemas.microsoft.com/office/powerpoint/2010/main" val="582181170"/>
+      </p:ext>
+    </p:extLst>
+  </p:cSld>
+  <p:clrMapOvr>
+    <a:masterClrMapping/>
+  </p:clrMapOvr>
+  <p:timing>
+    <p:tnLst>
+      <p:par>
+        <p:cTn xmlns:p14="http://schemas.microsoft.com/office/powerpoint/2010/main" id="1" dur="indefinite" restart="never" nodeType="tmRoot">
+          <p:childTnLst>
+            <p:seq concurrent="1" nextAc="seek">
+              <p:cTn id="2" dur="indefinite" nodeType="mainSeq">
+                <p:childTnLst>
+                  <p:par>
+                    <p:cTn id="3" fill="hold">
+                      <p:stCondLst>
+                        <p:cond delay="indefinite"/>
+                        <p:cond evt="onBegin" delay="0">
+                          <p:tn val="2"/>
+                        </p:cond>
+                      </p:stCondLst>
+                      <p:childTnLst>
+                        <p:par>
+                          <p:cTn id="4" fill="hold">
+                            <p:stCondLst>
+                              <p:cond delay="0"/>
+                            </p:stCondLst>
+                            <p:childTnLst>
+                              <p:par>
+                                <p:cTn id="5" presetID="1" presetClass="entr" presetSubtype="0" fill="hold" grpId="0" nodeType="withEffect">
+                                  <p:stCondLst>
+                                    <p:cond delay="0"/>
+                                  </p:stCondLst>
+                                  <p:childTnLst>
+                                    <p:set>
+                                      <p:cBhvr>
+                                        <p:cTn id="6" dur="1" fill="hold">
+                                          <p:stCondLst>
+                                            <p:cond delay="0"/>
+                                          </p:stCondLst>
+                                        </p:cTn>
+                                        <p:tgtEl>
+                                          <p:spTgt spid="3">
+                                            <p:txEl>
+                                              <p:pRg st="0" end="0"/>
+                                            </p:txEl>
+                                          </p:spTgt>
+                                        </p:tgtEl>
+                                        <p:attrNameLst>
+                                          <p:attrName>style.visibility</p:attrName>
+                                        </p:attrNameLst>
+                                      </p:cBhvr>
+                                      <p:to>
+                                        <p:strVal val="visible"/>
+                                      </p:to>
+                                    </p:set>
+                                  </p:childTnLst>
+                                </p:cTn>
+                              </p:par>
+                              <p:par>
+                                <p:cTn id="7" presetID="1" presetClass="entr" presetSubtype="0" fill="hold" grpId="0" nodeType="withEffect">
+                                  <p:stCondLst>
+                                    <p:cond delay="0"/>
+                                  </p:stCondLst>
+                                  <p:childTnLst>
+                                    <p:set>
+                                      <p:cBhvr>
+                                        <p:cTn id="8" dur="1" fill="hold">
+                                          <p:stCondLst>
+                                            <p:cond delay="0"/>
+                                          </p:stCondLst>
+                                        </p:cTn>
+                                        <p:tgtEl>
+                                          <p:spTgt spid="3">
+                                            <p:txEl>
+                                              <p:pRg st="1" end="1"/>
+                                            </p:txEl>
+                                          </p:spTgt>
+                                        </p:tgtEl>
+                                        <p:attrNameLst>
+                                          <p:attrName>style.visibility</p:attrName>
+                                        </p:attrNameLst>
+                                      </p:cBhvr>
+                                      <p:to>
+                                        <p:strVal val="visible"/>
+                                      </p:to>
+                                    </p:set>
+                                  </p:childTnLst>
+                                </p:cTn>
+                              </p:par>
+                              <p:par>
+                                <p:cTn id="9" presetID="1" presetClass="entr" presetSubtype="0" fill="hold" grpId="0" nodeType="withEffect">
+                                  <p:stCondLst>
+                                    <p:cond delay="0"/>
+                                  </p:stCondLst>
+                                  <p:childTnLst>
+                                    <p:set>
+                                      <p:cBhvr>
+                                        <p:cTn id="10" dur="1" fill="hold">
+                                          <p:stCondLst>
+                                            <p:cond delay="0"/>
+                                          </p:stCondLst>
+                                        </p:cTn>
+                                        <p:tgtEl>
+                                          <p:spTgt spid="3">
+                                            <p:txEl>
+                                              <p:pRg st="2" end="2"/>
+                                            </p:txEl>
+                                          </p:spTgt>
+                                        </p:tgtEl>
+                                        <p:attrNameLst>
+                                          <p:attrName>style.visibility</p:attrName>
+                                        </p:attrNameLst>
+                                      </p:cBhvr>
+                                      <p:to>
+                                        <p:strVal val="visible"/>
+                                      </p:to>
+                                    </p:set>
+                                  </p:childTnLst>
+                                </p:cTn>
+                              </p:par>
+                              <p:par>
+                                <p:cTn id="11" presetID="1" presetClass="entr" presetSubtype="0" fill="hold" grpId="0" nodeType="withEffect">
+                                  <p:stCondLst>
+                                    <p:cond delay="0"/>
+                                  </p:stCondLst>
+                                  <p:childTnLst>
+                                    <p:set>
+                                      <p:cBhvr>
+                                        <p:cTn id="12" dur="1" fill="hold">
+                                          <p:stCondLst>
+                                            <p:cond delay="0"/>
+                                          </p:stCondLst>
+                                        </p:cTn>
+                                        <p:tgtEl>
+                                          <p:spTgt spid="3">
+                                            <p:txEl>
+                                              <p:pRg st="3" end="3"/>
+                                            </p:txEl>
+                                          </p:spTgt>
+                                        </p:tgtEl>
+                                        <p:attrNameLst>
+                                          <p:attrName>style.visibility</p:attrName>
+                                        </p:attrNameLst>
+                                      </p:cBhvr>
+                                      <p:to>
+                                        <p:strVal val="visible"/>
+                                      </p:to>
+                                    </p:set>
+                                  </p:childTnLst>
+                                </p:cTn>
+                              </p:par>
+                            </p:childTnLst>
+                          </p:cTn>
+                        </p:par>
+                      </p:childTnLst>
+                    </p:cTn>
+                  </p:par>
+                  <p:par>
+                    <p:cTn id="13" fill="hold">
+                      <p:stCondLst>
+                        <p:cond delay="indefinite"/>
+                      </p:stCondLst>
+                      <p:childTnLst>
+                        <p:par>
+                          <p:cTn id="14" fill="hold">
+                            <p:stCondLst>
+                              <p:cond delay="0"/>
+                            </p:stCondLst>
+                            <p:childTnLst>
+                              <p:par>
+                                <p:cTn id="15" presetID="1" presetClass="entr" presetSubtype="0" fill="hold" grpId="0" nodeType="clickEffect">
+                                  <p:stCondLst>
+                                    <p:cond delay="0"/>
+                                  </p:stCondLst>
+                                  <p:childTnLst>
+                                    <p:set>
+                                      <p:cBhvr>
+                                        <p:cTn id="16" dur="1" fill="hold">
+                                          <p:stCondLst>
+                                            <p:cond delay="0"/>
+                                          </p:stCondLst>
+                                        </p:cTn>
+                                        <p:tgtEl>
+                                          <p:spTgt spid="3">
+                                            <p:txEl>
+                                              <p:pRg st="4" end="4"/>
+                                            </p:txEl>
+                                          </p:spTgt>
+                                        </p:tgtEl>
+                                        <p:attrNameLst>
+                                          <p:attrName>style.visibility</p:attrName>
+                                        </p:attrNameLst>
+                                      </p:cBhvr>
+                                      <p:to>
+                                        <p:strVal val="visible"/>
+                                      </p:to>
+                                    </p:set>
+                                  </p:childTnLst>
+                                </p:cTn>
+                              </p:par>
+                              <p:par>
+                                <p:cTn id="17" presetID="1" presetClass="entr" presetSubtype="0" fill="hold" grpId="0" nodeType="withEffect">
+                                  <p:stCondLst>
+                                    <p:cond delay="0"/>
+                                  </p:stCondLst>
+                                  <p:childTnLst>
+                                    <p:set>
+                                      <p:cBhvr>
+                                        <p:cTn id="18" dur="1" fill="hold">
+                                          <p:stCondLst>
+                                            <p:cond delay="0"/>
+                                          </p:stCondLst>
+                                        </p:cTn>
+                                        <p:tgtEl>
+                                          <p:spTgt spid="3">
+                                            <p:txEl>
+                                              <p:pRg st="5" end="5"/>
+                                            </p:txEl>
+                                          </p:spTgt>
+                                        </p:tgtEl>
+                                        <p:attrNameLst>
+                                          <p:attrName>style.visibility</p:attrName>
+                                        </p:attrNameLst>
+                                      </p:cBhvr>
+                                      <p:to>
+                                        <p:strVal val="visible"/>
+                                      </p:to>
+                                    </p:set>
+                                  </p:childTnLst>
+                                </p:cTn>
+                              </p:par>
+                              <p:par>
+                                <p:cTn id="19" presetID="1" presetClass="entr" presetSubtype="0" fill="hold" grpId="0" nodeType="withEffect">
+                                  <p:stCondLst>
+                                    <p:cond delay="0"/>
+                                  </p:stCondLst>
+                                  <p:childTnLst>
+                                    <p:set>
+                                      <p:cBhvr>
+                                        <p:cTn id="20" dur="1" fill="hold">
+                                          <p:stCondLst>
+                                            <p:cond delay="0"/>
+                                          </p:stCondLst>
+                                        </p:cTn>
+                                        <p:tgtEl>
+                                          <p:spTgt spid="3">
+                                            <p:txEl>
+                                              <p:pRg st="6" end="6"/>
+                                            </p:txEl>
+                                          </p:spTgt>
+                                        </p:tgtEl>
+                                        <p:attrNameLst>
+                                          <p:attrName>style.visibility</p:attrName>
+                                        </p:attrNameLst>
+                                      </p:cBhvr>
+                                      <p:to>
+                                        <p:strVal val="visible"/>
+                                      </p:to>
+                                    </p:set>
+                                  </p:childTnLst>
+                                </p:cTn>
+                              </p:par>
+                              <p:par>
+                                <p:cTn id="21" presetID="1" presetClass="entr" presetSubtype="0" fill="hold" grpId="0" nodeType="withEffect">
+                                  <p:stCondLst>
+                                    <p:cond delay="0"/>
+                                  </p:stCondLst>
+                                  <p:childTnLst>
+                                    <p:set>
+                                      <p:cBhvr>
+                                        <p:cTn id="22" dur="1" fill="hold">
+                                          <p:stCondLst>
+                                            <p:cond delay="0"/>
+                                          </p:stCondLst>
+                                        </p:cTn>
+                                        <p:tgtEl>
+                                          <p:spTgt spid="3">
+                                            <p:txEl>
+                                              <p:pRg st="7" end="7"/>
+                                            </p:txEl>
+                                          </p:spTgt>
+                                        </p:tgtEl>
+                                        <p:attrNameLst>
+                                          <p:attrName>style.visibility</p:attrName>
+                                        </p:attrNameLst>
+                                      </p:cBhvr>
+                                      <p:to>
+                                        <p:strVal val="visible"/>
+                                      </p:to>
+                                    </p:set>
+                                  </p:childTnLst>
+                                </p:cTn>
+                              </p:par>
+                              <p:par>
+                                <p:cTn id="23" presetID="1" presetClass="entr" presetSubtype="0" fill="hold" grpId="0" nodeType="withEffect">
+                                  <p:stCondLst>
+                                    <p:cond delay="0"/>
+                                  </p:stCondLst>
+                                  <p:childTnLst>
+                                    <p:set>
+                                      <p:cBhvr>
+                                        <p:cTn id="24" dur="1" fill="hold">
+                                          <p:stCondLst>
+                                            <p:cond delay="0"/>
+                                          </p:stCondLst>
+                                        </p:cTn>
+                                        <p:tgtEl>
+                                          <p:spTgt spid="3">
+                                            <p:txEl>
+                                              <p:pRg st="8" end="8"/>
+                                            </p:txEl>
+                                          </p:spTgt>
+                                        </p:tgtEl>
+                                        <p:attrNameLst>
+                                          <p:attrName>style.visibility</p:attrName>
+                                        </p:attrNameLst>
+                                      </p:cBhvr>
+                                      <p:to>
+                                        <p:strVal val="visible"/>
+                                      </p:to>
+                                    </p:set>
+                                  </p:childTnLst>
+                                </p:cTn>
+                              </p:par>
+                              <p:par>
+                                <p:cTn id="25" presetID="1" presetClass="entr" presetSubtype="0" fill="hold" grpId="0" nodeType="withEffect">
+                                  <p:stCondLst>
+                                    <p:cond delay="0"/>
+                                  </p:stCondLst>
+                                  <p:childTnLst>
+                                    <p:set>
+                                      <p:cBhvr>
+                                        <p:cTn id="26" dur="1" fill="hold">
+                                          <p:stCondLst>
+                                            <p:cond delay="0"/>
+                                          </p:stCondLst>
+                                        </p:cTn>
+                                        <p:tgtEl>
+                                          <p:spTgt spid="3">
+                                            <p:txEl>
+                                              <p:pRg st="9" end="9"/>
+                                            </p:txEl>
+                                          </p:spTgt>
+                                        </p:tgtEl>
+                                        <p:attrNameLst>
+                                          <p:attrName>style.visibility</p:attrName>
+                                        </p:attrNameLst>
+                                      </p:cBhvr>
+                                      <p:to>
+                                        <p:strVal val="visible"/>
+                                      </p:to>
+                                    </p:set>
+                                  </p:childTnLst>
+                                </p:cTn>
+                              </p:par>
+                              <p:par>
+                                <p:cTn id="27" presetID="1" presetClass="entr" presetSubtype="0" fill="hold" grpId="0" nodeType="withEffect">
+                                  <p:stCondLst>
+                                    <p:cond delay="0"/>
+                                  </p:stCondLst>
+                                  <p:childTnLst>
+                                    <p:set>
+                                      <p:cBhvr>
+                                        <p:cTn id="28" dur="1" fill="hold">
+                                          <p:stCondLst>
+                                            <p:cond delay="0"/>
+                                          </p:stCondLst>
+                                        </p:cTn>
+                                        <p:tgtEl>
+                                          <p:spTgt spid="3">
+                                            <p:txEl>
+                                              <p:pRg st="10" end="10"/>
+                                            </p:txEl>
+                                          </p:spTgt>
+                                        </p:tgtEl>
+                                        <p:attrNameLst>
+                                          <p:attrName>style.visibility</p:attrName>
+                                        </p:attrNameLst>
+                                      </p:cBhvr>
+                                      <p:to>
+                                        <p:strVal val="visible"/>
+                                      </p:to>
+                                    </p:set>
+                                  </p:childTnLst>
+                                </p:cTn>
+                              </p:par>
+                            </p:childTnLst>
+                          </p:cTn>
+                        </p:par>
+                      </p:childTnLst>
+                    </p:cTn>
+                  </p:par>
+                </p:childTnLst>
+              </p:cTn>
+              <p:prevCondLst>
+                <p:cond evt="onPrev" delay="0">
+                  <p:tgtEl>
+                    <p:sldTgt/>
+                  </p:tgtEl>
+                </p:cond>
+              </p:prevCondLst>
+              <p:nextCondLst>
+                <p:cond evt="onNext" delay="0">
+                  <p:tgtEl>
+                    <p:sldTgt/>
+                  </p:tgtEl>
+                </p:cond>
+              </p:nextCondLst>
+            </p:seq>
+          </p:childTnLst>
+        </p:cTn>
+      </p:par>
+    </p:tnLst>
+    <p:bldLst>
+      <p:bldP spid="3" grpId="0" build="p"/>
+    </p:bldLst>
   </p:timing>
 </p:sld>
 </file>

</xml_diff>

<commit_message>
tut 10: insert frac fig w/o meta lb
</commit_message>
<xml_diff>
--- a/tutorial-10-load_balancing.pptx
+++ b/tutorial-10-load_balancing.pptx
@@ -5,10 +5,10 @@
     <p:sldMasterId id="2147483974" r:id="rId1"/>
   </p:sldMasterIdLst>
   <p:notesMasterIdLst>
-    <p:notesMasterId r:id="rId22"/>
+    <p:notesMasterId r:id="rId23"/>
   </p:notesMasterIdLst>
   <p:handoutMasterIdLst>
-    <p:handoutMasterId r:id="rId23"/>
+    <p:handoutMasterId r:id="rId24"/>
   </p:handoutMasterIdLst>
   <p:sldIdLst>
     <p:sldId id="431" r:id="rId2"/>
@@ -30,7 +30,8 @@
     <p:sldId id="452" r:id="rId18"/>
     <p:sldId id="453" r:id="rId19"/>
     <p:sldId id="454" r:id="rId20"/>
-    <p:sldId id="455" r:id="rId21"/>
+    <p:sldId id="456" r:id="rId21"/>
+    <p:sldId id="455" r:id="rId22"/>
   </p:sldIdLst>
   <p:sldSz cx="9144000" cy="6858000" type="screen4x3"/>
   <p:notesSz cx="6858000" cy="9144000"/>
@@ -10400,6 +10401,187 @@
         <p:spPr/>
         <p:txBody>
           <a:bodyPr>
+            <a:normAutofit/>
+          </a:bodyPr>
+          <a:lstStyle/>
+          <a:p>
+            <a:r>
+              <a:rPr lang="en-US" dirty="0" err="1"/>
+              <a:t>Fractography</a:t>
+            </a:r>
+            <a:r>
+              <a:rPr lang="en-US" dirty="0"/>
+              <a:t> with No Load </a:t>
+            </a:r>
+            <a:r>
+              <a:rPr lang="en-US" dirty="0" smtClean="0"/>
+              <a:t>Balancing</a:t>
+            </a:r>
+            <a:endParaRPr lang="en-US" dirty="0"/>
+          </a:p>
+        </p:txBody>
+      </p:sp>
+      <p:sp>
+        <p:nvSpPr>
+          <p:cNvPr id="8" name="Content Placeholder 7"/>
+          <p:cNvSpPr>
+            <a:spLocks noGrp="1"/>
+          </p:cNvSpPr>
+          <p:nvPr>
+            <p:ph idx="1"/>
+          </p:nvPr>
+        </p:nvSpPr>
+        <p:spPr/>
+        <p:txBody>
+          <a:bodyPr anchor="b"/>
+          <a:lstStyle/>
+          <a:p>
+            <a:r>
+              <a:rPr lang="en-US" dirty="0"/>
+              <a:t>Large variation in processor utilization</a:t>
+            </a:r>
+          </a:p>
+          <a:p>
+            <a:r>
+              <a:rPr lang="en-US" dirty="0"/>
+              <a:t>Low utilization leading to resource </a:t>
+            </a:r>
+            <a:r>
+              <a:rPr lang="en-US" dirty="0" smtClean="0"/>
+              <a:t>wastage</a:t>
+            </a:r>
+            <a:endParaRPr lang="en-US" dirty="0"/>
+          </a:p>
+        </p:txBody>
+      </p:sp>
+      <p:sp>
+        <p:nvSpPr>
+          <p:cNvPr id="4" name="Footer Placeholder 3"/>
+          <p:cNvSpPr>
+            <a:spLocks noGrp="1"/>
+          </p:cNvSpPr>
+          <p:nvPr>
+            <p:ph type="ftr" sz="quarter" idx="11"/>
+          </p:nvPr>
+        </p:nvSpPr>
+        <p:spPr/>
+        <p:txBody>
+          <a:bodyPr/>
+          <a:lstStyle/>
+          <a:p>
+            <a:pPr algn="r"/>
+            <a:r>
+              <a:rPr lang="en-US" smtClean="0"/>
+              <a:t>Laxmikant Kalé and PPL (UIUC) – Parallel Migratable Objects </a:t>
+            </a:r>
+            <a:endParaRPr lang="en-US" dirty="0"/>
+          </a:p>
+        </p:txBody>
+      </p:sp>
+      <p:sp>
+        <p:nvSpPr>
+          <p:cNvPr id="5" name="Slide Number Placeholder 4"/>
+          <p:cNvSpPr>
+            <a:spLocks noGrp="1"/>
+          </p:cNvSpPr>
+          <p:nvPr>
+            <p:ph type="sldNum" sz="quarter" idx="12"/>
+          </p:nvPr>
+        </p:nvSpPr>
+        <p:spPr/>
+        <p:txBody>
+          <a:bodyPr/>
+          <a:lstStyle/>
+          <a:p>
+            <a:fld id="{0CFEC368-1D7A-4F81-ABF6-AE0E36BAF64C}" type="slidenum">
+              <a:rPr lang="en-US" smtClean="0"/>
+              <a:pPr/>
+              <a:t>20</a:t>
+            </a:fld>
+            <a:endParaRPr lang="en-US"/>
+          </a:p>
+        </p:txBody>
+      </p:sp>
+      <p:pic>
+        <p:nvPicPr>
+          <p:cNvPr id="9" name="Picture 8" descr="without-meta-util.pdf"/>
+          <p:cNvPicPr>
+            <a:picLocks noChangeAspect="1"/>
+          </p:cNvPicPr>
+          <p:nvPr/>
+        </p:nvPicPr>
+        <p:blipFill>
+          <a:blip r:embed="rId2">
+            <a:extLst>
+              <a:ext uri="{28A0092B-C50C-407E-A947-70E740481C1C}">
+                <a14:useLocalDpi xmlns:a14="http://schemas.microsoft.com/office/drawing/2010/main" val="0"/>
+              </a:ext>
+            </a:extLst>
+          </a:blip>
+          <a:stretch>
+            <a:fillRect/>
+          </a:stretch>
+        </p:blipFill>
+        <p:spPr>
+          <a:xfrm>
+            <a:off x="0" y="1536700"/>
+            <a:ext cx="9144000" cy="3771817"/>
+          </a:xfrm>
+          <a:prstGeom prst="rect">
+            <a:avLst/>
+          </a:prstGeom>
+        </p:spPr>
+      </p:pic>
+    </p:spTree>
+    <p:extLst>
+      <p:ext uri="{BB962C8B-B14F-4D97-AF65-F5344CB8AC3E}">
+        <p14:creationId xmlns:p14="http://schemas.microsoft.com/office/powerpoint/2010/main" val="490863570"/>
+      </p:ext>
+    </p:extLst>
+  </p:cSld>
+  <p:clrMapOvr>
+    <a:masterClrMapping/>
+  </p:clrMapOvr>
+  <p:timing>
+    <p:tnLst>
+      <p:par>
+        <p:cTn xmlns:p14="http://schemas.microsoft.com/office/powerpoint/2010/main" id="1" dur="indefinite" restart="never" nodeType="tmRoot"/>
+      </p:par>
+    </p:tnLst>
+  </p:timing>
+</p:sld>
+</file>
+
+<file path=ppt/slides/slide21.xml><?xml version="1.0" encoding="utf-8"?>
+<p:sld xmlns:a="http://schemas.openxmlformats.org/drawingml/2006/main" xmlns:r="http://schemas.openxmlformats.org/officeDocument/2006/relationships" xmlns:p="http://schemas.openxmlformats.org/presentationml/2006/main">
+  <p:cSld>
+    <p:spTree>
+      <p:nvGrpSpPr>
+        <p:cNvPr id="1" name=""/>
+        <p:cNvGrpSpPr/>
+        <p:nvPr/>
+      </p:nvGrpSpPr>
+      <p:grpSpPr>
+        <a:xfrm>
+          <a:off x="0" y="0"/>
+          <a:ext cx="0" cy="0"/>
+          <a:chOff x="0" y="0"/>
+          <a:chExt cx="0" cy="0"/>
+        </a:xfrm>
+      </p:grpSpPr>
+      <p:sp>
+        <p:nvSpPr>
+          <p:cNvPr id="2" name="Title 1"/>
+          <p:cNvSpPr>
+            <a:spLocks noGrp="1"/>
+          </p:cNvSpPr>
+          <p:nvPr>
+            <p:ph type="title"/>
+          </p:nvPr>
+        </p:nvSpPr>
+        <p:spPr/>
+        <p:txBody>
+          <a:bodyPr>
             <a:normAutofit fontScale="90000"/>
           </a:bodyPr>
           <a:lstStyle/>
@@ -10492,7 +10674,7 @@
             <a:fld id="{0CFEC368-1D7A-4F81-ABF6-AE0E36BAF64C}" type="slidenum">
               <a:rPr lang="en-US" smtClean="0"/>
               <a:pPr/>
-              <a:t>20</a:t>
+              <a:t>21</a:t>
             </a:fld>
             <a:endParaRPr lang="en-US"/>
           </a:p>
@@ -13979,11 +14161,7 @@
             <a:pPr lvl="2"/>
             <a:r>
               <a:rPr lang="en-US" dirty="0" smtClean="0"/>
-              <a:t>Quite </a:t>
-            </a:r>
-            <a:r>
-              <a:rPr lang="en-US" dirty="0" smtClean="0"/>
-              <a:t>a good </a:t>
+              <a:t>Quite a good </a:t>
             </a:r>
             <a:r>
               <a:rPr lang="en-US" dirty="0"/>

</xml_diff>

<commit_message>
tut 10: swap lb figures
</commit_message>
<xml_diff>
--- a/tutorial-10-load_balancing.pptx
+++ b/tutorial-10-load_balancing.pptx
@@ -221,7 +221,7 @@
           <a:p>
             <a:fld id="{775CE290-E0F5-444C-B849-A8F17CD4104C}" type="datetimeFigureOut">
               <a:rPr lang="en-US" smtClean="0"/>
-              <a:t>11/16/14</a:t>
+              <a:t>11/17/14</a:t>
             </a:fld>
             <a:endParaRPr lang="en-US"/>
           </a:p>
@@ -387,7 +387,7 @@
           <a:p>
             <a:fld id="{AD53A24C-4135-094C-957B-35852E7EDFA4}" type="datetimeFigureOut">
               <a:rPr lang="en-US" smtClean="0"/>
-              <a:t>11/16/14</a:t>
+              <a:t>11/17/14</a:t>
             </a:fld>
             <a:endParaRPr lang="en-US"/>
           </a:p>
@@ -848,7 +848,7 @@
           <a:p>
             <a:fld id="{0DD10391-1DB6-5D4D-A9E2-6F70F970C135}" type="datetime2">
               <a:rPr lang="en-US" smtClean="0"/>
-              <a:t>Sunday, November 16, 14</a:t>
+              <a:t>Monday, November 17, 14</a:t>
             </a:fld>
             <a:endParaRPr lang="en-US"/>
           </a:p>
@@ -1151,7 +1151,7 @@
                 <a:latin typeface="Times New Roman"/>
                 <a:cs typeface="Times New Roman"/>
               </a:rPr>
-              <a:t>November 16, 2014</a:t>
+              <a:t>November 17, 2014</a:t>
             </a:fld>
             <a:endParaRPr lang="en-US" dirty="0">
               <a:latin typeface="Times New Roman"/>
@@ -1425,7 +1425,7 @@
                 <a:latin typeface="Times New Roman"/>
                 <a:cs typeface="Times New Roman"/>
               </a:rPr>
-              <a:t>November 16, 2014</a:t>
+              <a:t>November 17, 2014</a:t>
             </a:fld>
             <a:endParaRPr lang="en-US" dirty="0">
               <a:latin typeface="Times New Roman"/>
@@ -1660,7 +1660,7 @@
           <a:p>
             <a:fld id="{09352B9C-CD04-B245-AC60-38B988669D7C}" type="datetime2">
               <a:rPr lang="en-US" smtClean="0"/>
-              <a:t>Sunday, November 16, 14</a:t>
+              <a:t>Monday, November 17, 14</a:t>
             </a:fld>
             <a:endParaRPr lang="en-US"/>
           </a:p>
@@ -1971,7 +1971,7 @@
           <a:p>
             <a:fld id="{6376F45E-3272-9947-B6E5-BA07629914D0}" type="datetime2">
               <a:rPr lang="en-US" smtClean="0"/>
-              <a:t>Sunday, November 16, 14</a:t>
+              <a:t>Monday, November 17, 14</a:t>
             </a:fld>
             <a:endParaRPr lang="en-US"/>
           </a:p>
@@ -2142,7 +2142,7 @@
           <a:p>
             <a:fld id="{B9D99FF2-6226-2F4D-9FE3-0C72920365A3}" type="datetime2">
               <a:rPr lang="en-US" smtClean="0"/>
-              <a:t>Sunday, November 16, 14</a:t>
+              <a:t>Monday, November 17, 14</a:t>
             </a:fld>
             <a:endParaRPr lang="en-US"/>
           </a:p>
@@ -2323,7 +2323,7 @@
           <a:p>
             <a:fld id="{077ECA9D-FA2C-9C4A-BEE4-2FE5C77C975F}" type="datetime2">
               <a:rPr lang="en-US" smtClean="0"/>
-              <a:t>Sunday, November 16, 14</a:t>
+              <a:t>Monday, November 17, 14</a:t>
             </a:fld>
             <a:endParaRPr lang="en-US"/>
           </a:p>
@@ -2577,7 +2577,7 @@
           <a:p>
             <a:fld id="{C1EEF417-DF1E-2349-8DF9-68F21AC21008}" type="datetime2">
               <a:rPr lang="en-US" smtClean="0"/>
-              <a:t>Sunday, November 16, 14</a:t>
+              <a:t>Monday, November 17, 14</a:t>
             </a:fld>
             <a:endParaRPr lang="en-US"/>
           </a:p>
@@ -2880,7 +2880,7 @@
                 <a:latin typeface="Times New Roman"/>
                 <a:cs typeface="Times New Roman"/>
               </a:rPr>
-              <a:t>November 16, 2014</a:t>
+              <a:t>November 17, 2014</a:t>
             </a:fld>
             <a:endParaRPr lang="en-US" dirty="0">
               <a:latin typeface="Times New Roman"/>
@@ -3006,7 +3006,7 @@
           <a:p>
             <a:fld id="{3376C989-B4E2-B249-B32C-2DD4A5A9E8BA}" type="datetime2">
               <a:rPr lang="en-US" smtClean="0"/>
-              <a:t>Sunday, November 16, 14</a:t>
+              <a:t>Monday, November 17, 14</a:t>
             </a:fld>
             <a:endParaRPr lang="en-US" dirty="0"/>
           </a:p>
@@ -3535,7 +3535,7 @@
           <a:p>
             <a:fld id="{E225BBF8-0077-E04A-A593-3651D4FC6485}" type="datetime2">
               <a:rPr lang="en-US" smtClean="0"/>
-              <a:t>Sunday, November 16, 14</a:t>
+              <a:t>Monday, November 17, 14</a:t>
             </a:fld>
             <a:endParaRPr lang="en-US" dirty="0"/>
           </a:p>
@@ -3831,7 +3831,7 @@
           <a:p>
             <a:fld id="{F07A3535-A015-FA4D-9690-9ABCD06B779D}" type="datetime2">
               <a:rPr lang="en-US" smtClean="0"/>
-              <a:t>Sunday, November 16, 14</a:t>
+              <a:t>Monday, November 17, 14</a:t>
             </a:fld>
             <a:endParaRPr lang="en-US"/>
           </a:p>
@@ -3950,7 +3950,7 @@
           <a:p>
             <a:fld id="{9B43A5F4-2A4C-434B-9701-2F3B5707B10A}" type="datetime2">
               <a:rPr lang="en-US" smtClean="0"/>
-              <a:t>Sunday, November 16, 14</a:t>
+              <a:t>Monday, November 17, 14</a:t>
             </a:fld>
             <a:endParaRPr lang="en-US" dirty="0"/>
           </a:p>
@@ -4437,7 +4437,7 @@
           <a:p>
             <a:fld id="{E4576827-857F-0449-A93D-BEC4A726D8A4}" type="datetime2">
               <a:rPr lang="en-US" smtClean="0"/>
-              <a:t>Sunday, November 16, 14</a:t>
+              <a:t>Monday, November 17, 14</a:t>
             </a:fld>
             <a:endParaRPr lang="en-US"/>
           </a:p>
@@ -4768,7 +4768,7 @@
           <a:p>
             <a:fld id="{9B371B0E-505F-324B-89F6-3E7FD6808118}" type="datetime2">
               <a:rPr lang="en-US" smtClean="0"/>
-              <a:t>Sunday, November 16, 14</a:t>
+              <a:t>Monday, November 17, 14</a:t>
             </a:fld>
             <a:endParaRPr lang="en-US" dirty="0"/>
           </a:p>
@@ -5247,7 +5247,7 @@
           <a:p>
             <a:fld id="{E131629D-2F3E-4940-A9A4-305535DFDFBF}" type="datetime2">
               <a:rPr lang="en-US" smtClean="0"/>
-              <a:t>Sunday, November 16, 14</a:t>
+              <a:t>Monday, November 17, 14</a:t>
             </a:fld>
             <a:endParaRPr lang="en-US"/>
           </a:p>
@@ -5543,7 +5543,7 @@
           <a:p>
             <a:fld id="{716ABDEF-604C-8647-8662-FC7DD558D147}" type="datetime2">
               <a:rPr lang="en-US" smtClean="0"/>
-              <a:t>Sunday, November 16, 14</a:t>
+              <a:t>Monday, November 17, 14</a:t>
             </a:fld>
             <a:endParaRPr lang="en-US" dirty="0"/>
           </a:p>
@@ -5786,7 +5786,7 @@
           <a:p>
             <a:fld id="{9AEE7E98-0AF0-884A-A0D0-325B4547BB5B}" type="datetime2">
               <a:rPr lang="en-US" smtClean="0"/>
-              <a:t>Sunday, November 16, 14</a:t>
+              <a:t>Monday, November 17, 14</a:t>
             </a:fld>
             <a:endParaRPr lang="en-US"/>
           </a:p>
@@ -5882,7 +5882,7 @@
           <a:p>
             <a:fld id="{FDD9FAFE-7C67-F443-A58C-0AF490A5F613}" type="datetime2">
               <a:rPr lang="en-US" smtClean="0"/>
-              <a:t>Sunday, November 16, 14</a:t>
+              <a:t>Monday, November 17, 14</a:t>
             </a:fld>
             <a:endParaRPr lang="en-US"/>
           </a:p>
@@ -6197,7 +6197,7 @@
           <a:p>
             <a:fld id="{9F2EA7BD-9570-1748-A1BC-E8D4F12298D5}" type="datetime2">
               <a:rPr lang="en-US" smtClean="0"/>
-              <a:t>Sunday, November 16, 14</a:t>
+              <a:t>Monday, November 17, 14</a:t>
             </a:fld>
             <a:endParaRPr lang="en-US" dirty="0"/>
           </a:p>
@@ -13278,7 +13278,7 @@
       </p:sp>
       <p:pic>
         <p:nvPicPr>
-          <p:cNvPr id="11" name="Content Placeholder 10" descr="beforeLB.png"/>
+          <p:cNvPr id="11" name="Content Placeholder 10"/>
           <p:cNvPicPr>
             <a:picLocks noGrp="1" noChangeAspect="1"/>
           </p:cNvPicPr>
@@ -13294,12 +13294,16 @@
               </a:ext>
             </a:extLst>
           </a:blip>
-          <a:srcRect t="-35782" b="-35782"/>
           <a:stretch>
             <a:fillRect/>
           </a:stretch>
         </p:blipFill>
-        <p:spPr/>
+        <p:spPr>
+          <a:xfrm>
+            <a:off x="261865" y="3203435"/>
+            <a:ext cx="4114800" cy="1697317"/>
+          </a:xfrm>
+        </p:spPr>
       </p:pic>
       <p:sp>
         <p:nvSpPr>
@@ -13326,7 +13330,7 @@
       </p:sp>
       <p:pic>
         <p:nvPicPr>
-          <p:cNvPr id="12" name="Content Placeholder 11" descr="afterLB.png"/>
+          <p:cNvPr id="12" name="Content Placeholder 11"/>
           <p:cNvPicPr>
             <a:picLocks noGrp="1" noChangeAspect="1"/>
           </p:cNvPicPr>
@@ -13342,12 +13346,16 @@
               </a:ext>
             </a:extLst>
           </a:blip>
-          <a:srcRect t="-37013" b="-37013"/>
           <a:stretch>
             <a:fillRect/>
           </a:stretch>
         </p:blipFill>
-        <p:spPr/>
+        <p:spPr>
+          <a:xfrm>
+            <a:off x="4737100" y="3197687"/>
+            <a:ext cx="4140125" cy="1708813"/>
+          </a:xfrm>
+        </p:spPr>
       </p:pic>
       <p:sp>
         <p:nvSpPr>

</xml_diff>

<commit_message>
tut 10: split before and after lb into two slides
</commit_message>
<xml_diff>
--- a/tutorial-10-load_balancing.pptx
+++ b/tutorial-10-load_balancing.pptx
@@ -5,10 +5,10 @@
     <p:sldMasterId id="2147483974" r:id="rId1"/>
   </p:sldMasterIdLst>
   <p:notesMasterIdLst>
-    <p:notesMasterId r:id="rId23"/>
+    <p:notesMasterId r:id="rId24"/>
   </p:notesMasterIdLst>
   <p:handoutMasterIdLst>
-    <p:handoutMasterId r:id="rId24"/>
+    <p:handoutMasterId r:id="rId25"/>
   </p:handoutMasterIdLst>
   <p:sldIdLst>
     <p:sldId id="431" r:id="rId2"/>
@@ -18,20 +18,21 @@
     <p:sldId id="436" r:id="rId6"/>
     <p:sldId id="437" r:id="rId7"/>
     <p:sldId id="438" r:id="rId8"/>
-    <p:sldId id="440" r:id="rId9"/>
-    <p:sldId id="442" r:id="rId10"/>
-    <p:sldId id="444" r:id="rId11"/>
-    <p:sldId id="445" r:id="rId12"/>
-    <p:sldId id="447" r:id="rId13"/>
-    <p:sldId id="448" r:id="rId14"/>
-    <p:sldId id="449" r:id="rId15"/>
-    <p:sldId id="450" r:id="rId16"/>
-    <p:sldId id="451" r:id="rId17"/>
-    <p:sldId id="452" r:id="rId18"/>
-    <p:sldId id="453" r:id="rId19"/>
-    <p:sldId id="454" r:id="rId20"/>
-    <p:sldId id="456" r:id="rId21"/>
-    <p:sldId id="455" r:id="rId22"/>
+    <p:sldId id="457" r:id="rId9"/>
+    <p:sldId id="440" r:id="rId10"/>
+    <p:sldId id="442" r:id="rId11"/>
+    <p:sldId id="444" r:id="rId12"/>
+    <p:sldId id="445" r:id="rId13"/>
+    <p:sldId id="447" r:id="rId14"/>
+    <p:sldId id="448" r:id="rId15"/>
+    <p:sldId id="449" r:id="rId16"/>
+    <p:sldId id="450" r:id="rId17"/>
+    <p:sldId id="451" r:id="rId18"/>
+    <p:sldId id="452" r:id="rId19"/>
+    <p:sldId id="453" r:id="rId20"/>
+    <p:sldId id="454" r:id="rId21"/>
+    <p:sldId id="456" r:id="rId22"/>
+    <p:sldId id="455" r:id="rId23"/>
   </p:sldIdLst>
   <p:sldSz cx="9144000" cy="6858000" type="screen4x3"/>
   <p:notesSz cx="6858000" cy="9144000"/>
@@ -7043,6 +7044,668 @@
           <a:p>
             <a:r>
               <a:rPr lang="en-US" dirty="0"/>
+              <a:t>Load Balancing Strategies</a:t>
+            </a:r>
+          </a:p>
+        </p:txBody>
+      </p:sp>
+      <p:sp>
+        <p:nvSpPr>
+          <p:cNvPr id="3" name="Content Placeholder 2"/>
+          <p:cNvSpPr>
+            <a:spLocks noGrp="1"/>
+          </p:cNvSpPr>
+          <p:nvPr>
+            <p:ph idx="1"/>
+          </p:nvPr>
+        </p:nvSpPr>
+        <p:spPr/>
+        <p:txBody>
+          <a:bodyPr>
+            <a:normAutofit/>
+          </a:bodyPr>
+          <a:lstStyle/>
+          <a:p>
+            <a:r>
+              <a:rPr lang="en-US" dirty="0"/>
+              <a:t>Classified by when it is done:</a:t>
+            </a:r>
+          </a:p>
+          <a:p>
+            <a:pPr lvl="1"/>
+            <a:r>
+              <a:rPr lang="en-US" dirty="0" smtClean="0"/>
+              <a:t>Initially</a:t>
+            </a:r>
+            <a:endParaRPr lang="en-US" dirty="0"/>
+          </a:p>
+          <a:p>
+            <a:pPr lvl="1"/>
+            <a:r>
+              <a:rPr lang="en-US" dirty="0" smtClean="0"/>
+              <a:t>Dynamic</a:t>
+            </a:r>
+            <a:r>
+              <a:rPr lang="en-US" dirty="0"/>
+              <a:t>: Periodically </a:t>
+            </a:r>
+            <a:endParaRPr lang="en-US" dirty="0" smtClean="0"/>
+          </a:p>
+          <a:p>
+            <a:pPr lvl="1"/>
+            <a:r>
+              <a:rPr lang="en-US" dirty="0" smtClean="0"/>
+              <a:t>Dynamic</a:t>
+            </a:r>
+            <a:r>
+              <a:rPr lang="en-US" dirty="0"/>
+              <a:t>: Continuously</a:t>
+            </a:r>
+          </a:p>
+          <a:p>
+            <a:r>
+              <a:rPr lang="en-US" dirty="0"/>
+              <a:t>Classified by whether decisions are taken with global information</a:t>
+            </a:r>
+          </a:p>
+          <a:p>
+            <a:pPr lvl="1"/>
+            <a:r>
+              <a:rPr lang="en-US" dirty="0" smtClean="0"/>
+              <a:t>Fully </a:t>
+            </a:r>
+            <a:r>
+              <a:rPr lang="en-US" dirty="0"/>
+              <a:t>centralized</a:t>
+            </a:r>
+          </a:p>
+          <a:p>
+            <a:pPr lvl="2"/>
+            <a:r>
+              <a:rPr lang="en-US" dirty="0" smtClean="0"/>
+              <a:t>Quite a good </a:t>
+            </a:r>
+            <a:r>
+              <a:rPr lang="en-US" dirty="0"/>
+              <a:t>choice when load balancing period is high</a:t>
+            </a:r>
+          </a:p>
+          <a:p>
+            <a:pPr lvl="1"/>
+            <a:r>
+              <a:rPr lang="en-US" dirty="0" smtClean="0"/>
+              <a:t>Fully </a:t>
+            </a:r>
+            <a:r>
+              <a:rPr lang="en-US" dirty="0"/>
+              <a:t>distributed</a:t>
+            </a:r>
+          </a:p>
+          <a:p>
+            <a:pPr lvl="2"/>
+            <a:r>
+              <a:rPr lang="en-US" dirty="0" smtClean="0"/>
+              <a:t>Each </a:t>
+            </a:r>
+            <a:r>
+              <a:rPr lang="en-US" dirty="0"/>
+              <a:t>processor knows only about a constant number of neighbors</a:t>
+            </a:r>
+          </a:p>
+          <a:p>
+            <a:pPr lvl="2"/>
+            <a:r>
+              <a:rPr lang="en-US" dirty="0" smtClean="0"/>
+              <a:t>Extreme </a:t>
+            </a:r>
+            <a:r>
+              <a:rPr lang="en-US" dirty="0"/>
+              <a:t>case: totally local decision (send work to a random </a:t>
+            </a:r>
+            <a:r>
+              <a:rPr lang="en-US" dirty="0" smtClean="0"/>
+              <a:t>destination processor</a:t>
+            </a:r>
+            <a:r>
+              <a:rPr lang="en-US" dirty="0"/>
+              <a:t>, with some probability).</a:t>
+            </a:r>
+          </a:p>
+          <a:p>
+            <a:pPr lvl="1"/>
+            <a:r>
+              <a:rPr lang="en-US" dirty="0" smtClean="0"/>
+              <a:t>Use </a:t>
+            </a:r>
+            <a:r>
+              <a:rPr lang="en-US" i="1" dirty="0"/>
+              <a:t>aggregated</a:t>
+            </a:r>
+            <a:r>
+              <a:rPr lang="en-US" dirty="0"/>
+              <a:t> global information, and </a:t>
+            </a:r>
+            <a:r>
+              <a:rPr lang="en-US" i="1" dirty="0"/>
+              <a:t>detailed </a:t>
+            </a:r>
+            <a:r>
+              <a:rPr lang="en-US" dirty="0"/>
+              <a:t>neighborhood info.</a:t>
+            </a:r>
+          </a:p>
+        </p:txBody>
+      </p:sp>
+      <p:sp>
+        <p:nvSpPr>
+          <p:cNvPr id="5" name="Footer Placeholder 4"/>
+          <p:cNvSpPr>
+            <a:spLocks noGrp="1"/>
+          </p:cNvSpPr>
+          <p:nvPr>
+            <p:ph type="ftr" sz="quarter" idx="11"/>
+          </p:nvPr>
+        </p:nvSpPr>
+        <p:spPr/>
+        <p:txBody>
+          <a:bodyPr/>
+          <a:lstStyle/>
+          <a:p>
+            <a:pPr algn="r"/>
+            <a:r>
+              <a:rPr lang="en-US" smtClean="0"/>
+              <a:t>Laxmikant Kalé and PPL (UIUC) – Parallel Migratable Objects </a:t>
+            </a:r>
+            <a:endParaRPr lang="en-US" dirty="0"/>
+          </a:p>
+        </p:txBody>
+      </p:sp>
+      <p:sp>
+        <p:nvSpPr>
+          <p:cNvPr id="6" name="Slide Number Placeholder 5"/>
+          <p:cNvSpPr>
+            <a:spLocks noGrp="1"/>
+          </p:cNvSpPr>
+          <p:nvPr>
+            <p:ph type="sldNum" sz="quarter" idx="12"/>
+          </p:nvPr>
+        </p:nvSpPr>
+        <p:spPr/>
+        <p:txBody>
+          <a:bodyPr/>
+          <a:lstStyle/>
+          <a:p>
+            <a:fld id="{0CFEC368-1D7A-4F81-ABF6-AE0E36BAF64C}" type="slidenum">
+              <a:rPr lang="en-US" smtClean="0"/>
+              <a:pPr/>
+              <a:t>10</a:t>
+            </a:fld>
+            <a:endParaRPr lang="en-US"/>
+          </a:p>
+        </p:txBody>
+      </p:sp>
+    </p:spTree>
+    <p:extLst>
+      <p:ext uri="{BB962C8B-B14F-4D97-AF65-F5344CB8AC3E}">
+        <p14:creationId xmlns:p14="http://schemas.microsoft.com/office/powerpoint/2010/main" val="582181170"/>
+      </p:ext>
+    </p:extLst>
+  </p:cSld>
+  <p:clrMapOvr>
+    <a:masterClrMapping/>
+  </p:clrMapOvr>
+  <p:timing>
+    <p:tnLst>
+      <p:par>
+        <p:cTn xmlns:p14="http://schemas.microsoft.com/office/powerpoint/2010/main" id="1" dur="indefinite" restart="never" nodeType="tmRoot">
+          <p:childTnLst>
+            <p:seq concurrent="1" nextAc="seek">
+              <p:cTn id="2" dur="indefinite" nodeType="mainSeq">
+                <p:childTnLst>
+                  <p:par>
+                    <p:cTn id="3" fill="hold">
+                      <p:stCondLst>
+                        <p:cond delay="indefinite"/>
+                        <p:cond evt="onBegin" delay="0">
+                          <p:tn val="2"/>
+                        </p:cond>
+                      </p:stCondLst>
+                      <p:childTnLst>
+                        <p:par>
+                          <p:cTn id="4" fill="hold">
+                            <p:stCondLst>
+                              <p:cond delay="0"/>
+                            </p:stCondLst>
+                            <p:childTnLst>
+                              <p:par>
+                                <p:cTn id="5" presetID="1" presetClass="entr" presetSubtype="0" fill="hold" grpId="0" nodeType="withEffect">
+                                  <p:stCondLst>
+                                    <p:cond delay="0"/>
+                                  </p:stCondLst>
+                                  <p:childTnLst>
+                                    <p:set>
+                                      <p:cBhvr>
+                                        <p:cTn id="6" dur="1" fill="hold">
+                                          <p:stCondLst>
+                                            <p:cond delay="0"/>
+                                          </p:stCondLst>
+                                        </p:cTn>
+                                        <p:tgtEl>
+                                          <p:spTgt spid="3">
+                                            <p:txEl>
+                                              <p:pRg st="0" end="0"/>
+                                            </p:txEl>
+                                          </p:spTgt>
+                                        </p:tgtEl>
+                                        <p:attrNameLst>
+                                          <p:attrName>style.visibility</p:attrName>
+                                        </p:attrNameLst>
+                                      </p:cBhvr>
+                                      <p:to>
+                                        <p:strVal val="visible"/>
+                                      </p:to>
+                                    </p:set>
+                                  </p:childTnLst>
+                                </p:cTn>
+                              </p:par>
+                              <p:par>
+                                <p:cTn id="7" presetID="1" presetClass="entr" presetSubtype="0" fill="hold" grpId="0" nodeType="withEffect">
+                                  <p:stCondLst>
+                                    <p:cond delay="0"/>
+                                  </p:stCondLst>
+                                  <p:childTnLst>
+                                    <p:set>
+                                      <p:cBhvr>
+                                        <p:cTn id="8" dur="1" fill="hold">
+                                          <p:stCondLst>
+                                            <p:cond delay="0"/>
+                                          </p:stCondLst>
+                                        </p:cTn>
+                                        <p:tgtEl>
+                                          <p:spTgt spid="3">
+                                            <p:txEl>
+                                              <p:pRg st="1" end="1"/>
+                                            </p:txEl>
+                                          </p:spTgt>
+                                        </p:tgtEl>
+                                        <p:attrNameLst>
+                                          <p:attrName>style.visibility</p:attrName>
+                                        </p:attrNameLst>
+                                      </p:cBhvr>
+                                      <p:to>
+                                        <p:strVal val="visible"/>
+                                      </p:to>
+                                    </p:set>
+                                  </p:childTnLst>
+                                </p:cTn>
+                              </p:par>
+                              <p:par>
+                                <p:cTn id="9" presetID="1" presetClass="entr" presetSubtype="0" fill="hold" grpId="0" nodeType="withEffect">
+                                  <p:stCondLst>
+                                    <p:cond delay="0"/>
+                                  </p:stCondLst>
+                                  <p:childTnLst>
+                                    <p:set>
+                                      <p:cBhvr>
+                                        <p:cTn id="10" dur="1" fill="hold">
+                                          <p:stCondLst>
+                                            <p:cond delay="0"/>
+                                          </p:stCondLst>
+                                        </p:cTn>
+                                        <p:tgtEl>
+                                          <p:spTgt spid="3">
+                                            <p:txEl>
+                                              <p:pRg st="2" end="2"/>
+                                            </p:txEl>
+                                          </p:spTgt>
+                                        </p:tgtEl>
+                                        <p:attrNameLst>
+                                          <p:attrName>style.visibility</p:attrName>
+                                        </p:attrNameLst>
+                                      </p:cBhvr>
+                                      <p:to>
+                                        <p:strVal val="visible"/>
+                                      </p:to>
+                                    </p:set>
+                                  </p:childTnLst>
+                                </p:cTn>
+                              </p:par>
+                              <p:par>
+                                <p:cTn id="11" presetID="1" presetClass="entr" presetSubtype="0" fill="hold" grpId="0" nodeType="withEffect">
+                                  <p:stCondLst>
+                                    <p:cond delay="0"/>
+                                  </p:stCondLst>
+                                  <p:childTnLst>
+                                    <p:set>
+                                      <p:cBhvr>
+                                        <p:cTn id="12" dur="1" fill="hold">
+                                          <p:stCondLst>
+                                            <p:cond delay="0"/>
+                                          </p:stCondLst>
+                                        </p:cTn>
+                                        <p:tgtEl>
+                                          <p:spTgt spid="3">
+                                            <p:txEl>
+                                              <p:pRg st="3" end="3"/>
+                                            </p:txEl>
+                                          </p:spTgt>
+                                        </p:tgtEl>
+                                        <p:attrNameLst>
+                                          <p:attrName>style.visibility</p:attrName>
+                                        </p:attrNameLst>
+                                      </p:cBhvr>
+                                      <p:to>
+                                        <p:strVal val="visible"/>
+                                      </p:to>
+                                    </p:set>
+                                  </p:childTnLst>
+                                </p:cTn>
+                              </p:par>
+                            </p:childTnLst>
+                          </p:cTn>
+                        </p:par>
+                      </p:childTnLst>
+                    </p:cTn>
+                  </p:par>
+                  <p:par>
+                    <p:cTn id="13" fill="hold">
+                      <p:stCondLst>
+                        <p:cond delay="indefinite"/>
+                      </p:stCondLst>
+                      <p:childTnLst>
+                        <p:par>
+                          <p:cTn id="14" fill="hold">
+                            <p:stCondLst>
+                              <p:cond delay="0"/>
+                            </p:stCondLst>
+                            <p:childTnLst>
+                              <p:par>
+                                <p:cTn id="15" presetID="1" presetClass="entr" presetSubtype="0" fill="hold" grpId="0" nodeType="clickEffect">
+                                  <p:stCondLst>
+                                    <p:cond delay="0"/>
+                                  </p:stCondLst>
+                                  <p:childTnLst>
+                                    <p:set>
+                                      <p:cBhvr>
+                                        <p:cTn id="16" dur="1" fill="hold">
+                                          <p:stCondLst>
+                                            <p:cond delay="0"/>
+                                          </p:stCondLst>
+                                        </p:cTn>
+                                        <p:tgtEl>
+                                          <p:spTgt spid="3">
+                                            <p:txEl>
+                                              <p:pRg st="4" end="4"/>
+                                            </p:txEl>
+                                          </p:spTgt>
+                                        </p:tgtEl>
+                                        <p:attrNameLst>
+                                          <p:attrName>style.visibility</p:attrName>
+                                        </p:attrNameLst>
+                                      </p:cBhvr>
+                                      <p:to>
+                                        <p:strVal val="visible"/>
+                                      </p:to>
+                                    </p:set>
+                                  </p:childTnLst>
+                                </p:cTn>
+                              </p:par>
+                              <p:par>
+                                <p:cTn id="17" presetID="1" presetClass="entr" presetSubtype="0" fill="hold" grpId="0" nodeType="withEffect">
+                                  <p:stCondLst>
+                                    <p:cond delay="0"/>
+                                  </p:stCondLst>
+                                  <p:childTnLst>
+                                    <p:set>
+                                      <p:cBhvr>
+                                        <p:cTn id="18" dur="1" fill="hold">
+                                          <p:stCondLst>
+                                            <p:cond delay="0"/>
+                                          </p:stCondLst>
+                                        </p:cTn>
+                                        <p:tgtEl>
+                                          <p:spTgt spid="3">
+                                            <p:txEl>
+                                              <p:pRg st="5" end="5"/>
+                                            </p:txEl>
+                                          </p:spTgt>
+                                        </p:tgtEl>
+                                        <p:attrNameLst>
+                                          <p:attrName>style.visibility</p:attrName>
+                                        </p:attrNameLst>
+                                      </p:cBhvr>
+                                      <p:to>
+                                        <p:strVal val="visible"/>
+                                      </p:to>
+                                    </p:set>
+                                  </p:childTnLst>
+                                </p:cTn>
+                              </p:par>
+                              <p:par>
+                                <p:cTn id="19" presetID="1" presetClass="entr" presetSubtype="0" fill="hold" grpId="0" nodeType="withEffect">
+                                  <p:stCondLst>
+                                    <p:cond delay="0"/>
+                                  </p:stCondLst>
+                                  <p:childTnLst>
+                                    <p:set>
+                                      <p:cBhvr>
+                                        <p:cTn id="20" dur="1" fill="hold">
+                                          <p:stCondLst>
+                                            <p:cond delay="0"/>
+                                          </p:stCondLst>
+                                        </p:cTn>
+                                        <p:tgtEl>
+                                          <p:spTgt spid="3">
+                                            <p:txEl>
+                                              <p:pRg st="6" end="6"/>
+                                            </p:txEl>
+                                          </p:spTgt>
+                                        </p:tgtEl>
+                                        <p:attrNameLst>
+                                          <p:attrName>style.visibility</p:attrName>
+                                        </p:attrNameLst>
+                                      </p:cBhvr>
+                                      <p:to>
+                                        <p:strVal val="visible"/>
+                                      </p:to>
+                                    </p:set>
+                                  </p:childTnLst>
+                                </p:cTn>
+                              </p:par>
+                              <p:par>
+                                <p:cTn id="21" presetID="1" presetClass="entr" presetSubtype="0" fill="hold" grpId="0" nodeType="withEffect">
+                                  <p:stCondLst>
+                                    <p:cond delay="0"/>
+                                  </p:stCondLst>
+                                  <p:childTnLst>
+                                    <p:set>
+                                      <p:cBhvr>
+                                        <p:cTn id="22" dur="1" fill="hold">
+                                          <p:stCondLst>
+                                            <p:cond delay="0"/>
+                                          </p:stCondLst>
+                                        </p:cTn>
+                                        <p:tgtEl>
+                                          <p:spTgt spid="3">
+                                            <p:txEl>
+                                              <p:pRg st="7" end="7"/>
+                                            </p:txEl>
+                                          </p:spTgt>
+                                        </p:tgtEl>
+                                        <p:attrNameLst>
+                                          <p:attrName>style.visibility</p:attrName>
+                                        </p:attrNameLst>
+                                      </p:cBhvr>
+                                      <p:to>
+                                        <p:strVal val="visible"/>
+                                      </p:to>
+                                    </p:set>
+                                  </p:childTnLst>
+                                </p:cTn>
+                              </p:par>
+                              <p:par>
+                                <p:cTn id="23" presetID="1" presetClass="entr" presetSubtype="0" fill="hold" grpId="0" nodeType="withEffect">
+                                  <p:stCondLst>
+                                    <p:cond delay="0"/>
+                                  </p:stCondLst>
+                                  <p:childTnLst>
+                                    <p:set>
+                                      <p:cBhvr>
+                                        <p:cTn id="24" dur="1" fill="hold">
+                                          <p:stCondLst>
+                                            <p:cond delay="0"/>
+                                          </p:stCondLst>
+                                        </p:cTn>
+                                        <p:tgtEl>
+                                          <p:spTgt spid="3">
+                                            <p:txEl>
+                                              <p:pRg st="8" end="8"/>
+                                            </p:txEl>
+                                          </p:spTgt>
+                                        </p:tgtEl>
+                                        <p:attrNameLst>
+                                          <p:attrName>style.visibility</p:attrName>
+                                        </p:attrNameLst>
+                                      </p:cBhvr>
+                                      <p:to>
+                                        <p:strVal val="visible"/>
+                                      </p:to>
+                                    </p:set>
+                                  </p:childTnLst>
+                                </p:cTn>
+                              </p:par>
+                              <p:par>
+                                <p:cTn id="25" presetID="1" presetClass="entr" presetSubtype="0" fill="hold" grpId="0" nodeType="withEffect">
+                                  <p:stCondLst>
+                                    <p:cond delay="0"/>
+                                  </p:stCondLst>
+                                  <p:childTnLst>
+                                    <p:set>
+                                      <p:cBhvr>
+                                        <p:cTn id="26" dur="1" fill="hold">
+                                          <p:stCondLst>
+                                            <p:cond delay="0"/>
+                                          </p:stCondLst>
+                                        </p:cTn>
+                                        <p:tgtEl>
+                                          <p:spTgt spid="3">
+                                            <p:txEl>
+                                              <p:pRg st="9" end="9"/>
+                                            </p:txEl>
+                                          </p:spTgt>
+                                        </p:tgtEl>
+                                        <p:attrNameLst>
+                                          <p:attrName>style.visibility</p:attrName>
+                                        </p:attrNameLst>
+                                      </p:cBhvr>
+                                      <p:to>
+                                        <p:strVal val="visible"/>
+                                      </p:to>
+                                    </p:set>
+                                  </p:childTnLst>
+                                </p:cTn>
+                              </p:par>
+                              <p:par>
+                                <p:cTn id="27" presetID="1" presetClass="entr" presetSubtype="0" fill="hold" grpId="0" nodeType="withEffect">
+                                  <p:stCondLst>
+                                    <p:cond delay="0"/>
+                                  </p:stCondLst>
+                                  <p:childTnLst>
+                                    <p:set>
+                                      <p:cBhvr>
+                                        <p:cTn id="28" dur="1" fill="hold">
+                                          <p:stCondLst>
+                                            <p:cond delay="0"/>
+                                          </p:stCondLst>
+                                        </p:cTn>
+                                        <p:tgtEl>
+                                          <p:spTgt spid="3">
+                                            <p:txEl>
+                                              <p:pRg st="10" end="10"/>
+                                            </p:txEl>
+                                          </p:spTgt>
+                                        </p:tgtEl>
+                                        <p:attrNameLst>
+                                          <p:attrName>style.visibility</p:attrName>
+                                        </p:attrNameLst>
+                                      </p:cBhvr>
+                                      <p:to>
+                                        <p:strVal val="visible"/>
+                                      </p:to>
+                                    </p:set>
+                                  </p:childTnLst>
+                                </p:cTn>
+                              </p:par>
+                            </p:childTnLst>
+                          </p:cTn>
+                        </p:par>
+                      </p:childTnLst>
+                    </p:cTn>
+                  </p:par>
+                </p:childTnLst>
+              </p:cTn>
+              <p:prevCondLst>
+                <p:cond evt="onPrev" delay="0">
+                  <p:tgtEl>
+                    <p:sldTgt/>
+                  </p:tgtEl>
+                </p:cond>
+              </p:prevCondLst>
+              <p:nextCondLst>
+                <p:cond evt="onNext" delay="0">
+                  <p:tgtEl>
+                    <p:sldTgt/>
+                  </p:tgtEl>
+                </p:cond>
+              </p:nextCondLst>
+            </p:seq>
+          </p:childTnLst>
+        </p:cTn>
+      </p:par>
+    </p:tnLst>
+    <p:bldLst>
+      <p:bldP spid="3" grpId="0" build="p"/>
+    </p:bldLst>
+  </p:timing>
+</p:sld>
+</file>
+
+<file path=ppt/slides/slide11.xml><?xml version="1.0" encoding="utf-8"?>
+<p:sld xmlns:a="http://schemas.openxmlformats.org/drawingml/2006/main" xmlns:r="http://schemas.openxmlformats.org/officeDocument/2006/relationships" xmlns:p="http://schemas.openxmlformats.org/presentationml/2006/main">
+  <p:cSld>
+    <p:spTree>
+      <p:nvGrpSpPr>
+        <p:cNvPr id="1" name=""/>
+        <p:cNvGrpSpPr/>
+        <p:nvPr/>
+      </p:nvGrpSpPr>
+      <p:grpSpPr>
+        <a:xfrm>
+          <a:off x="0" y="0"/>
+          <a:ext cx="0" cy="0"/>
+          <a:chOff x="0" y="0"/>
+          <a:chExt cx="0" cy="0"/>
+        </a:xfrm>
+      </p:grpSpPr>
+      <p:sp>
+        <p:nvSpPr>
+          <p:cNvPr id="2" name="Title 1"/>
+          <p:cNvSpPr>
+            <a:spLocks noGrp="1"/>
+          </p:cNvSpPr>
+          <p:nvPr>
+            <p:ph type="title"/>
+          </p:nvPr>
+        </p:nvSpPr>
+        <p:spPr/>
+        <p:txBody>
+          <a:bodyPr>
+            <a:normAutofit/>
+          </a:bodyPr>
+          <a:lstStyle/>
+          <a:p>
+            <a:r>
+              <a:rPr lang="en-US" dirty="0"/>
               <a:t>Periodic Load Balancing</a:t>
             </a:r>
           </a:p>
@@ -7208,7 +7871,7 @@
             <a:fld id="{0CFEC368-1D7A-4F81-ABF6-AE0E36BAF64C}" type="slidenum">
               <a:rPr lang="en-US" smtClean="0"/>
               <a:pPr/>
-              <a:t>10</a:t>
+              <a:t>11</a:t>
             </a:fld>
             <a:endParaRPr lang="en-US"/>
           </a:p>
@@ -7547,285 +8210,6 @@
 </p:sld>
 </file>
 
-<file path=ppt/slides/slide11.xml><?xml version="1.0" encoding="utf-8"?>
-<p:sld xmlns:a="http://schemas.openxmlformats.org/drawingml/2006/main" xmlns:r="http://schemas.openxmlformats.org/officeDocument/2006/relationships" xmlns:p="http://schemas.openxmlformats.org/presentationml/2006/main">
-  <p:cSld>
-    <p:spTree>
-      <p:nvGrpSpPr>
-        <p:cNvPr id="1" name=""/>
-        <p:cNvGrpSpPr/>
-        <p:nvPr/>
-      </p:nvGrpSpPr>
-      <p:grpSpPr>
-        <a:xfrm>
-          <a:off x="0" y="0"/>
-          <a:ext cx="0" cy="0"/>
-          <a:chOff x="0" y="0"/>
-          <a:chExt cx="0" cy="0"/>
-        </a:xfrm>
-      </p:grpSpPr>
-      <p:sp>
-        <p:nvSpPr>
-          <p:cNvPr id="2" name="Title 1"/>
-          <p:cNvSpPr>
-            <a:spLocks noGrp="1"/>
-          </p:cNvSpPr>
-          <p:nvPr>
-            <p:ph type="title"/>
-          </p:nvPr>
-        </p:nvSpPr>
-        <p:spPr/>
-        <p:txBody>
-          <a:bodyPr>
-            <a:normAutofit/>
-          </a:bodyPr>
-          <a:lstStyle/>
-          <a:p>
-            <a:r>
-              <a:rPr lang="en-US" dirty="0"/>
-              <a:t>Object Partitioning Strategies</a:t>
-            </a:r>
-          </a:p>
-        </p:txBody>
-      </p:sp>
-      <p:sp>
-        <p:nvSpPr>
-          <p:cNvPr id="3" name="Content Placeholder 2"/>
-          <p:cNvSpPr>
-            <a:spLocks noGrp="1"/>
-          </p:cNvSpPr>
-          <p:nvPr>
-            <p:ph idx="1"/>
-          </p:nvPr>
-        </p:nvSpPr>
-        <p:spPr/>
-        <p:txBody>
-          <a:bodyPr>
-            <a:normAutofit/>
-          </a:bodyPr>
-          <a:lstStyle/>
-          <a:p>
-            <a:r>
-              <a:rPr lang="en-US" dirty="0"/>
-              <a:t>You can use graph </a:t>
-            </a:r>
-            <a:r>
-              <a:rPr lang="en-US" dirty="0" err="1"/>
-              <a:t>partitioners</a:t>
-            </a:r>
-            <a:r>
-              <a:rPr lang="en-US" dirty="0"/>
-              <a:t> like METIS, K-R</a:t>
-            </a:r>
-          </a:p>
-          <a:p>
-            <a:pPr lvl="1"/>
-            <a:r>
-              <a:rPr lang="en-US" dirty="0" smtClean="0"/>
-              <a:t>BUT</a:t>
-            </a:r>
-            <a:r>
-              <a:rPr lang="en-US" dirty="0"/>
-              <a:t>: graphs are smaller, and optimization criteria are </a:t>
-            </a:r>
-            <a:r>
-              <a:rPr lang="en-US" dirty="0" smtClean="0"/>
-              <a:t>different </a:t>
-            </a:r>
-          </a:p>
-          <a:p>
-            <a:r>
-              <a:rPr lang="en-US" dirty="0" smtClean="0"/>
-              <a:t>Greedy </a:t>
-            </a:r>
-            <a:r>
-              <a:rPr lang="en-US" dirty="0"/>
-              <a:t>strategies:</a:t>
-            </a:r>
-          </a:p>
-          <a:p>
-            <a:pPr lvl="1"/>
-            <a:r>
-              <a:rPr lang="en-US" dirty="0" smtClean="0"/>
-              <a:t>If </a:t>
-            </a:r>
-            <a:r>
-              <a:rPr lang="en-US" dirty="0"/>
-              <a:t>communication costs are low: use a simple greedy strategy</a:t>
-            </a:r>
-          </a:p>
-          <a:p>
-            <a:pPr lvl="2"/>
-            <a:r>
-              <a:rPr lang="en-US" dirty="0" smtClean="0"/>
-              <a:t>Sort </a:t>
-            </a:r>
-            <a:r>
-              <a:rPr lang="en-US" dirty="0"/>
-              <a:t>objects by decreasing load</a:t>
-            </a:r>
-          </a:p>
-          <a:p>
-            <a:pPr lvl="2"/>
-            <a:r>
-              <a:rPr lang="en-US" dirty="0" smtClean="0"/>
-              <a:t>Maintain </a:t>
-            </a:r>
-            <a:r>
-              <a:rPr lang="en-US" dirty="0"/>
-              <a:t>processors in a heap (by assigned load)</a:t>
-            </a:r>
-          </a:p>
-          <a:p>
-            <a:pPr lvl="2"/>
-            <a:r>
-              <a:rPr lang="en-US" dirty="0" smtClean="0"/>
-              <a:t>In </a:t>
-            </a:r>
-            <a:r>
-              <a:rPr lang="en-US" dirty="0"/>
-              <a:t>each </a:t>
-            </a:r>
-            <a:r>
-              <a:rPr lang="en-US" dirty="0" smtClean="0"/>
-              <a:t>step: assign </a:t>
-            </a:r>
-            <a:r>
-              <a:rPr lang="en-US" dirty="0"/>
-              <a:t>the heaviest remaining object to the least loaded processor</a:t>
-            </a:r>
-          </a:p>
-          <a:p>
-            <a:pPr lvl="1"/>
-            <a:r>
-              <a:rPr lang="en-US" dirty="0" smtClean="0"/>
-              <a:t>With </a:t>
-            </a:r>
-            <a:r>
-              <a:rPr lang="en-US" dirty="0"/>
-              <a:t>small-to-moderate communication cost:</a:t>
-            </a:r>
-          </a:p>
-          <a:p>
-            <a:pPr lvl="2"/>
-            <a:r>
-              <a:rPr lang="en-US" dirty="0" smtClean="0"/>
-              <a:t>Same </a:t>
-            </a:r>
-            <a:r>
-              <a:rPr lang="en-US" dirty="0"/>
-              <a:t>strategy, but add communication costs as you add an object to </a:t>
-            </a:r>
-            <a:r>
-              <a:rPr lang="en-US" dirty="0" smtClean="0"/>
-              <a:t>a processor</a:t>
-            </a:r>
-            <a:endParaRPr lang="en-US" dirty="0"/>
-          </a:p>
-          <a:p>
-            <a:pPr lvl="1"/>
-            <a:r>
-              <a:rPr lang="en-US" dirty="0" smtClean="0"/>
-              <a:t>Always </a:t>
-            </a:r>
-            <a:r>
-              <a:rPr lang="en-US" dirty="0"/>
-              <a:t>add a refinement step at the end:</a:t>
-            </a:r>
-          </a:p>
-          <a:p>
-            <a:pPr lvl="2"/>
-            <a:r>
-              <a:rPr lang="en-US" dirty="0" smtClean="0"/>
-              <a:t>Swap </a:t>
-            </a:r>
-            <a:r>
-              <a:rPr lang="en-US" dirty="0"/>
-              <a:t>work from heaviest loaded processor to “some other processor” </a:t>
-            </a:r>
-            <a:endParaRPr lang="en-US" dirty="0" smtClean="0"/>
-          </a:p>
-          <a:p>
-            <a:pPr lvl="2"/>
-            <a:r>
-              <a:rPr lang="en-US" dirty="0" smtClean="0"/>
-              <a:t>Repeat </a:t>
-            </a:r>
-            <a:r>
-              <a:rPr lang="en-US" dirty="0"/>
-              <a:t>a few times or until no improvement</a:t>
-            </a:r>
-          </a:p>
-        </p:txBody>
-      </p:sp>
-      <p:sp>
-        <p:nvSpPr>
-          <p:cNvPr id="5" name="Footer Placeholder 4"/>
-          <p:cNvSpPr>
-            <a:spLocks noGrp="1"/>
-          </p:cNvSpPr>
-          <p:nvPr>
-            <p:ph type="ftr" sz="quarter" idx="11"/>
-          </p:nvPr>
-        </p:nvSpPr>
-        <p:spPr/>
-        <p:txBody>
-          <a:bodyPr/>
-          <a:lstStyle/>
-          <a:p>
-            <a:pPr algn="r"/>
-            <a:r>
-              <a:rPr lang="en-US" smtClean="0"/>
-              <a:t>Laxmikant Kalé and PPL (UIUC) – Parallel Migratable Objects </a:t>
-            </a:r>
-            <a:endParaRPr lang="en-US" dirty="0"/>
-          </a:p>
-        </p:txBody>
-      </p:sp>
-      <p:sp>
-        <p:nvSpPr>
-          <p:cNvPr id="6" name="Slide Number Placeholder 5"/>
-          <p:cNvSpPr>
-            <a:spLocks noGrp="1"/>
-          </p:cNvSpPr>
-          <p:nvPr>
-            <p:ph type="sldNum" sz="quarter" idx="12"/>
-          </p:nvPr>
-        </p:nvSpPr>
-        <p:spPr/>
-        <p:txBody>
-          <a:bodyPr/>
-          <a:lstStyle/>
-          <a:p>
-            <a:fld id="{0CFEC368-1D7A-4F81-ABF6-AE0E36BAF64C}" type="slidenum">
-              <a:rPr lang="en-US" smtClean="0"/>
-              <a:pPr/>
-              <a:t>11</a:t>
-            </a:fld>
-            <a:endParaRPr lang="en-US"/>
-          </a:p>
-        </p:txBody>
-      </p:sp>
-    </p:spTree>
-    <p:extLst>
-      <p:ext uri="{BB962C8B-B14F-4D97-AF65-F5344CB8AC3E}">
-        <p14:creationId xmlns:p14="http://schemas.microsoft.com/office/powerpoint/2010/main" val="48398553"/>
-      </p:ext>
-    </p:extLst>
-  </p:cSld>
-  <p:clrMapOvr>
-    <a:masterClrMapping/>
-  </p:clrMapOvr>
-  <p:timing>
-    <p:tnLst>
-      <p:par>
-        <p:cTn xmlns:p14="http://schemas.microsoft.com/office/powerpoint/2010/main" id="1" dur="indefinite" restart="never" nodeType="tmRoot"/>
-      </p:par>
-    </p:tnLst>
-  </p:timing>
-</p:sld>
-</file>
-
 <file path=ppt/slides/slide12.xml><?xml version="1.0" encoding="utf-8"?>
 <p:sld xmlns:a="http://schemas.openxmlformats.org/drawingml/2006/main" xmlns:r="http://schemas.openxmlformats.org/officeDocument/2006/relationships" xmlns:p="http://schemas.openxmlformats.org/presentationml/2006/main">
   <p:cSld>
@@ -7862,7 +8246,7 @@
           <a:p>
             <a:r>
               <a:rPr lang="en-US" dirty="0"/>
-              <a:t>Object Partitioning Strategies 2</a:t>
+              <a:t>Object Partitioning Strategies</a:t>
             </a:r>
           </a:p>
         </p:txBody>
@@ -7879,108 +8263,160 @@
         </p:nvSpPr>
         <p:spPr/>
         <p:txBody>
-          <a:bodyPr/>
+          <a:bodyPr>
+            <a:normAutofit/>
+          </a:bodyPr>
           <a:lstStyle/>
           <a:p>
-            <a:pPr marL="0" indent="0">
-              <a:buNone/>
-            </a:pPr>
-            <a:r>
-              <a:rPr lang="en-US" sz="2800" dirty="0"/>
-              <a:t>When communication cost is significant:</a:t>
-            </a:r>
-          </a:p>
-          <a:p>
             <a:r>
               <a:rPr lang="en-US" dirty="0"/>
-              <a:t>Still use greedy strategy, but:</a:t>
+              <a:t>You can use graph </a:t>
+            </a:r>
+            <a:r>
+              <a:rPr lang="en-US" dirty="0" err="1"/>
+              <a:t>partitioners</a:t>
+            </a:r>
+            <a:r>
+              <a:rPr lang="en-US" dirty="0"/>
+              <a:t> like METIS, K-R</a:t>
             </a:r>
           </a:p>
           <a:p>
             <a:pPr lvl="1"/>
             <a:r>
               <a:rPr lang="en-US" dirty="0" smtClean="0"/>
-              <a:t>At </a:t>
+              <a:t>BUT</a:t>
             </a:r>
             <a:r>
               <a:rPr lang="en-US" dirty="0"/>
-              <a:t>each assignment step, choose between assigning O to least loaded processor and the processor that already has objects that communicate most with O.</a:t>
+              <a:t>: graphs are smaller, and optimization criteria are </a:t>
+            </a:r>
+            <a:r>
+              <a:rPr lang="en-US" dirty="0" smtClean="0"/>
+              <a:t>different </a:t>
+            </a:r>
+          </a:p>
+          <a:p>
+            <a:r>
+              <a:rPr lang="en-US" dirty="0" smtClean="0"/>
+              <a:t>Greedy </a:t>
+            </a:r>
+            <a:r>
+              <a:rPr lang="en-US" dirty="0"/>
+              <a:t>strategies:</a:t>
+            </a:r>
+          </a:p>
+          <a:p>
+            <a:pPr lvl="1"/>
+            <a:r>
+              <a:rPr lang="en-US" dirty="0" smtClean="0"/>
+              <a:t>If </a:t>
+            </a:r>
+            <a:r>
+              <a:rPr lang="en-US" dirty="0"/>
+              <a:t>communication costs are low: use a simple greedy strategy</a:t>
             </a:r>
           </a:p>
           <a:p>
             <a:pPr lvl="2"/>
             <a:r>
               <a:rPr lang="en-US" dirty="0" smtClean="0"/>
-              <a:t>Based </a:t>
+              <a:t>Sort </a:t>
             </a:r>
             <a:r>
               <a:rPr lang="en-US" dirty="0"/>
-              <a:t>on the degree of </a:t>
-            </a:r>
+              <a:t>objects by decreasing load</a:t>
+            </a:r>
+          </a:p>
+          <a:p>
+            <a:pPr lvl="2"/>
             <a:r>
               <a:rPr lang="en-US" dirty="0" smtClean="0"/>
-              <a:t>difference </a:t>
+              <a:t>Maintain </a:t>
             </a:r>
             <a:r>
               <a:rPr lang="en-US" dirty="0"/>
-              <a:t>in the two metrics </a:t>
-            </a:r>
-            <a:endParaRPr lang="en-US" dirty="0" smtClean="0"/>
+              <a:t>processors in a heap (by assigned load)</a:t>
+            </a:r>
           </a:p>
           <a:p>
             <a:pPr lvl="2"/>
-            <a:r>
-              <a:rPr lang="en-US" dirty="0" smtClean="0"/>
-              <a:t>Two</a:t>
-            </a:r>
-            <a:r>
-              <a:rPr lang="en-US" dirty="0"/>
-              <a:t>-stage </a:t>
-            </a:r>
-            <a:r>
-              <a:rPr lang="en-US" dirty="0" smtClean="0"/>
-              <a:t>assignments:</a:t>
-            </a:r>
-          </a:p>
-          <a:p>
-            <a:pPr lvl="3"/>
             <a:r>
               <a:rPr lang="en-US" dirty="0" smtClean="0"/>
               <a:t>In </a:t>
             </a:r>
             <a:r>
               <a:rPr lang="en-US" dirty="0"/>
-              <a:t>early stages, consider communication costs as long as the processors are in the same (broad) load class</a:t>
+              <a:t>each </a:t>
             </a:r>
             <a:r>
               <a:rPr lang="en-US" dirty="0" smtClean="0"/>
-              <a:t>,</a:t>
-            </a:r>
-          </a:p>
-          <a:p>
-            <a:pPr lvl="3"/>
+              <a:t>step: assign </a:t>
+            </a:r>
+            <a:r>
+              <a:rPr lang="en-US" dirty="0"/>
+              <a:t>the heaviest remaining object to the least loaded processor</a:t>
+            </a:r>
+          </a:p>
+          <a:p>
+            <a:pPr lvl="1"/>
             <a:r>
               <a:rPr lang="en-US" dirty="0" smtClean="0"/>
-              <a:t>In </a:t>
+              <a:t>With </a:t>
             </a:r>
             <a:r>
               <a:rPr lang="en-US" dirty="0"/>
-              <a:t>later stages, decide based on load</a:t>
-            </a:r>
-          </a:p>
-          <a:p>
-            <a:pPr marL="0" indent="0">
-              <a:buNone/>
-            </a:pPr>
-            <a:r>
-              <a:rPr lang="en-US" sz="2800" dirty="0"/>
-              <a:t>Branch-and-bound</a:t>
-            </a:r>
-          </a:p>
-          <a:p>
+              <a:t>small-to-moderate communication cost:</a:t>
+            </a:r>
+          </a:p>
+          <a:p>
+            <a:pPr lvl="2"/>
+            <a:r>
+              <a:rPr lang="en-US" dirty="0" smtClean="0"/>
+              <a:t>Same </a:t>
+            </a:r>
             <a:r>
               <a:rPr lang="en-US" dirty="0"/>
-              <a:t>Searches for optimal, but can be stopped after a fixed time</a:t>
+              <a:t>strategy, but add communication costs as you add an object to </a:t>
+            </a:r>
+            <a:r>
+              <a:rPr lang="en-US" dirty="0" smtClean="0"/>
+              <a:t>a processor</a:t>
+            </a:r>
+            <a:endParaRPr lang="en-US" dirty="0"/>
+          </a:p>
+          <a:p>
+            <a:pPr lvl="1"/>
+            <a:r>
+              <a:rPr lang="en-US" dirty="0" smtClean="0"/>
+              <a:t>Always </a:t>
+            </a:r>
+            <a:r>
+              <a:rPr lang="en-US" dirty="0"/>
+              <a:t>add a refinement step at the end:</a:t>
+            </a:r>
+          </a:p>
+          <a:p>
+            <a:pPr lvl="2"/>
+            <a:r>
+              <a:rPr lang="en-US" dirty="0" smtClean="0"/>
+              <a:t>Swap </a:t>
+            </a:r>
+            <a:r>
+              <a:rPr lang="en-US" dirty="0"/>
+              <a:t>work from heaviest loaded processor to “some other processor” </a:t>
+            </a:r>
+            <a:endParaRPr lang="en-US" dirty="0" smtClean="0"/>
+          </a:p>
+          <a:p>
+            <a:pPr lvl="2"/>
+            <a:r>
+              <a:rPr lang="en-US" dirty="0" smtClean="0"/>
+              <a:t>Repeat </a:t>
+            </a:r>
+            <a:r>
+              <a:rPr lang="en-US" dirty="0"/>
+              <a:t>a few times or until no improvement</a:t>
             </a:r>
           </a:p>
         </p:txBody>
@@ -8036,7 +8472,7 @@
     </p:spTree>
     <p:extLst>
       <p:ext uri="{BB962C8B-B14F-4D97-AF65-F5344CB8AC3E}">
-        <p14:creationId xmlns:p14="http://schemas.microsoft.com/office/powerpoint/2010/main" val="3578324319"/>
+        <p14:creationId xmlns:p14="http://schemas.microsoft.com/office/powerpoint/2010/main" val="48398553"/>
       </p:ext>
     </p:extLst>
   </p:cSld>
@@ -8088,6 +8524,233 @@
           <a:lstStyle/>
           <a:p>
             <a:r>
+              <a:rPr lang="en-US" dirty="0"/>
+              <a:t>Object Partitioning Strategies 2</a:t>
+            </a:r>
+          </a:p>
+        </p:txBody>
+      </p:sp>
+      <p:sp>
+        <p:nvSpPr>
+          <p:cNvPr id="3" name="Content Placeholder 2"/>
+          <p:cNvSpPr>
+            <a:spLocks noGrp="1"/>
+          </p:cNvSpPr>
+          <p:nvPr>
+            <p:ph idx="1"/>
+          </p:nvPr>
+        </p:nvSpPr>
+        <p:spPr/>
+        <p:txBody>
+          <a:bodyPr/>
+          <a:lstStyle/>
+          <a:p>
+            <a:pPr marL="0" indent="0">
+              <a:buNone/>
+            </a:pPr>
+            <a:r>
+              <a:rPr lang="en-US" sz="2800" dirty="0"/>
+              <a:t>When communication cost is significant:</a:t>
+            </a:r>
+          </a:p>
+          <a:p>
+            <a:r>
+              <a:rPr lang="en-US" dirty="0"/>
+              <a:t>Still use greedy strategy, but:</a:t>
+            </a:r>
+          </a:p>
+          <a:p>
+            <a:pPr lvl="1"/>
+            <a:r>
+              <a:rPr lang="en-US" dirty="0" smtClean="0"/>
+              <a:t>At </a:t>
+            </a:r>
+            <a:r>
+              <a:rPr lang="en-US" dirty="0"/>
+              <a:t>each assignment step, choose between assigning O to least loaded processor and the processor that already has objects that communicate most with O.</a:t>
+            </a:r>
+          </a:p>
+          <a:p>
+            <a:pPr lvl="2"/>
+            <a:r>
+              <a:rPr lang="en-US" dirty="0" smtClean="0"/>
+              <a:t>Based </a:t>
+            </a:r>
+            <a:r>
+              <a:rPr lang="en-US" dirty="0"/>
+              <a:t>on the degree of </a:t>
+            </a:r>
+            <a:r>
+              <a:rPr lang="en-US" dirty="0" smtClean="0"/>
+              <a:t>difference </a:t>
+            </a:r>
+            <a:r>
+              <a:rPr lang="en-US" dirty="0"/>
+              <a:t>in the two metrics </a:t>
+            </a:r>
+            <a:endParaRPr lang="en-US" dirty="0" smtClean="0"/>
+          </a:p>
+          <a:p>
+            <a:pPr lvl="2"/>
+            <a:r>
+              <a:rPr lang="en-US" dirty="0" smtClean="0"/>
+              <a:t>Two</a:t>
+            </a:r>
+            <a:r>
+              <a:rPr lang="en-US" dirty="0"/>
+              <a:t>-stage </a:t>
+            </a:r>
+            <a:r>
+              <a:rPr lang="en-US" dirty="0" smtClean="0"/>
+              <a:t>assignments:</a:t>
+            </a:r>
+          </a:p>
+          <a:p>
+            <a:pPr lvl="3"/>
+            <a:r>
+              <a:rPr lang="en-US" dirty="0" smtClean="0"/>
+              <a:t>In </a:t>
+            </a:r>
+            <a:r>
+              <a:rPr lang="en-US" dirty="0"/>
+              <a:t>early stages, consider communication costs as long as the processors are in the same (broad) load class</a:t>
+            </a:r>
+            <a:r>
+              <a:rPr lang="en-US" dirty="0" smtClean="0"/>
+              <a:t>,</a:t>
+            </a:r>
+          </a:p>
+          <a:p>
+            <a:pPr lvl="3"/>
+            <a:r>
+              <a:rPr lang="en-US" dirty="0" smtClean="0"/>
+              <a:t>In </a:t>
+            </a:r>
+            <a:r>
+              <a:rPr lang="en-US" dirty="0"/>
+              <a:t>later stages, decide based on load</a:t>
+            </a:r>
+          </a:p>
+          <a:p>
+            <a:pPr marL="0" indent="0">
+              <a:buNone/>
+            </a:pPr>
+            <a:r>
+              <a:rPr lang="en-US" sz="2800" dirty="0"/>
+              <a:t>Branch-and-bound</a:t>
+            </a:r>
+          </a:p>
+          <a:p>
+            <a:r>
+              <a:rPr lang="en-US" dirty="0"/>
+              <a:t>Searches for optimal, but can be stopped after a fixed time</a:t>
+            </a:r>
+          </a:p>
+        </p:txBody>
+      </p:sp>
+      <p:sp>
+        <p:nvSpPr>
+          <p:cNvPr id="5" name="Footer Placeholder 4"/>
+          <p:cNvSpPr>
+            <a:spLocks noGrp="1"/>
+          </p:cNvSpPr>
+          <p:nvPr>
+            <p:ph type="ftr" sz="quarter" idx="11"/>
+          </p:nvPr>
+        </p:nvSpPr>
+        <p:spPr/>
+        <p:txBody>
+          <a:bodyPr/>
+          <a:lstStyle/>
+          <a:p>
+            <a:pPr algn="r"/>
+            <a:r>
+              <a:rPr lang="en-US" smtClean="0"/>
+              <a:t>Laxmikant Kalé and PPL (UIUC) – Parallel Migratable Objects </a:t>
+            </a:r>
+            <a:endParaRPr lang="en-US" dirty="0"/>
+          </a:p>
+        </p:txBody>
+      </p:sp>
+      <p:sp>
+        <p:nvSpPr>
+          <p:cNvPr id="6" name="Slide Number Placeholder 5"/>
+          <p:cNvSpPr>
+            <a:spLocks noGrp="1"/>
+          </p:cNvSpPr>
+          <p:nvPr>
+            <p:ph type="sldNum" sz="quarter" idx="12"/>
+          </p:nvPr>
+        </p:nvSpPr>
+        <p:spPr/>
+        <p:txBody>
+          <a:bodyPr/>
+          <a:lstStyle/>
+          <a:p>
+            <a:fld id="{0CFEC368-1D7A-4F81-ABF6-AE0E36BAF64C}" type="slidenum">
+              <a:rPr lang="en-US" smtClean="0"/>
+              <a:pPr/>
+              <a:t>13</a:t>
+            </a:fld>
+            <a:endParaRPr lang="en-US"/>
+          </a:p>
+        </p:txBody>
+      </p:sp>
+    </p:spTree>
+    <p:extLst>
+      <p:ext uri="{BB962C8B-B14F-4D97-AF65-F5344CB8AC3E}">
+        <p14:creationId xmlns:p14="http://schemas.microsoft.com/office/powerpoint/2010/main" val="3578324319"/>
+      </p:ext>
+    </p:extLst>
+  </p:cSld>
+  <p:clrMapOvr>
+    <a:masterClrMapping/>
+  </p:clrMapOvr>
+  <p:timing>
+    <p:tnLst>
+      <p:par>
+        <p:cTn xmlns:p14="http://schemas.microsoft.com/office/powerpoint/2010/main" id="1" dur="indefinite" restart="never" nodeType="tmRoot"/>
+      </p:par>
+    </p:tnLst>
+  </p:timing>
+</p:sld>
+</file>
+
+<file path=ppt/slides/slide14.xml><?xml version="1.0" encoding="utf-8"?>
+<p:sld xmlns:a="http://schemas.openxmlformats.org/drawingml/2006/main" xmlns:r="http://schemas.openxmlformats.org/officeDocument/2006/relationships" xmlns:p="http://schemas.openxmlformats.org/presentationml/2006/main">
+  <p:cSld>
+    <p:spTree>
+      <p:nvGrpSpPr>
+        <p:cNvPr id="1" name=""/>
+        <p:cNvGrpSpPr/>
+        <p:nvPr/>
+      </p:nvGrpSpPr>
+      <p:grpSpPr>
+        <a:xfrm>
+          <a:off x="0" y="0"/>
+          <a:ext cx="0" cy="0"/>
+          <a:chOff x="0" y="0"/>
+          <a:chExt cx="0" cy="0"/>
+        </a:xfrm>
+      </p:grpSpPr>
+      <p:sp>
+        <p:nvSpPr>
+          <p:cNvPr id="2" name="Title 1"/>
+          <p:cNvSpPr>
+            <a:spLocks noGrp="1"/>
+          </p:cNvSpPr>
+          <p:nvPr>
+            <p:ph type="title"/>
+          </p:nvPr>
+        </p:nvSpPr>
+        <p:spPr/>
+        <p:txBody>
+          <a:bodyPr>
+            <a:normAutofit/>
+          </a:bodyPr>
+          <a:lstStyle/>
+          <a:p>
+            <a:r>
               <a:rPr lang="en-US" dirty="0" smtClean="0"/>
               <a:t>Crack Propagation</a:t>
             </a:r>
@@ -8198,7 +8861,7 @@
             <a:fld id="{0CFEC368-1D7A-4F81-ABF6-AE0E36BAF64C}" type="slidenum">
               <a:rPr lang="en-US" smtClean="0"/>
               <a:pPr/>
-              <a:t>13</a:t>
+              <a:t>14</a:t>
             </a:fld>
             <a:endParaRPr lang="en-US"/>
           </a:p>
@@ -8284,7 +8947,7 @@
 </p:sld>
 </file>
 
-<file path=ppt/slides/slide14.xml><?xml version="1.0" encoding="utf-8"?>
+<file path=ppt/slides/slide15.xml><?xml version="1.0" encoding="utf-8"?>
 <p:sld xmlns:a="http://schemas.openxmlformats.org/drawingml/2006/main" xmlns:r="http://schemas.openxmlformats.org/officeDocument/2006/relationships" xmlns:p="http://schemas.openxmlformats.org/presentationml/2006/main">
   <p:cSld>
     <p:spTree>
@@ -8392,7 +9055,7 @@
             <a:fld id="{0CFEC368-1D7A-4F81-ABF6-AE0E36BAF64C}" type="slidenum">
               <a:rPr lang="en-US" smtClean="0"/>
               <a:pPr/>
-              <a:t>14</a:t>
+              <a:t>15</a:t>
             </a:fld>
             <a:endParaRPr lang="en-US"/>
           </a:p>
@@ -8418,7 +9081,7 @@
 </p:sld>
 </file>
 
-<file path=ppt/slides/slide15.xml><?xml version="1.0" encoding="utf-8"?>
+<file path=ppt/slides/slide16.xml><?xml version="1.0" encoding="utf-8"?>
 <p:sld xmlns:a="http://schemas.openxmlformats.org/drawingml/2006/main" xmlns:r="http://schemas.openxmlformats.org/officeDocument/2006/relationships" xmlns:p="http://schemas.openxmlformats.org/presentationml/2006/main">
   <p:cSld>
     <p:spTree>
@@ -8666,7 +9329,7 @@
             <a:fld id="{0CFEC368-1D7A-4F81-ABF6-AE0E36BAF64C}" type="slidenum">
               <a:rPr lang="en-US" smtClean="0"/>
               <a:pPr/>
-              <a:t>15</a:t>
+              <a:t>16</a:t>
             </a:fld>
             <a:endParaRPr lang="en-US"/>
           </a:p>
@@ -9178,188 +9841,6 @@
 </p:sld>
 </file>
 
-<file path=ppt/slides/slide16.xml><?xml version="1.0" encoding="utf-8"?>
-<p:sld xmlns:a="http://schemas.openxmlformats.org/drawingml/2006/main" xmlns:r="http://schemas.openxmlformats.org/officeDocument/2006/relationships" xmlns:p="http://schemas.openxmlformats.org/presentationml/2006/main">
-  <p:cSld>
-    <p:spTree>
-      <p:nvGrpSpPr>
-        <p:cNvPr id="1" name=""/>
-        <p:cNvGrpSpPr/>
-        <p:nvPr/>
-      </p:nvGrpSpPr>
-      <p:grpSpPr>
-        <a:xfrm>
-          <a:off x="0" y="0"/>
-          <a:ext cx="0" cy="0"/>
-          <a:chOff x="0" y="0"/>
-          <a:chExt cx="0" cy="0"/>
-        </a:xfrm>
-      </p:grpSpPr>
-      <p:sp>
-        <p:nvSpPr>
-          <p:cNvPr id="2" name="Title 1"/>
-          <p:cNvSpPr>
-            <a:spLocks noGrp="1"/>
-          </p:cNvSpPr>
-          <p:nvPr>
-            <p:ph type="title"/>
-          </p:nvPr>
-        </p:nvSpPr>
-        <p:spPr/>
-        <p:txBody>
-          <a:bodyPr>
-            <a:normAutofit/>
-          </a:bodyPr>
-          <a:lstStyle/>
-          <a:p>
-            <a:r>
-              <a:rPr lang="en-US" dirty="0"/>
-              <a:t>Load Balancing on Large Machines</a:t>
-            </a:r>
-          </a:p>
-        </p:txBody>
-      </p:sp>
-      <p:sp>
-        <p:nvSpPr>
-          <p:cNvPr id="3" name="Content Placeholder 2"/>
-          <p:cNvSpPr>
-            <a:spLocks noGrp="1"/>
-          </p:cNvSpPr>
-          <p:nvPr>
-            <p:ph idx="1"/>
-          </p:nvPr>
-        </p:nvSpPr>
-        <p:spPr/>
-        <p:txBody>
-          <a:bodyPr/>
-          <a:lstStyle/>
-          <a:p>
-            <a:r>
-              <a:rPr lang="en-US" dirty="0"/>
-              <a:t>Centralized load balancing strategies </a:t>
-            </a:r>
-            <a:r>
-              <a:rPr lang="en-US" dirty="0" smtClean="0"/>
-              <a:t>don’t </a:t>
-            </a:r>
-            <a:r>
-              <a:rPr lang="en-US" dirty="0"/>
-              <a:t>scale on extremely large machines</a:t>
-            </a:r>
-          </a:p>
-          <a:p>
-            <a:r>
-              <a:rPr lang="en-US" dirty="0"/>
-              <a:t>Limitations of centralized strategies:</a:t>
-            </a:r>
-          </a:p>
-          <a:p>
-            <a:pPr lvl="1"/>
-            <a:r>
-              <a:rPr lang="en-US" dirty="0" smtClean="0"/>
-              <a:t>Central </a:t>
-            </a:r>
-            <a:r>
-              <a:rPr lang="en-US" dirty="0"/>
-              <a:t>node: memory/communication bottleneck </a:t>
-            </a:r>
-            <a:endParaRPr lang="en-US" dirty="0" smtClean="0"/>
-          </a:p>
-          <a:p>
-            <a:pPr lvl="1"/>
-            <a:r>
-              <a:rPr lang="en-US" dirty="0" smtClean="0"/>
-              <a:t>Decision</a:t>
-            </a:r>
-            <a:r>
-              <a:rPr lang="en-US" dirty="0"/>
-              <a:t>-making algorithms tend to be very slow</a:t>
-            </a:r>
-          </a:p>
-          <a:p>
-            <a:r>
-              <a:rPr lang="en-US" dirty="0"/>
-              <a:t>Limitations of distributed strategies:</a:t>
-            </a:r>
-          </a:p>
-          <a:p>
-            <a:pPr lvl="1"/>
-            <a:r>
-              <a:rPr lang="en-US" dirty="0" smtClean="0"/>
-              <a:t>Difficult to achieve well-informed load balancing decisions</a:t>
-            </a:r>
-            <a:endParaRPr lang="en-US" dirty="0"/>
-          </a:p>
-        </p:txBody>
-      </p:sp>
-      <p:sp>
-        <p:nvSpPr>
-          <p:cNvPr id="5" name="Footer Placeholder 4"/>
-          <p:cNvSpPr>
-            <a:spLocks noGrp="1"/>
-          </p:cNvSpPr>
-          <p:nvPr>
-            <p:ph type="ftr" sz="quarter" idx="11"/>
-          </p:nvPr>
-        </p:nvSpPr>
-        <p:spPr/>
-        <p:txBody>
-          <a:bodyPr/>
-          <a:lstStyle/>
-          <a:p>
-            <a:pPr algn="r"/>
-            <a:r>
-              <a:rPr lang="en-US" smtClean="0"/>
-              <a:t>Laxmikant Kalé and PPL (UIUC) – Parallel Migratable Objects </a:t>
-            </a:r>
-            <a:endParaRPr lang="en-US" dirty="0"/>
-          </a:p>
-        </p:txBody>
-      </p:sp>
-      <p:sp>
-        <p:nvSpPr>
-          <p:cNvPr id="6" name="Slide Number Placeholder 5"/>
-          <p:cNvSpPr>
-            <a:spLocks noGrp="1"/>
-          </p:cNvSpPr>
-          <p:nvPr>
-            <p:ph type="sldNum" sz="quarter" idx="12"/>
-          </p:nvPr>
-        </p:nvSpPr>
-        <p:spPr/>
-        <p:txBody>
-          <a:bodyPr/>
-          <a:lstStyle/>
-          <a:p>
-            <a:fld id="{0CFEC368-1D7A-4F81-ABF6-AE0E36BAF64C}" type="slidenum">
-              <a:rPr lang="en-US" smtClean="0"/>
-              <a:pPr/>
-              <a:t>16</a:t>
-            </a:fld>
-            <a:endParaRPr lang="en-US"/>
-          </a:p>
-        </p:txBody>
-      </p:sp>
-    </p:spTree>
-    <p:extLst>
-      <p:ext uri="{BB962C8B-B14F-4D97-AF65-F5344CB8AC3E}">
-        <p14:creationId xmlns:p14="http://schemas.microsoft.com/office/powerpoint/2010/main" val="2075500013"/>
-      </p:ext>
-    </p:extLst>
-  </p:cSld>
-  <p:clrMapOvr>
-    <a:masterClrMapping/>
-  </p:clrMapOvr>
-  <p:timing>
-    <p:tnLst>
-      <p:par>
-        <p:cTn xmlns:p14="http://schemas.microsoft.com/office/powerpoint/2010/main" id="1" dur="indefinite" restart="never" nodeType="tmRoot"/>
-      </p:par>
-    </p:tnLst>
-  </p:timing>
-</p:sld>
-</file>
-
 <file path=ppt/slides/slide17.xml><?xml version="1.0" encoding="utf-8"?>
 <p:sld xmlns:a="http://schemas.openxmlformats.org/drawingml/2006/main" xmlns:r="http://schemas.openxmlformats.org/officeDocument/2006/relationships" xmlns:p="http://schemas.openxmlformats.org/presentationml/2006/main">
   <p:cSld>
@@ -9396,7 +9877,7 @@
           <a:p>
             <a:r>
               <a:rPr lang="en-US" dirty="0"/>
-              <a:t>Hierarchical Load Balancers</a:t>
+              <a:t>Load Balancing on Large Machines</a:t>
             </a:r>
           </a:p>
         </p:txBody>
@@ -9413,30 +9894,64 @@
         </p:nvSpPr>
         <p:spPr/>
         <p:txBody>
-          <a:bodyPr anchor="ctr"/>
+          <a:bodyPr/>
           <a:lstStyle/>
           <a:p>
             <a:r>
               <a:rPr lang="en-US" dirty="0"/>
-              <a:t>Partition processor allocation into processor groups </a:t>
+              <a:t>Centralized load balancing strategies </a:t>
+            </a:r>
+            <a:r>
+              <a:rPr lang="en-US" dirty="0" smtClean="0"/>
+              <a:t>don’t </a:t>
+            </a:r>
+            <a:r>
+              <a:rPr lang="en-US" dirty="0"/>
+              <a:t>scale on extremely large machines</a:t>
+            </a:r>
+          </a:p>
+          <a:p>
+            <a:r>
+              <a:rPr lang="en-US" dirty="0"/>
+              <a:t>Limitations of centralized strategies:</a:t>
+            </a:r>
+          </a:p>
+          <a:p>
+            <a:pPr lvl="1"/>
+            <a:r>
+              <a:rPr lang="en-US" dirty="0" smtClean="0"/>
+              <a:t>Central </a:t>
+            </a:r>
+            <a:r>
+              <a:rPr lang="en-US" dirty="0"/>
+              <a:t>node: memory/communication bottleneck </a:t>
             </a:r>
             <a:endParaRPr lang="en-US" dirty="0" smtClean="0"/>
           </a:p>
           <a:p>
+            <a:pPr lvl="1"/>
             <a:r>
               <a:rPr lang="en-US" dirty="0" smtClean="0"/>
-              <a:t>Apply different </a:t>
+              <a:t>Decision</a:t>
             </a:r>
             <a:r>
               <a:rPr lang="en-US" dirty="0"/>
-              <a:t>strategies at each level</a:t>
+              <a:t>-making algorithms tend to be very slow</a:t>
             </a:r>
           </a:p>
           <a:p>
             <a:r>
               <a:rPr lang="en-US" dirty="0"/>
-              <a:t>Scalable to a large number of processors</a:t>
-            </a:r>
+              <a:t>Limitations of distributed strategies:</a:t>
+            </a:r>
+          </a:p>
+          <a:p>
+            <a:pPr lvl="1"/>
+            <a:r>
+              <a:rPr lang="en-US" dirty="0" smtClean="0"/>
+              <a:t>Difficult to achieve well-informed load balancing decisions</a:t>
+            </a:r>
+            <a:endParaRPr lang="en-US" dirty="0"/>
           </a:p>
         </p:txBody>
       </p:sp>
@@ -9491,7 +10006,7 @@
     </p:spTree>
     <p:extLst>
       <p:ext uri="{BB962C8B-B14F-4D97-AF65-F5344CB8AC3E}">
-        <p14:creationId xmlns:p14="http://schemas.microsoft.com/office/powerpoint/2010/main" val="3120527482"/>
+        <p14:creationId xmlns:p14="http://schemas.microsoft.com/office/powerpoint/2010/main" val="2075500013"/>
       </p:ext>
     </p:extLst>
   </p:cSld>
@@ -9544,36 +10059,50 @@
           <a:p>
             <a:r>
               <a:rPr lang="en-US" dirty="0"/>
-              <a:t>Our Hybrid Scheme</a:t>
-            </a:r>
-          </a:p>
-        </p:txBody>
-      </p:sp>
-      <p:pic>
-        <p:nvPicPr>
-          <p:cNvPr id="7" name="Content Placeholder 6" descr="hybridLBScheme.png"/>
-          <p:cNvPicPr>
-            <a:picLocks noGrp="1" noChangeAspect="1"/>
-          </p:cNvPicPr>
+              <a:t>Hierarchical Load Balancers</a:t>
+            </a:r>
+          </a:p>
+        </p:txBody>
+      </p:sp>
+      <p:sp>
+        <p:nvSpPr>
+          <p:cNvPr id="3" name="Content Placeholder 2"/>
+          <p:cNvSpPr>
+            <a:spLocks noGrp="1"/>
+          </p:cNvSpPr>
           <p:nvPr>
             <p:ph idx="1"/>
           </p:nvPr>
-        </p:nvPicPr>
-        <p:blipFill>
-          <a:blip r:embed="rId2">
-            <a:extLst>
-              <a:ext uri="{28A0092B-C50C-407E-A947-70E740481C1C}">
-                <a14:useLocalDpi xmlns:a14="http://schemas.microsoft.com/office/drawing/2010/main" val="0"/>
-              </a:ext>
-            </a:extLst>
-          </a:blip>
-          <a:srcRect t="-8503" b="-8503"/>
-          <a:stretch>
-            <a:fillRect/>
-          </a:stretch>
-        </p:blipFill>
+        </p:nvSpPr>
         <p:spPr/>
-      </p:pic>
+        <p:txBody>
+          <a:bodyPr anchor="ctr"/>
+          <a:lstStyle/>
+          <a:p>
+            <a:r>
+              <a:rPr lang="en-US" dirty="0"/>
+              <a:t>Partition processor allocation into processor groups </a:t>
+            </a:r>
+            <a:endParaRPr lang="en-US" dirty="0" smtClean="0"/>
+          </a:p>
+          <a:p>
+            <a:r>
+              <a:rPr lang="en-US" dirty="0" smtClean="0"/>
+              <a:t>Apply different </a:t>
+            </a:r>
+            <a:r>
+              <a:rPr lang="en-US" dirty="0"/>
+              <a:t>strategies at each level</a:t>
+            </a:r>
+          </a:p>
+          <a:p>
+            <a:r>
+              <a:rPr lang="en-US" dirty="0"/>
+              <a:t>Scalable to a large number of processors</a:t>
+            </a:r>
+          </a:p>
+        </p:txBody>
+      </p:sp>
       <p:sp>
         <p:nvSpPr>
           <p:cNvPr id="5" name="Footer Placeholder 4"/>
@@ -9625,7 +10154,7 @@
     </p:spTree>
     <p:extLst>
       <p:ext uri="{BB962C8B-B14F-4D97-AF65-F5344CB8AC3E}">
-        <p14:creationId xmlns:p14="http://schemas.microsoft.com/office/powerpoint/2010/main" val="1948754625"/>
+        <p14:creationId xmlns:p14="http://schemas.microsoft.com/office/powerpoint/2010/main" val="3120527482"/>
       </p:ext>
     </p:extLst>
   </p:cSld>
@@ -9672,119 +10201,42 @@
         <p:spPr/>
         <p:txBody>
           <a:bodyPr>
-            <a:normAutofit fontScale="90000"/>
+            <a:normAutofit/>
           </a:bodyPr>
           <a:lstStyle/>
           <a:p>
             <a:r>
-              <a:rPr lang="en-US" dirty="0" err="1"/>
-              <a:t>MetaBalancer</a:t>
-            </a:r>
-            <a:r>
               <a:rPr lang="en-US" dirty="0"/>
-              <a:t> - When and how to load balance?</a:t>
-            </a:r>
-          </a:p>
-        </p:txBody>
-      </p:sp>
-      <p:sp>
-        <p:nvSpPr>
-          <p:cNvPr id="3" name="Content Placeholder 2"/>
-          <p:cNvSpPr>
-            <a:spLocks noGrp="1"/>
-          </p:cNvSpPr>
+              <a:t>Our Hybrid Scheme</a:t>
+            </a:r>
+          </a:p>
+        </p:txBody>
+      </p:sp>
+      <p:pic>
+        <p:nvPicPr>
+          <p:cNvPr id="7" name="Content Placeholder 6" descr="hybridLBScheme.png"/>
+          <p:cNvPicPr>
+            <a:picLocks noGrp="1" noChangeAspect="1"/>
+          </p:cNvPicPr>
           <p:nvPr>
             <p:ph idx="1"/>
           </p:nvPr>
-        </p:nvSpPr>
+        </p:nvPicPr>
+        <p:blipFill>
+          <a:blip r:embed="rId2">
+            <a:extLst>
+              <a:ext uri="{28A0092B-C50C-407E-A947-70E740481C1C}">
+                <a14:useLocalDpi xmlns:a14="http://schemas.microsoft.com/office/drawing/2010/main" val="0"/>
+              </a:ext>
+            </a:extLst>
+          </a:blip>
+          <a:srcRect t="-8503" b="-8503"/>
+          <a:stretch>
+            <a:fillRect/>
+          </a:stretch>
+        </p:blipFill>
         <p:spPr/>
-        <p:txBody>
-          <a:bodyPr/>
-          <a:lstStyle/>
-          <a:p>
-            <a:r>
-              <a:rPr lang="en-US" dirty="0" smtClean="0"/>
-              <a:t>Difficult </a:t>
-            </a:r>
-            <a:r>
-              <a:rPr lang="en-US" dirty="0"/>
-              <a:t>to find the optimum load balancing period </a:t>
-            </a:r>
-          </a:p>
-          <a:p>
-            <a:pPr lvl="1"/>
-            <a:r>
-              <a:rPr lang="en-US" dirty="0" smtClean="0"/>
-              <a:t>Depends </a:t>
-            </a:r>
-            <a:r>
-              <a:rPr lang="en-US" dirty="0"/>
-              <a:t>on the application </a:t>
-            </a:r>
-            <a:r>
-              <a:rPr lang="en-US" dirty="0" smtClean="0"/>
-              <a:t>characteristics</a:t>
-            </a:r>
-            <a:endParaRPr lang="en-US" dirty="0"/>
-          </a:p>
-          <a:p>
-            <a:pPr lvl="1"/>
-            <a:r>
-              <a:rPr lang="en-US" dirty="0" smtClean="0"/>
-              <a:t>Depends </a:t>
-            </a:r>
-            <a:r>
-              <a:rPr lang="en-US" dirty="0"/>
-              <a:t>on the machine the application is run on </a:t>
-            </a:r>
-          </a:p>
-          <a:p>
-            <a:r>
-              <a:rPr lang="en-US" dirty="0"/>
-              <a:t>Monitors the application continuously and predicts </a:t>
-            </a:r>
-            <a:r>
-              <a:rPr lang="en-US" dirty="0" smtClean="0"/>
-              <a:t>behavior.</a:t>
-            </a:r>
-          </a:p>
-          <a:p>
-            <a:r>
-              <a:rPr lang="en-US" dirty="0" smtClean="0"/>
-              <a:t>Decides </a:t>
-            </a:r>
-            <a:r>
-              <a:rPr lang="en-US" dirty="0"/>
-              <a:t>when to invoke which load </a:t>
-            </a:r>
-            <a:r>
-              <a:rPr lang="en-US" dirty="0" smtClean="0"/>
-              <a:t>balancer.</a:t>
-            </a:r>
-          </a:p>
-          <a:p>
-            <a:r>
-              <a:rPr lang="en-US" dirty="0" smtClean="0"/>
-              <a:t>Command </a:t>
-            </a:r>
-            <a:r>
-              <a:rPr lang="en-US" dirty="0"/>
-              <a:t>line argument - +</a:t>
-            </a:r>
-            <a:r>
-              <a:rPr lang="en-US" dirty="0" err="1"/>
-              <a:t>MetaLB</a:t>
-            </a:r>
-            <a:r>
-              <a:rPr lang="en-US" dirty="0"/>
-              <a:t> </a:t>
-            </a:r>
-            <a:endParaRPr lang="en-US" dirty="0">
-              <a:effectLst/>
-            </a:endParaRPr>
-          </a:p>
-        </p:txBody>
-      </p:sp>
+      </p:pic>
       <p:sp>
         <p:nvSpPr>
           <p:cNvPr id="5" name="Footer Placeholder 4"/>
@@ -9836,7 +10288,7 @@
     </p:spTree>
     <p:extLst>
       <p:ext uri="{BB962C8B-B14F-4D97-AF65-F5344CB8AC3E}">
-        <p14:creationId xmlns:p14="http://schemas.microsoft.com/office/powerpoint/2010/main" val="3819061467"/>
+        <p14:creationId xmlns:p14="http://schemas.microsoft.com/office/powerpoint/2010/main" val="1948754625"/>
       </p:ext>
     </p:extLst>
   </p:cSld>
@@ -10401,6 +10853,217 @@
         <p:spPr/>
         <p:txBody>
           <a:bodyPr>
+            <a:normAutofit fontScale="90000"/>
+          </a:bodyPr>
+          <a:lstStyle/>
+          <a:p>
+            <a:r>
+              <a:rPr lang="en-US" dirty="0" err="1"/>
+              <a:t>MetaBalancer</a:t>
+            </a:r>
+            <a:r>
+              <a:rPr lang="en-US" dirty="0"/>
+              <a:t> - When and how to load balance?</a:t>
+            </a:r>
+          </a:p>
+        </p:txBody>
+      </p:sp>
+      <p:sp>
+        <p:nvSpPr>
+          <p:cNvPr id="3" name="Content Placeholder 2"/>
+          <p:cNvSpPr>
+            <a:spLocks noGrp="1"/>
+          </p:cNvSpPr>
+          <p:nvPr>
+            <p:ph idx="1"/>
+          </p:nvPr>
+        </p:nvSpPr>
+        <p:spPr/>
+        <p:txBody>
+          <a:bodyPr/>
+          <a:lstStyle/>
+          <a:p>
+            <a:r>
+              <a:rPr lang="en-US" dirty="0" smtClean="0"/>
+              <a:t>Difficult </a:t>
+            </a:r>
+            <a:r>
+              <a:rPr lang="en-US" dirty="0"/>
+              <a:t>to find the optimum load balancing period </a:t>
+            </a:r>
+          </a:p>
+          <a:p>
+            <a:pPr lvl="1"/>
+            <a:r>
+              <a:rPr lang="en-US" dirty="0" smtClean="0"/>
+              <a:t>Depends </a:t>
+            </a:r>
+            <a:r>
+              <a:rPr lang="en-US" dirty="0"/>
+              <a:t>on the application </a:t>
+            </a:r>
+            <a:r>
+              <a:rPr lang="en-US" dirty="0" smtClean="0"/>
+              <a:t>characteristics</a:t>
+            </a:r>
+            <a:endParaRPr lang="en-US" dirty="0"/>
+          </a:p>
+          <a:p>
+            <a:pPr lvl="1"/>
+            <a:r>
+              <a:rPr lang="en-US" dirty="0" smtClean="0"/>
+              <a:t>Depends </a:t>
+            </a:r>
+            <a:r>
+              <a:rPr lang="en-US" dirty="0"/>
+              <a:t>on the machine the application is run on </a:t>
+            </a:r>
+          </a:p>
+          <a:p>
+            <a:r>
+              <a:rPr lang="en-US" dirty="0"/>
+              <a:t>Monitors the application continuously and predicts </a:t>
+            </a:r>
+            <a:r>
+              <a:rPr lang="en-US" dirty="0" smtClean="0"/>
+              <a:t>behavior.</a:t>
+            </a:r>
+          </a:p>
+          <a:p>
+            <a:r>
+              <a:rPr lang="en-US" dirty="0" smtClean="0"/>
+              <a:t>Decides </a:t>
+            </a:r>
+            <a:r>
+              <a:rPr lang="en-US" dirty="0"/>
+              <a:t>when to invoke which load </a:t>
+            </a:r>
+            <a:r>
+              <a:rPr lang="en-US" dirty="0" smtClean="0"/>
+              <a:t>balancer.</a:t>
+            </a:r>
+          </a:p>
+          <a:p>
+            <a:r>
+              <a:rPr lang="en-US" dirty="0" smtClean="0"/>
+              <a:t>Command </a:t>
+            </a:r>
+            <a:r>
+              <a:rPr lang="en-US" dirty="0"/>
+              <a:t>line argument - +</a:t>
+            </a:r>
+            <a:r>
+              <a:rPr lang="en-US" dirty="0" err="1"/>
+              <a:t>MetaLB</a:t>
+            </a:r>
+            <a:r>
+              <a:rPr lang="en-US" dirty="0"/>
+              <a:t> </a:t>
+            </a:r>
+            <a:endParaRPr lang="en-US" dirty="0">
+              <a:effectLst/>
+            </a:endParaRPr>
+          </a:p>
+        </p:txBody>
+      </p:sp>
+      <p:sp>
+        <p:nvSpPr>
+          <p:cNvPr id="5" name="Footer Placeholder 4"/>
+          <p:cNvSpPr>
+            <a:spLocks noGrp="1"/>
+          </p:cNvSpPr>
+          <p:nvPr>
+            <p:ph type="ftr" sz="quarter" idx="11"/>
+          </p:nvPr>
+        </p:nvSpPr>
+        <p:spPr/>
+        <p:txBody>
+          <a:bodyPr/>
+          <a:lstStyle/>
+          <a:p>
+            <a:pPr algn="r"/>
+            <a:r>
+              <a:rPr lang="en-US" smtClean="0"/>
+              <a:t>Laxmikant Kalé and PPL (UIUC) – Parallel Migratable Objects </a:t>
+            </a:r>
+            <a:endParaRPr lang="en-US" dirty="0"/>
+          </a:p>
+        </p:txBody>
+      </p:sp>
+      <p:sp>
+        <p:nvSpPr>
+          <p:cNvPr id="6" name="Slide Number Placeholder 5"/>
+          <p:cNvSpPr>
+            <a:spLocks noGrp="1"/>
+          </p:cNvSpPr>
+          <p:nvPr>
+            <p:ph type="sldNum" sz="quarter" idx="12"/>
+          </p:nvPr>
+        </p:nvSpPr>
+        <p:spPr/>
+        <p:txBody>
+          <a:bodyPr/>
+          <a:lstStyle/>
+          <a:p>
+            <a:fld id="{0CFEC368-1D7A-4F81-ABF6-AE0E36BAF64C}" type="slidenum">
+              <a:rPr lang="en-US" smtClean="0"/>
+              <a:pPr/>
+              <a:t>20</a:t>
+            </a:fld>
+            <a:endParaRPr lang="en-US"/>
+          </a:p>
+        </p:txBody>
+      </p:sp>
+    </p:spTree>
+    <p:extLst>
+      <p:ext uri="{BB962C8B-B14F-4D97-AF65-F5344CB8AC3E}">
+        <p14:creationId xmlns:p14="http://schemas.microsoft.com/office/powerpoint/2010/main" val="3819061467"/>
+      </p:ext>
+    </p:extLst>
+  </p:cSld>
+  <p:clrMapOvr>
+    <a:masterClrMapping/>
+  </p:clrMapOvr>
+  <p:timing>
+    <p:tnLst>
+      <p:par>
+        <p:cTn xmlns:p14="http://schemas.microsoft.com/office/powerpoint/2010/main" id="1" dur="indefinite" restart="never" nodeType="tmRoot"/>
+      </p:par>
+    </p:tnLst>
+  </p:timing>
+</p:sld>
+</file>
+
+<file path=ppt/slides/slide21.xml><?xml version="1.0" encoding="utf-8"?>
+<p:sld xmlns:a="http://schemas.openxmlformats.org/drawingml/2006/main" xmlns:r="http://schemas.openxmlformats.org/officeDocument/2006/relationships" xmlns:p="http://schemas.openxmlformats.org/presentationml/2006/main">
+  <p:cSld>
+    <p:spTree>
+      <p:nvGrpSpPr>
+        <p:cNvPr id="1" name=""/>
+        <p:cNvGrpSpPr/>
+        <p:nvPr/>
+      </p:nvGrpSpPr>
+      <p:grpSpPr>
+        <a:xfrm>
+          <a:off x="0" y="0"/>
+          <a:ext cx="0" cy="0"/>
+          <a:chOff x="0" y="0"/>
+          <a:chExt cx="0" cy="0"/>
+        </a:xfrm>
+      </p:grpSpPr>
+      <p:sp>
+        <p:nvSpPr>
+          <p:cNvPr id="2" name="Title 1"/>
+          <p:cNvSpPr>
+            <a:spLocks noGrp="1"/>
+          </p:cNvSpPr>
+          <p:nvPr>
+            <p:ph type="title"/>
+          </p:nvPr>
+        </p:nvSpPr>
+        <p:spPr/>
+        <p:txBody>
+          <a:bodyPr>
             <a:normAutofit/>
           </a:bodyPr>
           <a:lstStyle/>
@@ -10496,7 +11159,7 @@
             <a:fld id="{0CFEC368-1D7A-4F81-ABF6-AE0E36BAF64C}" type="slidenum">
               <a:rPr lang="en-US" smtClean="0"/>
               <a:pPr/>
-              <a:t>20</a:t>
+              <a:t>21</a:t>
             </a:fld>
             <a:endParaRPr lang="en-US"/>
           </a:p>
@@ -10552,7 +11215,7 @@
 </p:sld>
 </file>
 
-<file path=ppt/slides/slide21.xml><?xml version="1.0" encoding="utf-8"?>
+<file path=ppt/slides/slide22.xml><?xml version="1.0" encoding="utf-8"?>
 <p:sld xmlns:a="http://schemas.openxmlformats.org/drawingml/2006/main" xmlns:r="http://schemas.openxmlformats.org/officeDocument/2006/relationships" xmlns:p="http://schemas.openxmlformats.org/presentationml/2006/main">
   <p:cSld>
     <p:spTree>
@@ -10674,7 +11337,7 @@
             <a:fld id="{0CFEC368-1D7A-4F81-ABF6-AE0E36BAF64C}" type="slidenum">
               <a:rPr lang="en-US" smtClean="0"/>
               <a:pPr/>
-              <a:t>21</a:t>
+              <a:t>22</a:t>
             </a:fld>
             <a:endParaRPr lang="en-US"/>
           </a:p>
@@ -13247,30 +13910,8 @@
           <a:lstStyle/>
           <a:p>
             <a:r>
-              <a:rPr lang="en-US" dirty="0"/>
-              <a:t>Performance</a:t>
-            </a:r>
-          </a:p>
-        </p:txBody>
-      </p:sp>
-      <p:sp>
-        <p:nvSpPr>
-          <p:cNvPr id="7" name="Text Placeholder 6"/>
-          <p:cNvSpPr>
-            <a:spLocks noGrp="1"/>
-          </p:cNvSpPr>
-          <p:nvPr>
-            <p:ph type="body" idx="1"/>
-          </p:nvPr>
-        </p:nvSpPr>
-        <p:spPr/>
-        <p:txBody>
-          <a:bodyPr/>
-          <a:lstStyle/>
-          <a:p>
-            <a:r>
               <a:rPr lang="en-US" dirty="0" smtClean="0"/>
-              <a:t>Before LB</a:t>
+              <a:t>Performance – Before LB</a:t>
             </a:r>
             <a:endParaRPr lang="en-US" dirty="0"/>
           </a:p>
@@ -13283,7 +13924,7 @@
             <a:picLocks noGrp="1" noChangeAspect="1"/>
           </p:cNvPicPr>
           <p:nvPr>
-            <p:ph sz="half" idx="2"/>
+            <p:ph idx="1"/>
           </p:nvPr>
         </p:nvPicPr>
         <p:blipFill>
@@ -13294,66 +13935,15 @@
               </a:ext>
             </a:extLst>
           </a:blip>
+          <a:srcRect t="-26477" b="-26477"/>
           <a:stretch>
             <a:fillRect/>
           </a:stretch>
         </p:blipFill>
         <p:spPr>
           <a:xfrm>
-            <a:off x="261865" y="3203435"/>
-            <a:ext cx="4114800" cy="1697317"/>
-          </a:xfrm>
-        </p:spPr>
-      </p:pic>
-      <p:sp>
-        <p:nvSpPr>
-          <p:cNvPr id="9" name="Text Placeholder 8"/>
-          <p:cNvSpPr>
-            <a:spLocks noGrp="1"/>
-          </p:cNvSpPr>
-          <p:nvPr>
-            <p:ph type="body" sz="quarter" idx="3"/>
-          </p:nvPr>
-        </p:nvSpPr>
-        <p:spPr/>
-        <p:txBody>
-          <a:bodyPr/>
-          <a:lstStyle/>
-          <a:p>
-            <a:r>
-              <a:rPr lang="en-US" dirty="0" smtClean="0"/>
-              <a:t>After LB</a:t>
-            </a:r>
-            <a:endParaRPr lang="en-US" dirty="0"/>
-          </a:p>
-        </p:txBody>
-      </p:sp>
-      <p:pic>
-        <p:nvPicPr>
-          <p:cNvPr id="12" name="Content Placeholder 11"/>
-          <p:cNvPicPr>
-            <a:picLocks noGrp="1" noChangeAspect="1"/>
-          </p:cNvPicPr>
-          <p:nvPr>
-            <p:ph sz="quarter" idx="4"/>
-          </p:nvPr>
-        </p:nvPicPr>
-        <p:blipFill>
-          <a:blip r:embed="rId3">
-            <a:extLst>
-              <a:ext uri="{28A0092B-C50C-407E-A947-70E740481C1C}">
-                <a14:useLocalDpi xmlns:a14="http://schemas.microsoft.com/office/drawing/2010/main" val="0"/>
-              </a:ext>
-            </a:extLst>
-          </a:blip>
-          <a:stretch>
-            <a:fillRect/>
-          </a:stretch>
-        </p:blipFill>
-        <p:spPr>
-          <a:xfrm>
-            <a:off x="4737100" y="3197687"/>
-            <a:ext cx="4140125" cy="1708813"/>
+            <a:off x="261938" y="942975"/>
+            <a:ext cx="8615362" cy="5435600"/>
           </a:xfrm>
         </p:spPr>
       </p:pic>
@@ -13461,19 +14051,134 @@
           <a:p>
             <a:r>
               <a:rPr lang="en-US" dirty="0"/>
-              <a:t>Golden Rule of Load Balancing</a:t>
-            </a:r>
-          </a:p>
-        </p:txBody>
-      </p:sp>
-      <p:sp>
-        <p:nvSpPr>
-          <p:cNvPr id="3" name="Content Placeholder 2"/>
-          <p:cNvSpPr>
-            <a:spLocks noGrp="1"/>
-          </p:cNvSpPr>
+              <a:t>Performance </a:t>
+            </a:r>
+            <a:r>
+              <a:rPr lang="en-US" dirty="0" smtClean="0"/>
+              <a:t>– After LB</a:t>
+            </a:r>
+            <a:endParaRPr lang="en-US" dirty="0"/>
+          </a:p>
+        </p:txBody>
+      </p:sp>
+      <p:pic>
+        <p:nvPicPr>
+          <p:cNvPr id="12" name="Content Placeholder 11"/>
+          <p:cNvPicPr>
+            <a:picLocks noGrp="1" noChangeAspect="1"/>
+          </p:cNvPicPr>
           <p:nvPr>
             <p:ph idx="1"/>
+          </p:nvPr>
+        </p:nvPicPr>
+        <p:blipFill>
+          <a:blip r:embed="rId2">
+            <a:extLst>
+              <a:ext uri="{28A0092B-C50C-407E-A947-70E740481C1C}">
+                <a14:useLocalDpi xmlns:a14="http://schemas.microsoft.com/office/drawing/2010/main" val="0"/>
+              </a:ext>
+            </a:extLst>
+          </a:blip>
+          <a:srcRect t="-26428" b="-26428"/>
+          <a:stretch>
+            <a:fillRect/>
+          </a:stretch>
+        </p:blipFill>
+        <p:spPr/>
+      </p:pic>
+      <p:sp>
+        <p:nvSpPr>
+          <p:cNvPr id="5" name="Footer Placeholder 4"/>
+          <p:cNvSpPr>
+            <a:spLocks noGrp="1"/>
+          </p:cNvSpPr>
+          <p:nvPr>
+            <p:ph type="ftr" sz="quarter" idx="11"/>
+          </p:nvPr>
+        </p:nvSpPr>
+        <p:spPr/>
+        <p:txBody>
+          <a:bodyPr/>
+          <a:lstStyle/>
+          <a:p>
+            <a:pPr algn="r"/>
+            <a:r>
+              <a:rPr lang="en-US" smtClean="0"/>
+              <a:t>Laxmikant Kalé and PPL (UIUC) – Parallel Migratable Objects </a:t>
+            </a:r>
+            <a:endParaRPr lang="en-US" dirty="0"/>
+          </a:p>
+        </p:txBody>
+      </p:sp>
+      <p:sp>
+        <p:nvSpPr>
+          <p:cNvPr id="6" name="Slide Number Placeholder 5"/>
+          <p:cNvSpPr>
+            <a:spLocks noGrp="1"/>
+          </p:cNvSpPr>
+          <p:nvPr>
+            <p:ph type="sldNum" sz="quarter" idx="12"/>
+          </p:nvPr>
+        </p:nvSpPr>
+        <p:spPr/>
+        <p:txBody>
+          <a:bodyPr/>
+          <a:lstStyle/>
+          <a:p>
+            <a:fld id="{0CFEC368-1D7A-4F81-ABF6-AE0E36BAF64C}" type="slidenum">
+              <a:rPr lang="en-US" smtClean="0"/>
+              <a:pPr/>
+              <a:t>8</a:t>
+            </a:fld>
+            <a:endParaRPr lang="en-US"/>
+          </a:p>
+        </p:txBody>
+      </p:sp>
+    </p:spTree>
+    <p:extLst>
+      <p:ext uri="{BB962C8B-B14F-4D97-AF65-F5344CB8AC3E}">
+        <p14:creationId xmlns:p14="http://schemas.microsoft.com/office/powerpoint/2010/main" val="4178834895"/>
+      </p:ext>
+    </p:extLst>
+  </p:cSld>
+  <p:clrMapOvr>
+    <a:masterClrMapping/>
+  </p:clrMapOvr>
+  <p:timing>
+    <p:tnLst>
+      <p:par>
+        <p:cTn xmlns:p14="http://schemas.microsoft.com/office/powerpoint/2010/main" id="1" dur="indefinite" restart="never" nodeType="tmRoot"/>
+      </p:par>
+    </p:tnLst>
+  </p:timing>
+</p:sld>
+</file>
+
+<file path=ppt/slides/slide9.xml><?xml version="1.0" encoding="utf-8"?>
+<p:sld xmlns:a="http://schemas.openxmlformats.org/drawingml/2006/main" xmlns:r="http://schemas.openxmlformats.org/officeDocument/2006/relationships" xmlns:p="http://schemas.openxmlformats.org/presentationml/2006/main">
+  <p:cSld>
+    <p:spTree>
+      <p:nvGrpSpPr>
+        <p:cNvPr id="1" name=""/>
+        <p:cNvGrpSpPr/>
+        <p:nvPr/>
+      </p:nvGrpSpPr>
+      <p:grpSpPr>
+        <a:xfrm>
+          <a:off x="0" y="0"/>
+          <a:ext cx="0" cy="0"/>
+          <a:chOff x="0" y="0"/>
+          <a:chExt cx="0" cy="0"/>
+        </a:xfrm>
+      </p:grpSpPr>
+      <p:sp>
+        <p:nvSpPr>
+          <p:cNvPr id="2" name="Title 1"/>
+          <p:cNvSpPr>
+            <a:spLocks noGrp="1"/>
+          </p:cNvSpPr>
+          <p:nvPr>
+            <p:ph type="title"/>
           </p:nvPr>
         </p:nvSpPr>
         <p:spPr/>
@@ -13483,6 +14188,30 @@
           </a:bodyPr>
           <a:lstStyle/>
           <a:p>
+            <a:r>
+              <a:rPr lang="en-US" dirty="0"/>
+              <a:t>Golden Rule of Load Balancing</a:t>
+            </a:r>
+          </a:p>
+        </p:txBody>
+      </p:sp>
+      <p:sp>
+        <p:nvSpPr>
+          <p:cNvPr id="3" name="Content Placeholder 2"/>
+          <p:cNvSpPr>
+            <a:spLocks noGrp="1"/>
+          </p:cNvSpPr>
+          <p:nvPr>
+            <p:ph idx="1"/>
+          </p:nvPr>
+        </p:nvSpPr>
+        <p:spPr/>
+        <p:txBody>
+          <a:bodyPr>
+            <a:normAutofit/>
+          </a:bodyPr>
+          <a:lstStyle/>
+          <a:p>
             <a:pPr marL="0" indent="0">
               <a:buNone/>
             </a:pPr>
@@ -13656,7 +14385,7 @@
             <a:fld id="{0CFEC368-1D7A-4F81-ABF6-AE0E36BAF64C}" type="slidenum">
               <a:rPr lang="en-US" smtClean="0"/>
               <a:pPr/>
-              <a:t>8</a:t>
+              <a:t>9</a:t>
             </a:fld>
             <a:endParaRPr lang="en-US"/>
           </a:p>
@@ -14050,668 +14779,6 @@
         </p:cTn>
       </p:par>
     </p:tnLst>
-  </p:timing>
-</p:sld>
-</file>
-
-<file path=ppt/slides/slide9.xml><?xml version="1.0" encoding="utf-8"?>
-<p:sld xmlns:a="http://schemas.openxmlformats.org/drawingml/2006/main" xmlns:r="http://schemas.openxmlformats.org/officeDocument/2006/relationships" xmlns:p="http://schemas.openxmlformats.org/presentationml/2006/main">
-  <p:cSld>
-    <p:spTree>
-      <p:nvGrpSpPr>
-        <p:cNvPr id="1" name=""/>
-        <p:cNvGrpSpPr/>
-        <p:nvPr/>
-      </p:nvGrpSpPr>
-      <p:grpSpPr>
-        <a:xfrm>
-          <a:off x="0" y="0"/>
-          <a:ext cx="0" cy="0"/>
-          <a:chOff x="0" y="0"/>
-          <a:chExt cx="0" cy="0"/>
-        </a:xfrm>
-      </p:grpSpPr>
-      <p:sp>
-        <p:nvSpPr>
-          <p:cNvPr id="2" name="Title 1"/>
-          <p:cNvSpPr>
-            <a:spLocks noGrp="1"/>
-          </p:cNvSpPr>
-          <p:nvPr>
-            <p:ph type="title"/>
-          </p:nvPr>
-        </p:nvSpPr>
-        <p:spPr/>
-        <p:txBody>
-          <a:bodyPr>
-            <a:normAutofit/>
-          </a:bodyPr>
-          <a:lstStyle/>
-          <a:p>
-            <a:r>
-              <a:rPr lang="en-US" dirty="0"/>
-              <a:t>Load Balancing Strategies</a:t>
-            </a:r>
-          </a:p>
-        </p:txBody>
-      </p:sp>
-      <p:sp>
-        <p:nvSpPr>
-          <p:cNvPr id="3" name="Content Placeholder 2"/>
-          <p:cNvSpPr>
-            <a:spLocks noGrp="1"/>
-          </p:cNvSpPr>
-          <p:nvPr>
-            <p:ph idx="1"/>
-          </p:nvPr>
-        </p:nvSpPr>
-        <p:spPr/>
-        <p:txBody>
-          <a:bodyPr>
-            <a:normAutofit/>
-          </a:bodyPr>
-          <a:lstStyle/>
-          <a:p>
-            <a:r>
-              <a:rPr lang="en-US" dirty="0"/>
-              <a:t>Classified by when it is done:</a:t>
-            </a:r>
-          </a:p>
-          <a:p>
-            <a:pPr lvl="1"/>
-            <a:r>
-              <a:rPr lang="en-US" dirty="0" smtClean="0"/>
-              <a:t>Initially</a:t>
-            </a:r>
-            <a:endParaRPr lang="en-US" dirty="0"/>
-          </a:p>
-          <a:p>
-            <a:pPr lvl="1"/>
-            <a:r>
-              <a:rPr lang="en-US" dirty="0" smtClean="0"/>
-              <a:t>Dynamic</a:t>
-            </a:r>
-            <a:r>
-              <a:rPr lang="en-US" dirty="0"/>
-              <a:t>: Periodically </a:t>
-            </a:r>
-            <a:endParaRPr lang="en-US" dirty="0" smtClean="0"/>
-          </a:p>
-          <a:p>
-            <a:pPr lvl="1"/>
-            <a:r>
-              <a:rPr lang="en-US" dirty="0" smtClean="0"/>
-              <a:t>Dynamic</a:t>
-            </a:r>
-            <a:r>
-              <a:rPr lang="en-US" dirty="0"/>
-              <a:t>: Continuously</a:t>
-            </a:r>
-          </a:p>
-          <a:p>
-            <a:r>
-              <a:rPr lang="en-US" dirty="0"/>
-              <a:t>Classified by whether decisions are taken with global information</a:t>
-            </a:r>
-          </a:p>
-          <a:p>
-            <a:pPr lvl="1"/>
-            <a:r>
-              <a:rPr lang="en-US" dirty="0" smtClean="0"/>
-              <a:t>Fully </a:t>
-            </a:r>
-            <a:r>
-              <a:rPr lang="en-US" dirty="0"/>
-              <a:t>centralized</a:t>
-            </a:r>
-          </a:p>
-          <a:p>
-            <a:pPr lvl="2"/>
-            <a:r>
-              <a:rPr lang="en-US" dirty="0" smtClean="0"/>
-              <a:t>Quite a good </a:t>
-            </a:r>
-            <a:r>
-              <a:rPr lang="en-US" dirty="0"/>
-              <a:t>choice when load balancing period is high</a:t>
-            </a:r>
-          </a:p>
-          <a:p>
-            <a:pPr lvl="1"/>
-            <a:r>
-              <a:rPr lang="en-US" dirty="0" smtClean="0"/>
-              <a:t>Fully </a:t>
-            </a:r>
-            <a:r>
-              <a:rPr lang="en-US" dirty="0"/>
-              <a:t>distributed</a:t>
-            </a:r>
-          </a:p>
-          <a:p>
-            <a:pPr lvl="2"/>
-            <a:r>
-              <a:rPr lang="en-US" dirty="0" smtClean="0"/>
-              <a:t>Each </a:t>
-            </a:r>
-            <a:r>
-              <a:rPr lang="en-US" dirty="0"/>
-              <a:t>processor knows only about a constant number of neighbors</a:t>
-            </a:r>
-          </a:p>
-          <a:p>
-            <a:pPr lvl="2"/>
-            <a:r>
-              <a:rPr lang="en-US" dirty="0" smtClean="0"/>
-              <a:t>Extreme </a:t>
-            </a:r>
-            <a:r>
-              <a:rPr lang="en-US" dirty="0"/>
-              <a:t>case: totally local decision (send work to a random </a:t>
-            </a:r>
-            <a:r>
-              <a:rPr lang="en-US" dirty="0" smtClean="0"/>
-              <a:t>destination processor</a:t>
-            </a:r>
-            <a:r>
-              <a:rPr lang="en-US" dirty="0"/>
-              <a:t>, with some probability).</a:t>
-            </a:r>
-          </a:p>
-          <a:p>
-            <a:pPr lvl="1"/>
-            <a:r>
-              <a:rPr lang="en-US" dirty="0" smtClean="0"/>
-              <a:t>Use </a:t>
-            </a:r>
-            <a:r>
-              <a:rPr lang="en-US" i="1" dirty="0"/>
-              <a:t>aggregated</a:t>
-            </a:r>
-            <a:r>
-              <a:rPr lang="en-US" dirty="0"/>
-              <a:t> global information, and </a:t>
-            </a:r>
-            <a:r>
-              <a:rPr lang="en-US" i="1" dirty="0"/>
-              <a:t>detailed </a:t>
-            </a:r>
-            <a:r>
-              <a:rPr lang="en-US" dirty="0"/>
-              <a:t>neighborhood info.</a:t>
-            </a:r>
-          </a:p>
-        </p:txBody>
-      </p:sp>
-      <p:sp>
-        <p:nvSpPr>
-          <p:cNvPr id="5" name="Footer Placeholder 4"/>
-          <p:cNvSpPr>
-            <a:spLocks noGrp="1"/>
-          </p:cNvSpPr>
-          <p:nvPr>
-            <p:ph type="ftr" sz="quarter" idx="11"/>
-          </p:nvPr>
-        </p:nvSpPr>
-        <p:spPr/>
-        <p:txBody>
-          <a:bodyPr/>
-          <a:lstStyle/>
-          <a:p>
-            <a:pPr algn="r"/>
-            <a:r>
-              <a:rPr lang="en-US" smtClean="0"/>
-              <a:t>Laxmikant Kalé and PPL (UIUC) – Parallel Migratable Objects </a:t>
-            </a:r>
-            <a:endParaRPr lang="en-US" dirty="0"/>
-          </a:p>
-        </p:txBody>
-      </p:sp>
-      <p:sp>
-        <p:nvSpPr>
-          <p:cNvPr id="6" name="Slide Number Placeholder 5"/>
-          <p:cNvSpPr>
-            <a:spLocks noGrp="1"/>
-          </p:cNvSpPr>
-          <p:nvPr>
-            <p:ph type="sldNum" sz="quarter" idx="12"/>
-          </p:nvPr>
-        </p:nvSpPr>
-        <p:spPr/>
-        <p:txBody>
-          <a:bodyPr/>
-          <a:lstStyle/>
-          <a:p>
-            <a:fld id="{0CFEC368-1D7A-4F81-ABF6-AE0E36BAF64C}" type="slidenum">
-              <a:rPr lang="en-US" smtClean="0"/>
-              <a:pPr/>
-              <a:t>9</a:t>
-            </a:fld>
-            <a:endParaRPr lang="en-US"/>
-          </a:p>
-        </p:txBody>
-      </p:sp>
-    </p:spTree>
-    <p:extLst>
-      <p:ext uri="{BB962C8B-B14F-4D97-AF65-F5344CB8AC3E}">
-        <p14:creationId xmlns:p14="http://schemas.microsoft.com/office/powerpoint/2010/main" val="582181170"/>
-      </p:ext>
-    </p:extLst>
-  </p:cSld>
-  <p:clrMapOvr>
-    <a:masterClrMapping/>
-  </p:clrMapOvr>
-  <p:timing>
-    <p:tnLst>
-      <p:par>
-        <p:cTn xmlns:p14="http://schemas.microsoft.com/office/powerpoint/2010/main" id="1" dur="indefinite" restart="never" nodeType="tmRoot">
-          <p:childTnLst>
-            <p:seq concurrent="1" nextAc="seek">
-              <p:cTn id="2" dur="indefinite" nodeType="mainSeq">
-                <p:childTnLst>
-                  <p:par>
-                    <p:cTn id="3" fill="hold">
-                      <p:stCondLst>
-                        <p:cond delay="indefinite"/>
-                        <p:cond evt="onBegin" delay="0">
-                          <p:tn val="2"/>
-                        </p:cond>
-                      </p:stCondLst>
-                      <p:childTnLst>
-                        <p:par>
-                          <p:cTn id="4" fill="hold">
-                            <p:stCondLst>
-                              <p:cond delay="0"/>
-                            </p:stCondLst>
-                            <p:childTnLst>
-                              <p:par>
-                                <p:cTn id="5" presetID="1" presetClass="entr" presetSubtype="0" fill="hold" grpId="0" nodeType="withEffect">
-                                  <p:stCondLst>
-                                    <p:cond delay="0"/>
-                                  </p:stCondLst>
-                                  <p:childTnLst>
-                                    <p:set>
-                                      <p:cBhvr>
-                                        <p:cTn id="6" dur="1" fill="hold">
-                                          <p:stCondLst>
-                                            <p:cond delay="0"/>
-                                          </p:stCondLst>
-                                        </p:cTn>
-                                        <p:tgtEl>
-                                          <p:spTgt spid="3">
-                                            <p:txEl>
-                                              <p:pRg st="0" end="0"/>
-                                            </p:txEl>
-                                          </p:spTgt>
-                                        </p:tgtEl>
-                                        <p:attrNameLst>
-                                          <p:attrName>style.visibility</p:attrName>
-                                        </p:attrNameLst>
-                                      </p:cBhvr>
-                                      <p:to>
-                                        <p:strVal val="visible"/>
-                                      </p:to>
-                                    </p:set>
-                                  </p:childTnLst>
-                                </p:cTn>
-                              </p:par>
-                              <p:par>
-                                <p:cTn id="7" presetID="1" presetClass="entr" presetSubtype="0" fill="hold" grpId="0" nodeType="withEffect">
-                                  <p:stCondLst>
-                                    <p:cond delay="0"/>
-                                  </p:stCondLst>
-                                  <p:childTnLst>
-                                    <p:set>
-                                      <p:cBhvr>
-                                        <p:cTn id="8" dur="1" fill="hold">
-                                          <p:stCondLst>
-                                            <p:cond delay="0"/>
-                                          </p:stCondLst>
-                                        </p:cTn>
-                                        <p:tgtEl>
-                                          <p:spTgt spid="3">
-                                            <p:txEl>
-                                              <p:pRg st="1" end="1"/>
-                                            </p:txEl>
-                                          </p:spTgt>
-                                        </p:tgtEl>
-                                        <p:attrNameLst>
-                                          <p:attrName>style.visibility</p:attrName>
-                                        </p:attrNameLst>
-                                      </p:cBhvr>
-                                      <p:to>
-                                        <p:strVal val="visible"/>
-                                      </p:to>
-                                    </p:set>
-                                  </p:childTnLst>
-                                </p:cTn>
-                              </p:par>
-                              <p:par>
-                                <p:cTn id="9" presetID="1" presetClass="entr" presetSubtype="0" fill="hold" grpId="0" nodeType="withEffect">
-                                  <p:stCondLst>
-                                    <p:cond delay="0"/>
-                                  </p:stCondLst>
-                                  <p:childTnLst>
-                                    <p:set>
-                                      <p:cBhvr>
-                                        <p:cTn id="10" dur="1" fill="hold">
-                                          <p:stCondLst>
-                                            <p:cond delay="0"/>
-                                          </p:stCondLst>
-                                        </p:cTn>
-                                        <p:tgtEl>
-                                          <p:spTgt spid="3">
-                                            <p:txEl>
-                                              <p:pRg st="2" end="2"/>
-                                            </p:txEl>
-                                          </p:spTgt>
-                                        </p:tgtEl>
-                                        <p:attrNameLst>
-                                          <p:attrName>style.visibility</p:attrName>
-                                        </p:attrNameLst>
-                                      </p:cBhvr>
-                                      <p:to>
-                                        <p:strVal val="visible"/>
-                                      </p:to>
-                                    </p:set>
-                                  </p:childTnLst>
-                                </p:cTn>
-                              </p:par>
-                              <p:par>
-                                <p:cTn id="11" presetID="1" presetClass="entr" presetSubtype="0" fill="hold" grpId="0" nodeType="withEffect">
-                                  <p:stCondLst>
-                                    <p:cond delay="0"/>
-                                  </p:stCondLst>
-                                  <p:childTnLst>
-                                    <p:set>
-                                      <p:cBhvr>
-                                        <p:cTn id="12" dur="1" fill="hold">
-                                          <p:stCondLst>
-                                            <p:cond delay="0"/>
-                                          </p:stCondLst>
-                                        </p:cTn>
-                                        <p:tgtEl>
-                                          <p:spTgt spid="3">
-                                            <p:txEl>
-                                              <p:pRg st="3" end="3"/>
-                                            </p:txEl>
-                                          </p:spTgt>
-                                        </p:tgtEl>
-                                        <p:attrNameLst>
-                                          <p:attrName>style.visibility</p:attrName>
-                                        </p:attrNameLst>
-                                      </p:cBhvr>
-                                      <p:to>
-                                        <p:strVal val="visible"/>
-                                      </p:to>
-                                    </p:set>
-                                  </p:childTnLst>
-                                </p:cTn>
-                              </p:par>
-                            </p:childTnLst>
-                          </p:cTn>
-                        </p:par>
-                      </p:childTnLst>
-                    </p:cTn>
-                  </p:par>
-                  <p:par>
-                    <p:cTn id="13" fill="hold">
-                      <p:stCondLst>
-                        <p:cond delay="indefinite"/>
-                      </p:stCondLst>
-                      <p:childTnLst>
-                        <p:par>
-                          <p:cTn id="14" fill="hold">
-                            <p:stCondLst>
-                              <p:cond delay="0"/>
-                            </p:stCondLst>
-                            <p:childTnLst>
-                              <p:par>
-                                <p:cTn id="15" presetID="1" presetClass="entr" presetSubtype="0" fill="hold" grpId="0" nodeType="clickEffect">
-                                  <p:stCondLst>
-                                    <p:cond delay="0"/>
-                                  </p:stCondLst>
-                                  <p:childTnLst>
-                                    <p:set>
-                                      <p:cBhvr>
-                                        <p:cTn id="16" dur="1" fill="hold">
-                                          <p:stCondLst>
-                                            <p:cond delay="0"/>
-                                          </p:stCondLst>
-                                        </p:cTn>
-                                        <p:tgtEl>
-                                          <p:spTgt spid="3">
-                                            <p:txEl>
-                                              <p:pRg st="4" end="4"/>
-                                            </p:txEl>
-                                          </p:spTgt>
-                                        </p:tgtEl>
-                                        <p:attrNameLst>
-                                          <p:attrName>style.visibility</p:attrName>
-                                        </p:attrNameLst>
-                                      </p:cBhvr>
-                                      <p:to>
-                                        <p:strVal val="visible"/>
-                                      </p:to>
-                                    </p:set>
-                                  </p:childTnLst>
-                                </p:cTn>
-                              </p:par>
-                              <p:par>
-                                <p:cTn id="17" presetID="1" presetClass="entr" presetSubtype="0" fill="hold" grpId="0" nodeType="withEffect">
-                                  <p:stCondLst>
-                                    <p:cond delay="0"/>
-                                  </p:stCondLst>
-                                  <p:childTnLst>
-                                    <p:set>
-                                      <p:cBhvr>
-                                        <p:cTn id="18" dur="1" fill="hold">
-                                          <p:stCondLst>
-                                            <p:cond delay="0"/>
-                                          </p:stCondLst>
-                                        </p:cTn>
-                                        <p:tgtEl>
-                                          <p:spTgt spid="3">
-                                            <p:txEl>
-                                              <p:pRg st="5" end="5"/>
-                                            </p:txEl>
-                                          </p:spTgt>
-                                        </p:tgtEl>
-                                        <p:attrNameLst>
-                                          <p:attrName>style.visibility</p:attrName>
-                                        </p:attrNameLst>
-                                      </p:cBhvr>
-                                      <p:to>
-                                        <p:strVal val="visible"/>
-                                      </p:to>
-                                    </p:set>
-                                  </p:childTnLst>
-                                </p:cTn>
-                              </p:par>
-                              <p:par>
-                                <p:cTn id="19" presetID="1" presetClass="entr" presetSubtype="0" fill="hold" grpId="0" nodeType="withEffect">
-                                  <p:stCondLst>
-                                    <p:cond delay="0"/>
-                                  </p:stCondLst>
-                                  <p:childTnLst>
-                                    <p:set>
-                                      <p:cBhvr>
-                                        <p:cTn id="20" dur="1" fill="hold">
-                                          <p:stCondLst>
-                                            <p:cond delay="0"/>
-                                          </p:stCondLst>
-                                        </p:cTn>
-                                        <p:tgtEl>
-                                          <p:spTgt spid="3">
-                                            <p:txEl>
-                                              <p:pRg st="6" end="6"/>
-                                            </p:txEl>
-                                          </p:spTgt>
-                                        </p:tgtEl>
-                                        <p:attrNameLst>
-                                          <p:attrName>style.visibility</p:attrName>
-                                        </p:attrNameLst>
-                                      </p:cBhvr>
-                                      <p:to>
-                                        <p:strVal val="visible"/>
-                                      </p:to>
-                                    </p:set>
-                                  </p:childTnLst>
-                                </p:cTn>
-                              </p:par>
-                              <p:par>
-                                <p:cTn id="21" presetID="1" presetClass="entr" presetSubtype="0" fill="hold" grpId="0" nodeType="withEffect">
-                                  <p:stCondLst>
-                                    <p:cond delay="0"/>
-                                  </p:stCondLst>
-                                  <p:childTnLst>
-                                    <p:set>
-                                      <p:cBhvr>
-                                        <p:cTn id="22" dur="1" fill="hold">
-                                          <p:stCondLst>
-                                            <p:cond delay="0"/>
-                                          </p:stCondLst>
-                                        </p:cTn>
-                                        <p:tgtEl>
-                                          <p:spTgt spid="3">
-                                            <p:txEl>
-                                              <p:pRg st="7" end="7"/>
-                                            </p:txEl>
-                                          </p:spTgt>
-                                        </p:tgtEl>
-                                        <p:attrNameLst>
-                                          <p:attrName>style.visibility</p:attrName>
-                                        </p:attrNameLst>
-                                      </p:cBhvr>
-                                      <p:to>
-                                        <p:strVal val="visible"/>
-                                      </p:to>
-                                    </p:set>
-                                  </p:childTnLst>
-                                </p:cTn>
-                              </p:par>
-                              <p:par>
-                                <p:cTn id="23" presetID="1" presetClass="entr" presetSubtype="0" fill="hold" grpId="0" nodeType="withEffect">
-                                  <p:stCondLst>
-                                    <p:cond delay="0"/>
-                                  </p:stCondLst>
-                                  <p:childTnLst>
-                                    <p:set>
-                                      <p:cBhvr>
-                                        <p:cTn id="24" dur="1" fill="hold">
-                                          <p:stCondLst>
-                                            <p:cond delay="0"/>
-                                          </p:stCondLst>
-                                        </p:cTn>
-                                        <p:tgtEl>
-                                          <p:spTgt spid="3">
-                                            <p:txEl>
-                                              <p:pRg st="8" end="8"/>
-                                            </p:txEl>
-                                          </p:spTgt>
-                                        </p:tgtEl>
-                                        <p:attrNameLst>
-                                          <p:attrName>style.visibility</p:attrName>
-                                        </p:attrNameLst>
-                                      </p:cBhvr>
-                                      <p:to>
-                                        <p:strVal val="visible"/>
-                                      </p:to>
-                                    </p:set>
-                                  </p:childTnLst>
-                                </p:cTn>
-                              </p:par>
-                              <p:par>
-                                <p:cTn id="25" presetID="1" presetClass="entr" presetSubtype="0" fill="hold" grpId="0" nodeType="withEffect">
-                                  <p:stCondLst>
-                                    <p:cond delay="0"/>
-                                  </p:stCondLst>
-                                  <p:childTnLst>
-                                    <p:set>
-                                      <p:cBhvr>
-                                        <p:cTn id="26" dur="1" fill="hold">
-                                          <p:stCondLst>
-                                            <p:cond delay="0"/>
-                                          </p:stCondLst>
-                                        </p:cTn>
-                                        <p:tgtEl>
-                                          <p:spTgt spid="3">
-                                            <p:txEl>
-                                              <p:pRg st="9" end="9"/>
-                                            </p:txEl>
-                                          </p:spTgt>
-                                        </p:tgtEl>
-                                        <p:attrNameLst>
-                                          <p:attrName>style.visibility</p:attrName>
-                                        </p:attrNameLst>
-                                      </p:cBhvr>
-                                      <p:to>
-                                        <p:strVal val="visible"/>
-                                      </p:to>
-                                    </p:set>
-                                  </p:childTnLst>
-                                </p:cTn>
-                              </p:par>
-                              <p:par>
-                                <p:cTn id="27" presetID="1" presetClass="entr" presetSubtype="0" fill="hold" grpId="0" nodeType="withEffect">
-                                  <p:stCondLst>
-                                    <p:cond delay="0"/>
-                                  </p:stCondLst>
-                                  <p:childTnLst>
-                                    <p:set>
-                                      <p:cBhvr>
-                                        <p:cTn id="28" dur="1" fill="hold">
-                                          <p:stCondLst>
-                                            <p:cond delay="0"/>
-                                          </p:stCondLst>
-                                        </p:cTn>
-                                        <p:tgtEl>
-                                          <p:spTgt spid="3">
-                                            <p:txEl>
-                                              <p:pRg st="10" end="10"/>
-                                            </p:txEl>
-                                          </p:spTgt>
-                                        </p:tgtEl>
-                                        <p:attrNameLst>
-                                          <p:attrName>style.visibility</p:attrName>
-                                        </p:attrNameLst>
-                                      </p:cBhvr>
-                                      <p:to>
-                                        <p:strVal val="visible"/>
-                                      </p:to>
-                                    </p:set>
-                                  </p:childTnLst>
-                                </p:cTn>
-                              </p:par>
-                            </p:childTnLst>
-                          </p:cTn>
-                        </p:par>
-                      </p:childTnLst>
-                    </p:cTn>
-                  </p:par>
-                </p:childTnLst>
-              </p:cTn>
-              <p:prevCondLst>
-                <p:cond evt="onPrev" delay="0">
-                  <p:tgtEl>
-                    <p:sldTgt/>
-                  </p:tgtEl>
-                </p:cond>
-              </p:prevCondLst>
-              <p:nextCondLst>
-                <p:cond evt="onNext" delay="0">
-                  <p:tgtEl>
-                    <p:sldTgt/>
-                  </p:tgtEl>
-                </p:cond>
-              </p:nextCondLst>
-            </p:seq>
-          </p:childTnLst>
-        </p:cTn>
-      </p:par>
-    </p:tnLst>
-    <p:bldLst>
-      <p:bldP spid="3" grpId="0" build="p"/>
-    </p:bldLst>
   </p:timing>
 </p:sld>
 </file>

</xml_diff>